<commit_message>
Draft 1 Checkin For Week 3.
</commit_message>
<xml_diff>
--- a/week3/week3.pptx
+++ b/week3/week3.pptx
@@ -26,11 +26,22 @@
     <p:sldId id="301" r:id="rId20"/>
     <p:sldId id="302" r:id="rId21"/>
     <p:sldId id="303" r:id="rId22"/>
-    <p:sldId id="304" r:id="rId23"/>
-    <p:sldId id="305" r:id="rId24"/>
-    <p:sldId id="306" r:id="rId25"/>
-    <p:sldId id="278" r:id="rId26"/>
-    <p:sldId id="282" r:id="rId27"/>
+    <p:sldId id="313" r:id="rId23"/>
+    <p:sldId id="304" r:id="rId24"/>
+    <p:sldId id="305" r:id="rId25"/>
+    <p:sldId id="306" r:id="rId26"/>
+    <p:sldId id="307" r:id="rId27"/>
+    <p:sldId id="278" r:id="rId28"/>
+    <p:sldId id="309" r:id="rId29"/>
+    <p:sldId id="311" r:id="rId30"/>
+    <p:sldId id="312" r:id="rId31"/>
+    <p:sldId id="315" r:id="rId32"/>
+    <p:sldId id="314" r:id="rId33"/>
+    <p:sldId id="316" r:id="rId34"/>
+    <p:sldId id="317" r:id="rId35"/>
+    <p:sldId id="319" r:id="rId36"/>
+    <p:sldId id="318" r:id="rId37"/>
+    <p:sldId id="282" r:id="rId38"/>
   </p:sldIdLst>
   <p:sldSz cx="12192000" cy="6858000"/>
   <p:notesSz cx="6858000" cy="9144000"/>
@@ -163,6 +174,7 @@
             <p14:sldId id="301"/>
             <p14:sldId id="302"/>
             <p14:sldId id="303"/>
+            <p14:sldId id="313"/>
             <p14:sldId id="304"/>
             <p14:sldId id="305"/>
             <p14:sldId id="306"/>
@@ -170,7 +182,17 @@
         </p14:section>
         <p14:section name="Homework" id="{58F40B92-EA96-44EF-BD4A-D1E80F75E29E}">
           <p14:sldIdLst>
+            <p14:sldId id="307"/>
             <p14:sldId id="278"/>
+            <p14:sldId id="309"/>
+            <p14:sldId id="311"/>
+            <p14:sldId id="312"/>
+            <p14:sldId id="315"/>
+            <p14:sldId id="314"/>
+            <p14:sldId id="316"/>
+            <p14:sldId id="317"/>
+            <p14:sldId id="319"/>
+            <p14:sldId id="318"/>
           </p14:sldIdLst>
         </p14:section>
         <p14:section name="Next Week" id="{B2E86CDA-F55E-42CA-B38B-16B67EE4F37C}">
@@ -373,7 +395,7 @@
           <a:p>
             <a:fld id="{4AAD347D-5ACD-4C99-B74B-A9C85AD731AF}" type="datetimeFigureOut">
               <a:rPr lang="en-US" dirty="0"/>
-              <a:t>3/2/2018</a:t>
+              <a:t>3/3/2018</a:t>
             </a:fld>
             <a:endParaRPr lang="en-US" dirty="0"/>
           </a:p>
@@ -643,7 +665,7 @@
           <a:p>
             <a:fld id="{4509A250-FF31-4206-8172-F9D3106AACB1}" type="datetimeFigureOut">
               <a:rPr lang="en-US" dirty="0"/>
-              <a:t>3/2/2018</a:t>
+              <a:t>3/3/2018</a:t>
             </a:fld>
             <a:endParaRPr lang="en-US" dirty="0"/>
           </a:p>
@@ -832,7 +854,7 @@
           <a:p>
             <a:fld id="{4509A250-FF31-4206-8172-F9D3106AACB1}" type="datetimeFigureOut">
               <a:rPr lang="en-US" dirty="0"/>
-              <a:t>3/2/2018</a:t>
+              <a:t>3/3/2018</a:t>
             </a:fld>
             <a:endParaRPr lang="en-US" dirty="0"/>
           </a:p>
@@ -1100,7 +1122,7 @@
           <a:p>
             <a:fld id="{4509A250-FF31-4206-8172-F9D3106AACB1}" type="datetimeFigureOut">
               <a:rPr lang="en-US" dirty="0"/>
-              <a:t>3/2/2018</a:t>
+              <a:t>3/3/2018</a:t>
             </a:fld>
             <a:endParaRPr lang="en-US" dirty="0"/>
           </a:p>
@@ -1436,7 +1458,7 @@
           <a:p>
             <a:fld id="{4509A250-FF31-4206-8172-F9D3106AACB1}" type="datetimeFigureOut">
               <a:rPr lang="en-US" dirty="0"/>
-              <a:t>3/2/2018</a:t>
+              <a:t>3/3/2018</a:t>
             </a:fld>
             <a:endParaRPr lang="en-US" dirty="0"/>
           </a:p>
@@ -2054,7 +2076,7 @@
           <a:p>
             <a:fld id="{4509A250-FF31-4206-8172-F9D3106AACB1}" type="datetimeFigureOut">
               <a:rPr lang="en-US" dirty="0"/>
-              <a:t>3/2/2018</a:t>
+              <a:t>3/3/2018</a:t>
             </a:fld>
             <a:endParaRPr lang="en-US" dirty="0"/>
           </a:p>
@@ -2909,7 +2931,7 @@
           <a:p>
             <a:fld id="{4509A250-FF31-4206-8172-F9D3106AACB1}" type="datetimeFigureOut">
               <a:rPr lang="en-US" dirty="0"/>
-              <a:t>3/2/2018</a:t>
+              <a:t>3/3/2018</a:t>
             </a:fld>
             <a:endParaRPr lang="en-US" dirty="0"/>
           </a:p>
@@ -3074,7 +3096,7 @@
           <a:p>
             <a:fld id="{4509A250-FF31-4206-8172-F9D3106AACB1}" type="datetimeFigureOut">
               <a:rPr lang="en-US" dirty="0"/>
-              <a:t>3/2/2018</a:t>
+              <a:t>3/3/2018</a:t>
             </a:fld>
             <a:endParaRPr lang="en-US" dirty="0"/>
           </a:p>
@@ -3249,7 +3271,7 @@
           <a:p>
             <a:fld id="{4509A250-FF31-4206-8172-F9D3106AACB1}" type="datetimeFigureOut">
               <a:rPr lang="en-US" dirty="0"/>
-              <a:t>3/2/2018</a:t>
+              <a:t>3/3/2018</a:t>
             </a:fld>
             <a:endParaRPr lang="en-US" dirty="0"/>
           </a:p>
@@ -3414,7 +3436,7 @@
           <a:p>
             <a:fld id="{4509A250-FF31-4206-8172-F9D3106AACB1}" type="datetimeFigureOut">
               <a:rPr lang="en-US" dirty="0"/>
-              <a:t>3/2/2018</a:t>
+              <a:t>3/3/2018</a:t>
             </a:fld>
             <a:endParaRPr lang="en-US" dirty="0"/>
           </a:p>
@@ -3656,7 +3678,7 @@
           <a:p>
             <a:fld id="{9796027F-7875-4030-9381-8BD8C4F21935}" type="datetimeFigureOut">
               <a:rPr lang="en-US" dirty="0"/>
-              <a:t>3/2/2018</a:t>
+              <a:t>3/3/2018</a:t>
             </a:fld>
             <a:endParaRPr lang="en-US" dirty="0"/>
           </a:p>
@@ -3943,7 +3965,7 @@
           <a:p>
             <a:fld id="{9796027F-7875-4030-9381-8BD8C4F21935}" type="datetimeFigureOut">
               <a:rPr lang="en-US" dirty="0"/>
-              <a:t>3/2/2018</a:t>
+              <a:t>3/3/2018</a:t>
             </a:fld>
             <a:endParaRPr lang="en-US" dirty="0"/>
           </a:p>
@@ -4382,7 +4404,7 @@
           <a:p>
             <a:fld id="{9796027F-7875-4030-9381-8BD8C4F21935}" type="datetimeFigureOut">
               <a:rPr lang="en-US" dirty="0"/>
-              <a:t>3/2/2018</a:t>
+              <a:t>3/3/2018</a:t>
             </a:fld>
             <a:endParaRPr lang="en-US" dirty="0"/>
           </a:p>
@@ -4495,7 +4517,7 @@
           <a:p>
             <a:fld id="{4509A250-FF31-4206-8172-F9D3106AACB1}" type="datetimeFigureOut">
               <a:rPr lang="en-US" dirty="0"/>
-              <a:t>3/2/2018</a:t>
+              <a:t>3/3/2018</a:t>
             </a:fld>
             <a:endParaRPr lang="en-US" dirty="0"/>
           </a:p>
@@ -4585,7 +4607,7 @@
           <a:p>
             <a:fld id="{4509A250-FF31-4206-8172-F9D3106AACB1}" type="datetimeFigureOut">
               <a:rPr lang="en-US" dirty="0"/>
-              <a:t>3/2/2018</a:t>
+              <a:t>3/3/2018</a:t>
             </a:fld>
             <a:endParaRPr lang="en-US" dirty="0"/>
           </a:p>
@@ -4859,7 +4881,7 @@
           <a:p>
             <a:fld id="{4509A250-FF31-4206-8172-F9D3106AACB1}" type="datetimeFigureOut">
               <a:rPr lang="en-US" dirty="0"/>
-              <a:t>3/2/2018</a:t>
+              <a:t>3/3/2018</a:t>
             </a:fld>
             <a:endParaRPr lang="en-US" dirty="0"/>
           </a:p>
@@ -5129,7 +5151,7 @@
           <a:p>
             <a:fld id="{4509A250-FF31-4206-8172-F9D3106AACB1}" type="datetimeFigureOut">
               <a:rPr lang="en-US" dirty="0"/>
-              <a:t>3/2/2018</a:t>
+              <a:t>3/3/2018</a:t>
             </a:fld>
             <a:endParaRPr lang="en-US" dirty="0"/>
           </a:p>
@@ -5553,7 +5575,7 @@
           <a:p>
             <a:fld id="{4AAD347D-5ACD-4C99-B74B-A9C85AD731AF}" type="datetimeFigureOut">
               <a:rPr lang="en-US" dirty="0"/>
-              <a:t>3/2/2018</a:t>
+              <a:t>3/3/2018</a:t>
             </a:fld>
             <a:endParaRPr lang="en-US" dirty="0"/>
           </a:p>
@@ -6120,11 +6142,7 @@
           <a:p>
             <a:r>
               <a:rPr lang="en-GB" dirty="0" smtClean="0"/>
-              <a:t>Week </a:t>
-            </a:r>
-            <a:r>
-              <a:rPr lang="en-GB" dirty="0" smtClean="0"/>
-              <a:t>3: Strings and numbers combined, more loop structures and lists.</a:t>
+              <a:t>Week 3: Strings and numbers combined, more loop structures and lists.</a:t>
             </a:r>
             <a:endParaRPr lang="en-GB" dirty="0"/>
           </a:p>
@@ -10559,7 +10577,11 @@
           <a:p>
             <a:r>
               <a:rPr lang="en-GB" dirty="0" smtClean="0"/>
-              <a:t>Adding to lists example.</a:t>
+              <a:t>Adding </a:t>
+            </a:r>
+            <a:r>
+              <a:rPr lang="en-GB" dirty="0" smtClean="0"/>
+              <a:t>a single thing to a list.</a:t>
             </a:r>
             <a:endParaRPr lang="en-GB" dirty="0"/>
           </a:p>
@@ -11248,14 +11270,19 @@
             <p:ph type="title"/>
           </p:nvPr>
         </p:nvSpPr>
-        <p:spPr/>
+        <p:spPr>
+          <a:xfrm>
+            <a:off x="595311" y="335511"/>
+            <a:ext cx="9404723" cy="1400530"/>
+          </a:xfrm>
+        </p:spPr>
         <p:txBody>
           <a:bodyPr/>
           <a:lstStyle/>
           <a:p>
             <a:r>
               <a:rPr lang="en-GB" dirty="0" smtClean="0"/>
-              <a:t>Getting individual elements of a list.</a:t>
+              <a:t>Adding multiple things to a list.</a:t>
             </a:r>
             <a:endParaRPr lang="en-GB" dirty="0"/>
           </a:p>
@@ -11273,50 +11300,313 @@
         </p:nvSpPr>
         <p:spPr>
           <a:xfrm>
-            <a:off x="646111" y="1853248"/>
-            <a:ext cx="4171421" cy="4195481"/>
+            <a:off x="595310" y="1736041"/>
+            <a:ext cx="4433889" cy="4032250"/>
           </a:xfrm>
         </p:spPr>
         <p:txBody>
-          <a:bodyPr/>
+          <a:bodyPr>
+            <a:normAutofit/>
+          </a:bodyPr>
           <a:lstStyle/>
           <a:p>
             <a:r>
               <a:rPr lang="en-GB" dirty="0" smtClean="0"/>
-              <a:t>We can use a new type of notation to get individual elements of a list.</a:t>
-            </a:r>
-          </a:p>
-          <a:p>
-            <a:r>
-              <a:rPr lang="en-GB" dirty="0" smtClean="0"/>
-              <a:t>If we use square brackets to enclose a number after a list variable, it says to only work on that element of the list.</a:t>
-            </a:r>
-          </a:p>
-          <a:p>
-            <a:r>
-              <a:rPr lang="en-GB" dirty="0" smtClean="0"/>
-              <a:t>The easiest way to understand this is to look at an example.</a:t>
-            </a:r>
-            <a:endParaRPr lang="en-GB" dirty="0"/>
-          </a:p>
-        </p:txBody>
-      </p:sp>
-      <p:sp>
-        <p:nvSpPr>
-          <p:cNvPr id="5" name="Rectangle 4"/>
-          <p:cNvSpPr/>
+              <a:t>You can also use the </a:t>
+            </a:r>
+            <a:r>
+              <a:rPr lang="en-GB" u="sng" dirty="0" smtClean="0"/>
+              <a:t>extend method</a:t>
+            </a:r>
+            <a:r>
+              <a:rPr lang="en-GB" dirty="0" smtClean="0"/>
+              <a:t> to add multiple things to the end of a list.</a:t>
+            </a:r>
+          </a:p>
+          <a:p>
+            <a:endParaRPr lang="en-GB" i="1" u="sng" dirty="0"/>
+          </a:p>
+          <a:p>
+            <a:r>
+              <a:rPr lang="en-GB" dirty="0" smtClean="0"/>
+              <a:t>To see how, follow the example.</a:t>
+            </a:r>
+            <a:endParaRPr lang="en-GB" dirty="0" smtClean="0"/>
+          </a:p>
+          <a:p>
+            <a:endParaRPr lang="en-GB" dirty="0" smtClean="0"/>
+          </a:p>
+        </p:txBody>
+      </p:sp>
+      <p:sp>
+        <p:nvSpPr>
+          <p:cNvPr id="5" name="Content Placeholder 2"/>
+          <p:cNvSpPr txBox="1">
+            <a:spLocks/>
+          </p:cNvSpPr>
           <p:nvPr/>
         </p:nvSpPr>
         <p:spPr>
           <a:xfrm>
-            <a:off x="646112" y="5387291"/>
-            <a:ext cx="6796088" cy="923330"/>
+            <a:off x="6510867" y="1736041"/>
+            <a:ext cx="4885266" cy="4032250"/>
           </a:xfrm>
           <a:prstGeom prst="rect">
             <a:avLst/>
           </a:prstGeom>
         </p:spPr>
         <p:txBody>
+          <a:bodyPr vert="horz" lIns="91440" tIns="45720" rIns="91440" bIns="45720" rtlCol="0">
+            <a:normAutofit/>
+          </a:bodyPr>
+          <a:lstStyle>
+            <a:lvl1pPr marL="342900" indent="-342900" algn="l" defTabSz="457200" rtl="0" eaLnBrk="1" latinLnBrk="0" hangingPunct="1">
+              <a:spcBef>
+                <a:spcPts val="1000"/>
+              </a:spcBef>
+              <a:spcAft>
+                <a:spcPts val="0"/>
+              </a:spcAft>
+              <a:buClr>
+                <a:schemeClr val="bg2">
+                  <a:lumMod val="40000"/>
+                  <a:lumOff val="60000"/>
+                </a:schemeClr>
+              </a:buClr>
+              <a:buSzPct val="80000"/>
+              <a:buFont typeface="Wingdings 3" charset="2"/>
+              <a:buChar char=""/>
+              <a:defRPr sz="2000" b="0" i="0" kern="1200">
+                <a:solidFill>
+                  <a:schemeClr val="tx1"/>
+                </a:solidFill>
+                <a:latin typeface="+mj-lt"/>
+                <a:ea typeface="+mj-ea"/>
+                <a:cs typeface="+mj-cs"/>
+              </a:defRPr>
+            </a:lvl1pPr>
+            <a:lvl2pPr marL="742950" indent="-285750" algn="l" defTabSz="457200" rtl="0" eaLnBrk="1" latinLnBrk="0" hangingPunct="1">
+              <a:spcBef>
+                <a:spcPts val="1000"/>
+              </a:spcBef>
+              <a:spcAft>
+                <a:spcPts val="0"/>
+              </a:spcAft>
+              <a:buClr>
+                <a:schemeClr val="bg2">
+                  <a:lumMod val="40000"/>
+                  <a:lumOff val="60000"/>
+                </a:schemeClr>
+              </a:buClr>
+              <a:buSzPct val="80000"/>
+              <a:buFont typeface="Wingdings 3" charset="2"/>
+              <a:buChar char=""/>
+              <a:defRPr sz="1800" b="0" i="0" kern="1200">
+                <a:solidFill>
+                  <a:schemeClr val="tx1"/>
+                </a:solidFill>
+                <a:latin typeface="+mj-lt"/>
+                <a:ea typeface="+mj-ea"/>
+                <a:cs typeface="+mj-cs"/>
+              </a:defRPr>
+            </a:lvl2pPr>
+            <a:lvl3pPr marL="1143000" indent="-228600" algn="l" defTabSz="457200" rtl="0" eaLnBrk="1" latinLnBrk="0" hangingPunct="1">
+              <a:spcBef>
+                <a:spcPts val="1000"/>
+              </a:spcBef>
+              <a:spcAft>
+                <a:spcPts val="0"/>
+              </a:spcAft>
+              <a:buClr>
+                <a:schemeClr val="bg2">
+                  <a:lumMod val="40000"/>
+                  <a:lumOff val="60000"/>
+                </a:schemeClr>
+              </a:buClr>
+              <a:buSzPct val="80000"/>
+              <a:buFont typeface="Wingdings 3" charset="2"/>
+              <a:buChar char=""/>
+              <a:defRPr sz="1600" b="0" i="0" kern="1200">
+                <a:solidFill>
+                  <a:schemeClr val="tx1"/>
+                </a:solidFill>
+                <a:latin typeface="+mj-lt"/>
+                <a:ea typeface="+mj-ea"/>
+                <a:cs typeface="+mj-cs"/>
+              </a:defRPr>
+            </a:lvl3pPr>
+            <a:lvl4pPr marL="1600200" indent="-228600" algn="l" defTabSz="457200" rtl="0" eaLnBrk="1" latinLnBrk="0" hangingPunct="1">
+              <a:spcBef>
+                <a:spcPts val="1000"/>
+              </a:spcBef>
+              <a:spcAft>
+                <a:spcPts val="0"/>
+              </a:spcAft>
+              <a:buClr>
+                <a:schemeClr val="bg2">
+                  <a:lumMod val="40000"/>
+                  <a:lumOff val="60000"/>
+                </a:schemeClr>
+              </a:buClr>
+              <a:buSzPct val="80000"/>
+              <a:buFont typeface="Wingdings 3" charset="2"/>
+              <a:buChar char=""/>
+              <a:defRPr sz="1400" b="0" i="0" kern="1200">
+                <a:solidFill>
+                  <a:schemeClr val="tx1"/>
+                </a:solidFill>
+                <a:latin typeface="+mj-lt"/>
+                <a:ea typeface="+mj-ea"/>
+                <a:cs typeface="+mj-cs"/>
+              </a:defRPr>
+            </a:lvl4pPr>
+            <a:lvl5pPr marL="2057400" indent="-228600" algn="l" defTabSz="457200" rtl="0" eaLnBrk="1" latinLnBrk="0" hangingPunct="1">
+              <a:spcBef>
+                <a:spcPts val="1000"/>
+              </a:spcBef>
+              <a:spcAft>
+                <a:spcPts val="0"/>
+              </a:spcAft>
+              <a:buClr>
+                <a:schemeClr val="bg2">
+                  <a:lumMod val="40000"/>
+                  <a:lumOff val="60000"/>
+                </a:schemeClr>
+              </a:buClr>
+              <a:buSzPct val="80000"/>
+              <a:buFont typeface="Wingdings 3" charset="2"/>
+              <a:buChar char=""/>
+              <a:defRPr sz="1400" b="0" i="0" kern="1200">
+                <a:solidFill>
+                  <a:schemeClr val="tx1"/>
+                </a:solidFill>
+                <a:latin typeface="+mj-lt"/>
+                <a:ea typeface="+mj-ea"/>
+                <a:cs typeface="+mj-cs"/>
+              </a:defRPr>
+            </a:lvl5pPr>
+            <a:lvl6pPr marL="2506000" indent="-228600" algn="l" defTabSz="457200" rtl="0" eaLnBrk="1" latinLnBrk="0" hangingPunct="1">
+              <a:spcBef>
+                <a:spcPts val="1000"/>
+              </a:spcBef>
+              <a:spcAft>
+                <a:spcPts val="0"/>
+              </a:spcAft>
+              <a:buClr>
+                <a:schemeClr val="bg2">
+                  <a:lumMod val="40000"/>
+                  <a:lumOff val="60000"/>
+                </a:schemeClr>
+              </a:buClr>
+              <a:buSzPct val="80000"/>
+              <a:buFont typeface="Wingdings 3" charset="2"/>
+              <a:buChar char=""/>
+              <a:defRPr sz="1400" b="0" i="0" kern="1200">
+                <a:solidFill>
+                  <a:schemeClr val="tx1"/>
+                </a:solidFill>
+                <a:latin typeface="+mj-lt"/>
+                <a:ea typeface="+mj-ea"/>
+                <a:cs typeface="+mj-cs"/>
+              </a:defRPr>
+            </a:lvl6pPr>
+            <a:lvl7pPr marL="2971800" indent="-228600" algn="l" defTabSz="457200" rtl="0" eaLnBrk="1" latinLnBrk="0" hangingPunct="1">
+              <a:spcBef>
+                <a:spcPts val="1000"/>
+              </a:spcBef>
+              <a:spcAft>
+                <a:spcPts val="0"/>
+              </a:spcAft>
+              <a:buClr>
+                <a:schemeClr val="bg2">
+                  <a:lumMod val="40000"/>
+                  <a:lumOff val="60000"/>
+                </a:schemeClr>
+              </a:buClr>
+              <a:buSzPct val="80000"/>
+              <a:buFont typeface="Wingdings 3" charset="2"/>
+              <a:buChar char=""/>
+              <a:defRPr sz="1400" b="0" i="0" kern="1200">
+                <a:solidFill>
+                  <a:schemeClr val="tx1"/>
+                </a:solidFill>
+                <a:latin typeface="+mj-lt"/>
+                <a:ea typeface="+mj-ea"/>
+                <a:cs typeface="+mj-cs"/>
+              </a:defRPr>
+            </a:lvl7pPr>
+            <a:lvl8pPr marL="3429000" indent="-228600" algn="l" defTabSz="457200" rtl="0" eaLnBrk="1" latinLnBrk="0" hangingPunct="1">
+              <a:spcBef>
+                <a:spcPts val="1000"/>
+              </a:spcBef>
+              <a:spcAft>
+                <a:spcPts val="0"/>
+              </a:spcAft>
+              <a:buClr>
+                <a:schemeClr val="bg2">
+                  <a:lumMod val="40000"/>
+                  <a:lumOff val="60000"/>
+                </a:schemeClr>
+              </a:buClr>
+              <a:buSzPct val="80000"/>
+              <a:buFont typeface="Wingdings 3" charset="2"/>
+              <a:buChar char=""/>
+              <a:defRPr sz="1400" b="0" i="0" kern="1200">
+                <a:solidFill>
+                  <a:schemeClr val="tx1"/>
+                </a:solidFill>
+                <a:latin typeface="+mj-lt"/>
+                <a:ea typeface="+mj-ea"/>
+                <a:cs typeface="+mj-cs"/>
+              </a:defRPr>
+            </a:lvl8pPr>
+            <a:lvl9pPr marL="3886200" indent="-228600" algn="l" defTabSz="457200" rtl="0" eaLnBrk="1" latinLnBrk="0" hangingPunct="1">
+              <a:spcBef>
+                <a:spcPts val="1000"/>
+              </a:spcBef>
+              <a:spcAft>
+                <a:spcPts val="0"/>
+              </a:spcAft>
+              <a:buClr>
+                <a:schemeClr val="bg2">
+                  <a:lumMod val="40000"/>
+                  <a:lumOff val="60000"/>
+                </a:schemeClr>
+              </a:buClr>
+              <a:buSzPct val="80000"/>
+              <a:buFont typeface="Wingdings 3" charset="2"/>
+              <a:buChar char=""/>
+              <a:defRPr sz="1400" b="0" i="0" kern="1200">
+                <a:solidFill>
+                  <a:schemeClr val="tx1"/>
+                </a:solidFill>
+                <a:latin typeface="+mj-lt"/>
+                <a:ea typeface="+mj-ea"/>
+                <a:cs typeface="+mj-cs"/>
+              </a:defRPr>
+            </a:lvl9pPr>
+          </a:lstStyle>
+          <a:p>
+            <a:endParaRPr lang="en-GB" dirty="0"/>
+          </a:p>
+        </p:txBody>
+      </p:sp>
+      <p:sp>
+        <p:nvSpPr>
+          <p:cNvPr id="6" name="Rectangle 5"/>
+          <p:cNvSpPr/>
+          <p:nvPr/>
+        </p:nvSpPr>
+        <p:spPr>
+          <a:xfrm>
+            <a:off x="679980" y="5440111"/>
+            <a:ext cx="7668153" cy="1200329"/>
+          </a:xfrm>
+          <a:prstGeom prst="rect">
+            <a:avLst/>
+          </a:prstGeom>
+        </p:spPr>
+        <p:txBody>
           <a:bodyPr wrap="square">
             <a:spAutoFit/>
           </a:bodyPr>
@@ -11352,17 +11642,39 @@
             </a:r>
           </a:p>
           <a:p>
+            <a:pPr marL="742950" lvl="1" indent="-285750">
+              <a:buFont typeface="Arial" panose="020B0604020202020204" pitchFamily="34" charset="0"/>
+              <a:buChar char="•"/>
+            </a:pPr>
+            <a:r>
+              <a:rPr lang="en-GB" dirty="0" smtClean="0">
+                <a:solidFill>
+                  <a:srgbClr val="FFFF00"/>
+                </a:solidFill>
+              </a:rPr>
+              <a:t>Which elements do you think are equal ?</a:t>
+            </a:r>
+          </a:p>
+          <a:p>
             <a:pPr marL="285750" indent="-285750">
               <a:buFont typeface="Arial" panose="020B0604020202020204" pitchFamily="34" charset="0"/>
               <a:buChar char="•"/>
             </a:pPr>
             <a:r>
+              <a:rPr lang="en-GB" b="1" u="sng" dirty="0" smtClean="0">
+                <a:solidFill>
+                  <a:srgbClr val="FFFF00"/>
+                </a:solidFill>
+              </a:rPr>
+              <a:t>TASK</a:t>
+            </a:r>
+            <a:r>
               <a:rPr lang="en-GB" b="1" u="sng" dirty="0">
                 <a:solidFill>
                   <a:srgbClr val="FFFF00"/>
                 </a:solidFill>
               </a:rPr>
-              <a:t>TASK:</a:t>
+              <a:t>:</a:t>
             </a:r>
             <a:r>
               <a:rPr lang="en-GB" dirty="0">
@@ -11401,14 +11713,14 @@
       </p:sp>
       <p:sp>
         <p:nvSpPr>
-          <p:cNvPr id="6" name="Rectangle 5"/>
+          <p:cNvPr id="11" name="Rectangle 10"/>
           <p:cNvSpPr/>
           <p:nvPr/>
         </p:nvSpPr>
         <p:spPr>
           <a:xfrm>
-            <a:off x="5297672" y="1736041"/>
-            <a:ext cx="6096000" cy="3308598"/>
+            <a:off x="5300133" y="1736041"/>
+            <a:ext cx="6096000" cy="461665"/>
           </a:xfrm>
           <a:prstGeom prst="rect">
             <a:avLst/>
@@ -11420,317 +11732,153 @@
           </a:bodyPr>
           <a:lstStyle/>
           <a:p>
-            <a:r>
-              <a:rPr lang="en-GB" sz="1100" dirty="0">
-                <a:latin typeface="Courier New" panose="02070309020205020404" pitchFamily="49" charset="0"/>
-                <a:cs typeface="Courier New" panose="02070309020205020404" pitchFamily="49" charset="0"/>
-              </a:rPr>
-              <a:t># Week3, Program12</a:t>
-            </a:r>
-          </a:p>
-          <a:p>
-            <a:endParaRPr lang="en-GB" sz="1100" dirty="0">
+            <a:endParaRPr lang="en-GB" sz="1200" dirty="0">
               <a:latin typeface="Courier New" panose="02070309020205020404" pitchFamily="49" charset="0"/>
               <a:cs typeface="Courier New" panose="02070309020205020404" pitchFamily="49" charset="0"/>
             </a:endParaRPr>
           </a:p>
           <a:p>
-            <a:r>
-              <a:rPr lang="en-GB" sz="1100" dirty="0" err="1">
-                <a:latin typeface="Courier New" panose="02070309020205020404" pitchFamily="49" charset="0"/>
-                <a:cs typeface="Courier New" panose="02070309020205020404" pitchFamily="49" charset="0"/>
-              </a:rPr>
-              <a:t>usc</a:t>
-            </a:r>
-            <a:r>
-              <a:rPr lang="en-GB" sz="1100" dirty="0">
-                <a:latin typeface="Courier New" panose="02070309020205020404" pitchFamily="49" charset="0"/>
-                <a:cs typeface="Courier New" panose="02070309020205020404" pitchFamily="49" charset="0"/>
-              </a:rPr>
-              <a:t> = ["We", "The", "People", "Of", "The", "United", "States"]</a:t>
-            </a:r>
-          </a:p>
-          <a:p>
-            <a:endParaRPr lang="en-GB" sz="1100" dirty="0">
+            <a:endParaRPr lang="en-GB" sz="1200" dirty="0">
               <a:latin typeface="Courier New" panose="02070309020205020404" pitchFamily="49" charset="0"/>
               <a:cs typeface="Courier New" panose="02070309020205020404" pitchFamily="49" charset="0"/>
             </a:endParaRPr>
           </a:p>
-          <a:p>
-            <a:r>
-              <a:rPr lang="en-GB" sz="1100" dirty="0">
-                <a:latin typeface="Courier New" panose="02070309020205020404" pitchFamily="49" charset="0"/>
-                <a:cs typeface="Courier New" panose="02070309020205020404" pitchFamily="49" charset="0"/>
-              </a:rPr>
-              <a:t>print(</a:t>
-            </a:r>
-            <a:r>
-              <a:rPr lang="en-GB" sz="1100" dirty="0" err="1">
-                <a:latin typeface="Courier New" panose="02070309020205020404" pitchFamily="49" charset="0"/>
-                <a:cs typeface="Courier New" panose="02070309020205020404" pitchFamily="49" charset="0"/>
-              </a:rPr>
-              <a:t>usc</a:t>
-            </a:r>
-            <a:r>
-              <a:rPr lang="en-GB" sz="1100" dirty="0">
-                <a:latin typeface="Courier New" panose="02070309020205020404" pitchFamily="49" charset="0"/>
-                <a:cs typeface="Courier New" panose="02070309020205020404" pitchFamily="49" charset="0"/>
-              </a:rPr>
-              <a:t>)</a:t>
-            </a:r>
-          </a:p>
-          <a:p>
-            <a:r>
-              <a:rPr lang="en-GB" sz="1100" dirty="0">
-                <a:latin typeface="Courier New" panose="02070309020205020404" pitchFamily="49" charset="0"/>
-                <a:cs typeface="Courier New" panose="02070309020205020404" pitchFamily="49" charset="0"/>
-              </a:rPr>
-              <a:t>print(</a:t>
-            </a:r>
-            <a:r>
-              <a:rPr lang="en-GB" sz="1100" dirty="0" err="1">
-                <a:latin typeface="Courier New" panose="02070309020205020404" pitchFamily="49" charset="0"/>
-                <a:cs typeface="Courier New" panose="02070309020205020404" pitchFamily="49" charset="0"/>
-              </a:rPr>
-              <a:t>usc</a:t>
-            </a:r>
-            <a:r>
-              <a:rPr lang="en-GB" sz="1100" dirty="0">
-                <a:latin typeface="Courier New" panose="02070309020205020404" pitchFamily="49" charset="0"/>
-                <a:cs typeface="Courier New" panose="02070309020205020404" pitchFamily="49" charset="0"/>
-              </a:rPr>
-              <a:t>[0])</a:t>
-            </a:r>
-          </a:p>
-          <a:p>
-            <a:r>
-              <a:rPr lang="en-GB" sz="1100" dirty="0">
-                <a:latin typeface="Courier New" panose="02070309020205020404" pitchFamily="49" charset="0"/>
-                <a:cs typeface="Courier New" panose="02070309020205020404" pitchFamily="49" charset="0"/>
-              </a:rPr>
-              <a:t>print(</a:t>
-            </a:r>
-            <a:r>
-              <a:rPr lang="en-GB" sz="1100" dirty="0" err="1">
-                <a:latin typeface="Courier New" panose="02070309020205020404" pitchFamily="49" charset="0"/>
-                <a:cs typeface="Courier New" panose="02070309020205020404" pitchFamily="49" charset="0"/>
-              </a:rPr>
-              <a:t>usc</a:t>
-            </a:r>
-            <a:r>
-              <a:rPr lang="en-GB" sz="1100" dirty="0">
-                <a:latin typeface="Courier New" panose="02070309020205020404" pitchFamily="49" charset="0"/>
-                <a:cs typeface="Courier New" panose="02070309020205020404" pitchFamily="49" charset="0"/>
-              </a:rPr>
-              <a:t>[1])</a:t>
-            </a:r>
-          </a:p>
-          <a:p>
-            <a:endParaRPr lang="en-GB" sz="1100" dirty="0">
+        </p:txBody>
+      </p:sp>
+      <p:sp>
+        <p:nvSpPr>
+          <p:cNvPr id="4" name="Rectangle 3"/>
+          <p:cNvSpPr/>
+          <p:nvPr/>
+        </p:nvSpPr>
+        <p:spPr>
+          <a:xfrm>
+            <a:off x="5571067" y="1736041"/>
+            <a:ext cx="6096000" cy="2862322"/>
+          </a:xfrm>
+          <a:prstGeom prst="rect">
+            <a:avLst/>
+          </a:prstGeom>
+        </p:spPr>
+        <p:txBody>
+          <a:bodyPr>
+            <a:spAutoFit/>
+          </a:bodyPr>
+          <a:lstStyle/>
+          <a:p>
+            <a:r>
+              <a:rPr lang="fr-FR" dirty="0">
+                <a:latin typeface="Courier New" panose="02070309020205020404" pitchFamily="49" charset="0"/>
+                <a:cs typeface="Courier New" panose="02070309020205020404" pitchFamily="49" charset="0"/>
+              </a:rPr>
+              <a:t># Week3, Program11a</a:t>
+            </a:r>
+          </a:p>
+          <a:p>
+            <a:endParaRPr lang="fr-FR" dirty="0">
               <a:latin typeface="Courier New" panose="02070309020205020404" pitchFamily="49" charset="0"/>
               <a:cs typeface="Courier New" panose="02070309020205020404" pitchFamily="49" charset="0"/>
             </a:endParaRPr>
           </a:p>
           <a:p>
             <a:r>
-              <a:rPr lang="en-GB" sz="1100" dirty="0">
-                <a:latin typeface="Courier New" panose="02070309020205020404" pitchFamily="49" charset="0"/>
-                <a:cs typeface="Courier New" panose="02070309020205020404" pitchFamily="49" charset="0"/>
-              </a:rPr>
-              <a:t>if </a:t>
-            </a:r>
-            <a:r>
-              <a:rPr lang="en-GB" sz="1100" dirty="0" err="1">
-                <a:latin typeface="Courier New" panose="02070309020205020404" pitchFamily="49" charset="0"/>
-                <a:cs typeface="Courier New" panose="02070309020205020404" pitchFamily="49" charset="0"/>
-              </a:rPr>
-              <a:t>usc</a:t>
-            </a:r>
-            <a:r>
-              <a:rPr lang="en-GB" sz="1100" dirty="0">
-                <a:latin typeface="Courier New" panose="02070309020205020404" pitchFamily="49" charset="0"/>
-                <a:cs typeface="Courier New" panose="02070309020205020404" pitchFamily="49" charset="0"/>
-              </a:rPr>
-              <a:t>[0] == </a:t>
-            </a:r>
-            <a:r>
-              <a:rPr lang="en-GB" sz="1100" dirty="0" err="1">
-                <a:latin typeface="Courier New" panose="02070309020205020404" pitchFamily="49" charset="0"/>
-                <a:cs typeface="Courier New" panose="02070309020205020404" pitchFamily="49" charset="0"/>
-              </a:rPr>
-              <a:t>usc</a:t>
-            </a:r>
-            <a:r>
-              <a:rPr lang="en-GB" sz="1100" dirty="0">
-                <a:latin typeface="Courier New" panose="02070309020205020404" pitchFamily="49" charset="0"/>
-                <a:cs typeface="Courier New" panose="02070309020205020404" pitchFamily="49" charset="0"/>
-              </a:rPr>
-              <a:t>[1]:</a:t>
-            </a:r>
-          </a:p>
-          <a:p>
-            <a:r>
-              <a:rPr lang="en-GB" sz="1100" dirty="0">
-                <a:latin typeface="Courier New" panose="02070309020205020404" pitchFamily="49" charset="0"/>
-                <a:cs typeface="Courier New" panose="02070309020205020404" pitchFamily="49" charset="0"/>
-              </a:rPr>
-              <a:t>    print("The 0th element is equal to the 1st element")</a:t>
-            </a:r>
-          </a:p>
-          <a:p>
-            <a:endParaRPr lang="en-GB" sz="1100" dirty="0">
+              <a:rPr lang="fr-FR" dirty="0">
+                <a:latin typeface="Courier New" panose="02070309020205020404" pitchFamily="49" charset="0"/>
+                <a:cs typeface="Courier New" panose="02070309020205020404" pitchFamily="49" charset="0"/>
+              </a:rPr>
+              <a:t>primes = [2,3,5,7,11]</a:t>
+            </a:r>
+          </a:p>
+          <a:p>
+            <a:r>
+              <a:rPr lang="fr-FR" dirty="0" err="1">
+                <a:latin typeface="Courier New" panose="02070309020205020404" pitchFamily="49" charset="0"/>
+                <a:cs typeface="Courier New" panose="02070309020205020404" pitchFamily="49" charset="0"/>
+              </a:rPr>
+              <a:t>print</a:t>
+            </a:r>
+            <a:r>
+              <a:rPr lang="fr-FR" dirty="0">
+                <a:latin typeface="Courier New" panose="02070309020205020404" pitchFamily="49" charset="0"/>
+                <a:cs typeface="Courier New" panose="02070309020205020404" pitchFamily="49" charset="0"/>
+              </a:rPr>
+              <a:t>(primes)</a:t>
+            </a:r>
+          </a:p>
+          <a:p>
+            <a:endParaRPr lang="fr-FR" dirty="0">
               <a:latin typeface="Courier New" panose="02070309020205020404" pitchFamily="49" charset="0"/>
               <a:cs typeface="Courier New" panose="02070309020205020404" pitchFamily="49" charset="0"/>
             </a:endParaRPr>
           </a:p>
           <a:p>
             <a:r>
-              <a:rPr lang="en-GB" sz="1100" dirty="0">
-                <a:latin typeface="Courier New" panose="02070309020205020404" pitchFamily="49" charset="0"/>
-                <a:cs typeface="Courier New" panose="02070309020205020404" pitchFamily="49" charset="0"/>
-              </a:rPr>
-              <a:t>if </a:t>
-            </a:r>
-            <a:r>
-              <a:rPr lang="en-GB" sz="1100" dirty="0" err="1">
-                <a:latin typeface="Courier New" panose="02070309020205020404" pitchFamily="49" charset="0"/>
-                <a:cs typeface="Courier New" panose="02070309020205020404" pitchFamily="49" charset="0"/>
-              </a:rPr>
-              <a:t>usc</a:t>
-            </a:r>
-            <a:r>
-              <a:rPr lang="en-GB" sz="1100" dirty="0">
-                <a:latin typeface="Courier New" panose="02070309020205020404" pitchFamily="49" charset="0"/>
-                <a:cs typeface="Courier New" panose="02070309020205020404" pitchFamily="49" charset="0"/>
-              </a:rPr>
-              <a:t>[0] == </a:t>
-            </a:r>
-            <a:r>
-              <a:rPr lang="en-GB" sz="1100" dirty="0" err="1">
-                <a:latin typeface="Courier New" panose="02070309020205020404" pitchFamily="49" charset="0"/>
-                <a:cs typeface="Courier New" panose="02070309020205020404" pitchFamily="49" charset="0"/>
-              </a:rPr>
-              <a:t>usc</a:t>
-            </a:r>
-            <a:r>
-              <a:rPr lang="en-GB" sz="1100" dirty="0">
-                <a:latin typeface="Courier New" panose="02070309020205020404" pitchFamily="49" charset="0"/>
-                <a:cs typeface="Courier New" panose="02070309020205020404" pitchFamily="49" charset="0"/>
-              </a:rPr>
-              <a:t>[4]:</a:t>
-            </a:r>
-          </a:p>
-          <a:p>
-            <a:r>
-              <a:rPr lang="en-GB" sz="1100" dirty="0">
-                <a:latin typeface="Courier New" panose="02070309020205020404" pitchFamily="49" charset="0"/>
-                <a:cs typeface="Courier New" panose="02070309020205020404" pitchFamily="49" charset="0"/>
-              </a:rPr>
-              <a:t>    print("The 0th element is equal to the 4th element")</a:t>
-            </a:r>
-          </a:p>
-          <a:p>
-            <a:endParaRPr lang="en-GB" sz="1100" dirty="0">
+              <a:rPr lang="fr-FR" dirty="0" err="1">
+                <a:latin typeface="Courier New" panose="02070309020205020404" pitchFamily="49" charset="0"/>
+                <a:cs typeface="Courier New" panose="02070309020205020404" pitchFamily="49" charset="0"/>
+              </a:rPr>
+              <a:t>primes.extend</a:t>
+            </a:r>
+            <a:r>
+              <a:rPr lang="fr-FR" dirty="0">
+                <a:latin typeface="Courier New" panose="02070309020205020404" pitchFamily="49" charset="0"/>
+                <a:cs typeface="Courier New" panose="02070309020205020404" pitchFamily="49" charset="0"/>
+              </a:rPr>
+              <a:t>([13,17,19])</a:t>
+            </a:r>
+          </a:p>
+          <a:p>
+            <a:r>
+              <a:rPr lang="fr-FR" dirty="0" err="1">
+                <a:latin typeface="Courier New" panose="02070309020205020404" pitchFamily="49" charset="0"/>
+                <a:cs typeface="Courier New" panose="02070309020205020404" pitchFamily="49" charset="0"/>
+              </a:rPr>
+              <a:t>print</a:t>
+            </a:r>
+            <a:r>
+              <a:rPr lang="fr-FR" dirty="0">
+                <a:latin typeface="Courier New" panose="02070309020205020404" pitchFamily="49" charset="0"/>
+                <a:cs typeface="Courier New" panose="02070309020205020404" pitchFamily="49" charset="0"/>
+              </a:rPr>
+              <a:t>(primes)</a:t>
+            </a:r>
+          </a:p>
+          <a:p>
+            <a:endParaRPr lang="fr-FR" dirty="0">
               <a:latin typeface="Courier New" panose="02070309020205020404" pitchFamily="49" charset="0"/>
               <a:cs typeface="Courier New" panose="02070309020205020404" pitchFamily="49" charset="0"/>
             </a:endParaRPr>
           </a:p>
           <a:p>
             <a:r>
-              <a:rPr lang="en-GB" sz="1100" dirty="0">
-                <a:latin typeface="Courier New" panose="02070309020205020404" pitchFamily="49" charset="0"/>
-                <a:cs typeface="Courier New" panose="02070309020205020404" pitchFamily="49" charset="0"/>
-              </a:rPr>
-              <a:t>if </a:t>
-            </a:r>
-            <a:r>
-              <a:rPr lang="en-GB" sz="1100" dirty="0" err="1">
-                <a:latin typeface="Courier New" panose="02070309020205020404" pitchFamily="49" charset="0"/>
-                <a:cs typeface="Courier New" panose="02070309020205020404" pitchFamily="49" charset="0"/>
-              </a:rPr>
-              <a:t>usc</a:t>
-            </a:r>
-            <a:r>
-              <a:rPr lang="en-GB" sz="1100" dirty="0">
-                <a:latin typeface="Courier New" panose="02070309020205020404" pitchFamily="49" charset="0"/>
-                <a:cs typeface="Courier New" panose="02070309020205020404" pitchFamily="49" charset="0"/>
-              </a:rPr>
-              <a:t>[1] == </a:t>
-            </a:r>
-            <a:r>
-              <a:rPr lang="en-GB" sz="1100" dirty="0" err="1">
-                <a:latin typeface="Courier New" panose="02070309020205020404" pitchFamily="49" charset="0"/>
-                <a:cs typeface="Courier New" panose="02070309020205020404" pitchFamily="49" charset="0"/>
-              </a:rPr>
-              <a:t>usc</a:t>
-            </a:r>
-            <a:r>
-              <a:rPr lang="en-GB" sz="1100" dirty="0">
-                <a:latin typeface="Courier New" panose="02070309020205020404" pitchFamily="49" charset="0"/>
-                <a:cs typeface="Courier New" panose="02070309020205020404" pitchFamily="49" charset="0"/>
-              </a:rPr>
-              <a:t>[4]:</a:t>
-            </a:r>
-          </a:p>
-          <a:p>
-            <a:r>
-              <a:rPr lang="en-GB" sz="1100" dirty="0">
-                <a:latin typeface="Courier New" panose="02070309020205020404" pitchFamily="49" charset="0"/>
-                <a:cs typeface="Courier New" panose="02070309020205020404" pitchFamily="49" charset="0"/>
-              </a:rPr>
-              <a:t>    print("The 1st element is equal to the 4th element")</a:t>
-            </a:r>
-          </a:p>
-          <a:p>
-            <a:endParaRPr lang="en-GB" sz="1100" dirty="0">
-              <a:latin typeface="Courier New" panose="02070309020205020404" pitchFamily="49" charset="0"/>
-              <a:cs typeface="Courier New" panose="02070309020205020404" pitchFamily="49" charset="0"/>
-            </a:endParaRPr>
-          </a:p>
-          <a:p>
-            <a:r>
-              <a:rPr lang="en-GB" sz="1100" dirty="0">
-                <a:latin typeface="Courier New" panose="02070309020205020404" pitchFamily="49" charset="0"/>
-                <a:cs typeface="Courier New" panose="02070309020205020404" pitchFamily="49" charset="0"/>
-              </a:rPr>
-              <a:t>if </a:t>
-            </a:r>
-            <a:r>
-              <a:rPr lang="en-GB" sz="1100" dirty="0" err="1">
-                <a:latin typeface="Courier New" panose="02070309020205020404" pitchFamily="49" charset="0"/>
-                <a:cs typeface="Courier New" panose="02070309020205020404" pitchFamily="49" charset="0"/>
-              </a:rPr>
-              <a:t>usc</a:t>
-            </a:r>
-            <a:r>
-              <a:rPr lang="en-GB" sz="1100" dirty="0">
-                <a:latin typeface="Courier New" panose="02070309020205020404" pitchFamily="49" charset="0"/>
-                <a:cs typeface="Courier New" panose="02070309020205020404" pitchFamily="49" charset="0"/>
-              </a:rPr>
-              <a:t>[1] == </a:t>
-            </a:r>
-            <a:r>
-              <a:rPr lang="en-GB" sz="1100" dirty="0" err="1">
-                <a:latin typeface="Courier New" panose="02070309020205020404" pitchFamily="49" charset="0"/>
-                <a:cs typeface="Courier New" panose="02070309020205020404" pitchFamily="49" charset="0"/>
-              </a:rPr>
-              <a:t>usc</a:t>
-            </a:r>
-            <a:r>
-              <a:rPr lang="en-GB" sz="1100" dirty="0">
-                <a:latin typeface="Courier New" panose="02070309020205020404" pitchFamily="49" charset="0"/>
-                <a:cs typeface="Courier New" panose="02070309020205020404" pitchFamily="49" charset="0"/>
-              </a:rPr>
-              <a:t>[5]:</a:t>
-            </a:r>
-          </a:p>
-          <a:p>
-            <a:r>
-              <a:rPr lang="en-GB" sz="1100" dirty="0">
-                <a:latin typeface="Courier New" panose="02070309020205020404" pitchFamily="49" charset="0"/>
-                <a:cs typeface="Courier New" panose="02070309020205020404" pitchFamily="49" charset="0"/>
-              </a:rPr>
-              <a:t>    print("The 1st element is equal to the 5th element")</a:t>
+              <a:rPr lang="fr-FR" dirty="0" err="1">
+                <a:latin typeface="Courier New" panose="02070309020205020404" pitchFamily="49" charset="0"/>
+                <a:cs typeface="Courier New" panose="02070309020205020404" pitchFamily="49" charset="0"/>
+              </a:rPr>
+              <a:t>primes.extend</a:t>
+            </a:r>
+            <a:r>
+              <a:rPr lang="fr-FR" dirty="0">
+                <a:latin typeface="Courier New" panose="02070309020205020404" pitchFamily="49" charset="0"/>
+                <a:cs typeface="Courier New" panose="02070309020205020404" pitchFamily="49" charset="0"/>
+              </a:rPr>
+              <a:t>([23,29,31])</a:t>
+            </a:r>
+          </a:p>
+          <a:p>
+            <a:r>
+              <a:rPr lang="fr-FR" dirty="0" err="1">
+                <a:latin typeface="Courier New" panose="02070309020205020404" pitchFamily="49" charset="0"/>
+                <a:cs typeface="Courier New" panose="02070309020205020404" pitchFamily="49" charset="0"/>
+              </a:rPr>
+              <a:t>print</a:t>
+            </a:r>
+            <a:r>
+              <a:rPr lang="fr-FR" dirty="0">
+                <a:latin typeface="Courier New" panose="02070309020205020404" pitchFamily="49" charset="0"/>
+                <a:cs typeface="Courier New" panose="02070309020205020404" pitchFamily="49" charset="0"/>
+              </a:rPr>
+              <a:t>(primes)</a:t>
             </a:r>
           </a:p>
         </p:txBody>
@@ -11738,13 +11886,20 @@
     </p:spTree>
     <p:extLst>
       <p:ext uri="{BB962C8B-B14F-4D97-AF65-F5344CB8AC3E}">
-        <p14:creationId xmlns:p14="http://schemas.microsoft.com/office/powerpoint/2010/main" val="1721557606"/>
+        <p14:creationId xmlns:p14="http://schemas.microsoft.com/office/powerpoint/2010/main" val="775251862"/>
       </p:ext>
     </p:extLst>
   </p:cSld>
   <p:clrMapOvr>
     <a:masterClrMapping/>
   </p:clrMapOvr>
+  <p:timing>
+    <p:tnLst>
+      <p:par>
+        <p:cTn id="1" dur="indefinite" restart="never" nodeType="tmRoot"/>
+      </p:par>
+    </p:tnLst>
+  </p:timing>
 </p:sld>
 </file>
 
@@ -11782,7 +11937,7 @@
           <a:p>
             <a:r>
               <a:rPr lang="en-GB" dirty="0" smtClean="0"/>
-              <a:t>Iterating Over Lists.</a:t>
+              <a:t>Getting individual elements of a list.</a:t>
             </a:r>
             <a:endParaRPr lang="en-GB" dirty="0"/>
           </a:p>
@@ -11801,84 +11956,471 @@
         <p:spPr>
           <a:xfrm>
             <a:off x="646111" y="1853248"/>
-            <a:ext cx="9920289" cy="4302019"/>
+            <a:ext cx="4171421" cy="4195481"/>
           </a:xfrm>
         </p:spPr>
         <p:txBody>
-          <a:bodyPr>
-            <a:normAutofit/>
+          <a:bodyPr/>
+          <a:lstStyle/>
+          <a:p>
+            <a:r>
+              <a:rPr lang="en-GB" dirty="0" smtClean="0"/>
+              <a:t>We can use a new type of notation to get individual elements of a list.</a:t>
+            </a:r>
+          </a:p>
+          <a:p>
+            <a:r>
+              <a:rPr lang="en-GB" dirty="0" smtClean="0"/>
+              <a:t>If we use square brackets to enclose a number after a list variable, it says to only work on that element of the list.</a:t>
+            </a:r>
+          </a:p>
+          <a:p>
+            <a:r>
+              <a:rPr lang="en-GB" dirty="0" smtClean="0"/>
+              <a:t>The easiest way to understand this is to look at an example.</a:t>
+            </a:r>
+            <a:endParaRPr lang="en-GB" dirty="0"/>
+          </a:p>
+        </p:txBody>
+      </p:sp>
+      <p:sp>
+        <p:nvSpPr>
+          <p:cNvPr id="5" name="Rectangle 4"/>
+          <p:cNvSpPr/>
+          <p:nvPr/>
+        </p:nvSpPr>
+        <p:spPr>
+          <a:xfrm>
+            <a:off x="646112" y="5387291"/>
+            <a:ext cx="6796088" cy="923330"/>
+          </a:xfrm>
+          <a:prstGeom prst="rect">
+            <a:avLst/>
+          </a:prstGeom>
+        </p:spPr>
+        <p:txBody>
+          <a:bodyPr wrap="square">
+            <a:spAutoFit/>
           </a:bodyPr>
           <a:lstStyle/>
           <a:p>
-            <a:r>
-              <a:rPr lang="en-GB" dirty="0" smtClean="0"/>
-              <a:t>You can do an action on every element of a list.</a:t>
-            </a:r>
-          </a:p>
-          <a:p>
-            <a:r>
-              <a:rPr lang="en-GB" dirty="0" smtClean="0"/>
-              <a:t>This is called </a:t>
-            </a:r>
-            <a:r>
-              <a:rPr lang="en-GB" u="sng" dirty="0" smtClean="0"/>
-              <a:t>iterating over</a:t>
-            </a:r>
-            <a:r>
-              <a:rPr lang="en-GB" dirty="0" smtClean="0"/>
-              <a:t> the list.</a:t>
-            </a:r>
-          </a:p>
-          <a:p>
-            <a:r>
-              <a:rPr lang="en-GB" dirty="0" smtClean="0"/>
-              <a:t>We do this with a </a:t>
-            </a:r>
-            <a:r>
-              <a:rPr lang="en-GB" u="sng" dirty="0" smtClean="0"/>
-              <a:t>for loop.</a:t>
-            </a:r>
-          </a:p>
-          <a:p>
-            <a:endParaRPr lang="en-GB" u="sng" dirty="0"/>
-          </a:p>
-          <a:p>
-            <a:r>
-              <a:rPr lang="en-GB" dirty="0" smtClean="0"/>
-              <a:t>In English, we want Python to repeat a </a:t>
-            </a:r>
-            <a:r>
-              <a:rPr lang="en-GB" u="sng" dirty="0" smtClean="0"/>
-              <a:t>block</a:t>
-            </a:r>
-            <a:r>
-              <a:rPr lang="en-GB" b="1" dirty="0" smtClean="0"/>
+            <a:pPr marL="285750" indent="-285750">
+              <a:buFont typeface="Arial" panose="020B0604020202020204" pitchFamily="34" charset="0"/>
+              <a:buChar char="•"/>
+            </a:pPr>
+            <a:r>
+              <a:rPr lang="en-GB" b="1" u="sng" dirty="0">
+                <a:solidFill>
+                  <a:srgbClr val="FFFF00"/>
+                </a:solidFill>
+              </a:rPr>
+              <a:t>TASK:</a:t>
+            </a:r>
+            <a:r>
+              <a:rPr lang="en-GB" dirty="0">
+                <a:solidFill>
+                  <a:srgbClr val="FFFF00"/>
+                </a:solidFill>
+              </a:rPr>
               <a:t> </a:t>
             </a:r>
             <a:r>
-              <a:rPr lang="en-GB" dirty="0" smtClean="0"/>
-              <a:t>of instructions with a variable that changes to the next element of the list each time we go around the loop.</a:t>
-            </a:r>
-          </a:p>
-          <a:p>
-            <a:endParaRPr lang="en-GB" u="sng" dirty="0" smtClean="0"/>
-          </a:p>
-          <a:p>
-            <a:r>
-              <a:rPr lang="en-GB" dirty="0" smtClean="0"/>
-              <a:t>Lets try an example of this.</a:t>
-            </a:r>
-            <a:endParaRPr lang="en-GB" u="sng" dirty="0"/>
-          </a:p>
-          <a:p>
-            <a:endParaRPr lang="en-GB" u="sng" dirty="0"/>
+              <a:rPr lang="en-GB" dirty="0" smtClean="0">
+                <a:solidFill>
+                  <a:srgbClr val="FFFF00"/>
+                </a:solidFill>
+              </a:rPr>
+              <a:t>What do you think this program will do ?</a:t>
+            </a:r>
+          </a:p>
+          <a:p>
+            <a:pPr marL="285750" indent="-285750">
+              <a:buFont typeface="Arial" panose="020B0604020202020204" pitchFamily="34" charset="0"/>
+              <a:buChar char="•"/>
+            </a:pPr>
+            <a:r>
+              <a:rPr lang="en-GB" b="1" u="sng" dirty="0">
+                <a:solidFill>
+                  <a:srgbClr val="FFFF00"/>
+                </a:solidFill>
+              </a:rPr>
+              <a:t>TASK:</a:t>
+            </a:r>
+            <a:r>
+              <a:rPr lang="en-GB" dirty="0">
+                <a:solidFill>
+                  <a:srgbClr val="FFFF00"/>
+                </a:solidFill>
+              </a:rPr>
+              <a:t> </a:t>
+            </a:r>
+            <a:r>
+              <a:rPr lang="en-GB" dirty="0" smtClean="0">
+                <a:solidFill>
+                  <a:srgbClr val="FFFF00"/>
+                </a:solidFill>
+              </a:rPr>
+              <a:t>Type it in and run it and see if you are correct.</a:t>
+            </a:r>
+            <a:endParaRPr lang="en-GB" dirty="0">
+              <a:solidFill>
+                <a:srgbClr val="FFFF00"/>
+              </a:solidFill>
+            </a:endParaRPr>
+          </a:p>
+          <a:p>
+            <a:pPr marL="285750" indent="-285750">
+              <a:buFont typeface="Arial" panose="020B0604020202020204" pitchFamily="34" charset="0"/>
+              <a:buChar char="•"/>
+            </a:pPr>
+            <a:endParaRPr lang="en-GB" dirty="0" smtClean="0">
+              <a:solidFill>
+                <a:srgbClr val="FFFF00"/>
+              </a:solidFill>
+            </a:endParaRPr>
+          </a:p>
+        </p:txBody>
+      </p:sp>
+      <p:sp>
+        <p:nvSpPr>
+          <p:cNvPr id="6" name="Rectangle 5"/>
+          <p:cNvSpPr/>
+          <p:nvPr/>
+        </p:nvSpPr>
+        <p:spPr>
+          <a:xfrm>
+            <a:off x="5297672" y="1736041"/>
+            <a:ext cx="6096000" cy="3308598"/>
+          </a:xfrm>
+          <a:prstGeom prst="rect">
+            <a:avLst/>
+          </a:prstGeom>
+        </p:spPr>
+        <p:txBody>
+          <a:bodyPr>
+            <a:spAutoFit/>
+          </a:bodyPr>
+          <a:lstStyle/>
+          <a:p>
+            <a:r>
+              <a:rPr lang="en-GB" sz="1100" dirty="0">
+                <a:latin typeface="Courier New" panose="02070309020205020404" pitchFamily="49" charset="0"/>
+                <a:cs typeface="Courier New" panose="02070309020205020404" pitchFamily="49" charset="0"/>
+              </a:rPr>
+              <a:t># Week3, Program12</a:t>
+            </a:r>
+          </a:p>
+          <a:p>
+            <a:endParaRPr lang="en-GB" sz="1100" dirty="0">
+              <a:latin typeface="Courier New" panose="02070309020205020404" pitchFamily="49" charset="0"/>
+              <a:cs typeface="Courier New" panose="02070309020205020404" pitchFamily="49" charset="0"/>
+            </a:endParaRPr>
+          </a:p>
+          <a:p>
+            <a:r>
+              <a:rPr lang="en-GB" sz="1100" dirty="0" err="1">
+                <a:latin typeface="Courier New" panose="02070309020205020404" pitchFamily="49" charset="0"/>
+                <a:cs typeface="Courier New" panose="02070309020205020404" pitchFamily="49" charset="0"/>
+              </a:rPr>
+              <a:t>usc</a:t>
+            </a:r>
+            <a:r>
+              <a:rPr lang="en-GB" sz="1100" dirty="0">
+                <a:latin typeface="Courier New" panose="02070309020205020404" pitchFamily="49" charset="0"/>
+                <a:cs typeface="Courier New" panose="02070309020205020404" pitchFamily="49" charset="0"/>
+              </a:rPr>
+              <a:t> = ["We", "The", "People", "Of", "The", "United", "States"]</a:t>
+            </a:r>
+          </a:p>
+          <a:p>
+            <a:endParaRPr lang="en-GB" sz="1100" dirty="0">
+              <a:latin typeface="Courier New" panose="02070309020205020404" pitchFamily="49" charset="0"/>
+              <a:cs typeface="Courier New" panose="02070309020205020404" pitchFamily="49" charset="0"/>
+            </a:endParaRPr>
+          </a:p>
+          <a:p>
+            <a:r>
+              <a:rPr lang="en-GB" sz="1100" dirty="0">
+                <a:latin typeface="Courier New" panose="02070309020205020404" pitchFamily="49" charset="0"/>
+                <a:cs typeface="Courier New" panose="02070309020205020404" pitchFamily="49" charset="0"/>
+              </a:rPr>
+              <a:t>print(</a:t>
+            </a:r>
+            <a:r>
+              <a:rPr lang="en-GB" sz="1100" dirty="0" err="1">
+                <a:latin typeface="Courier New" panose="02070309020205020404" pitchFamily="49" charset="0"/>
+                <a:cs typeface="Courier New" panose="02070309020205020404" pitchFamily="49" charset="0"/>
+              </a:rPr>
+              <a:t>usc</a:t>
+            </a:r>
+            <a:r>
+              <a:rPr lang="en-GB" sz="1100" dirty="0">
+                <a:latin typeface="Courier New" panose="02070309020205020404" pitchFamily="49" charset="0"/>
+                <a:cs typeface="Courier New" panose="02070309020205020404" pitchFamily="49" charset="0"/>
+              </a:rPr>
+              <a:t>)</a:t>
+            </a:r>
+          </a:p>
+          <a:p>
+            <a:r>
+              <a:rPr lang="en-GB" sz="1100" dirty="0">
+                <a:latin typeface="Courier New" panose="02070309020205020404" pitchFamily="49" charset="0"/>
+                <a:cs typeface="Courier New" panose="02070309020205020404" pitchFamily="49" charset="0"/>
+              </a:rPr>
+              <a:t>print(</a:t>
+            </a:r>
+            <a:r>
+              <a:rPr lang="en-GB" sz="1100" dirty="0" err="1">
+                <a:latin typeface="Courier New" panose="02070309020205020404" pitchFamily="49" charset="0"/>
+                <a:cs typeface="Courier New" panose="02070309020205020404" pitchFamily="49" charset="0"/>
+              </a:rPr>
+              <a:t>usc</a:t>
+            </a:r>
+            <a:r>
+              <a:rPr lang="en-GB" sz="1100" dirty="0">
+                <a:latin typeface="Courier New" panose="02070309020205020404" pitchFamily="49" charset="0"/>
+                <a:cs typeface="Courier New" panose="02070309020205020404" pitchFamily="49" charset="0"/>
+              </a:rPr>
+              <a:t>[0])</a:t>
+            </a:r>
+          </a:p>
+          <a:p>
+            <a:r>
+              <a:rPr lang="en-GB" sz="1100" dirty="0">
+                <a:latin typeface="Courier New" panose="02070309020205020404" pitchFamily="49" charset="0"/>
+                <a:cs typeface="Courier New" panose="02070309020205020404" pitchFamily="49" charset="0"/>
+              </a:rPr>
+              <a:t>print(</a:t>
+            </a:r>
+            <a:r>
+              <a:rPr lang="en-GB" sz="1100" dirty="0" err="1">
+                <a:latin typeface="Courier New" panose="02070309020205020404" pitchFamily="49" charset="0"/>
+                <a:cs typeface="Courier New" panose="02070309020205020404" pitchFamily="49" charset="0"/>
+              </a:rPr>
+              <a:t>usc</a:t>
+            </a:r>
+            <a:r>
+              <a:rPr lang="en-GB" sz="1100" dirty="0">
+                <a:latin typeface="Courier New" panose="02070309020205020404" pitchFamily="49" charset="0"/>
+                <a:cs typeface="Courier New" panose="02070309020205020404" pitchFamily="49" charset="0"/>
+              </a:rPr>
+              <a:t>[1])</a:t>
+            </a:r>
+          </a:p>
+          <a:p>
+            <a:endParaRPr lang="en-GB" sz="1100" dirty="0">
+              <a:latin typeface="Courier New" panose="02070309020205020404" pitchFamily="49" charset="0"/>
+              <a:cs typeface="Courier New" panose="02070309020205020404" pitchFamily="49" charset="0"/>
+            </a:endParaRPr>
+          </a:p>
+          <a:p>
+            <a:r>
+              <a:rPr lang="en-GB" sz="1100" dirty="0">
+                <a:latin typeface="Courier New" panose="02070309020205020404" pitchFamily="49" charset="0"/>
+                <a:cs typeface="Courier New" panose="02070309020205020404" pitchFamily="49" charset="0"/>
+              </a:rPr>
+              <a:t>if </a:t>
+            </a:r>
+            <a:r>
+              <a:rPr lang="en-GB" sz="1100" dirty="0" err="1">
+                <a:latin typeface="Courier New" panose="02070309020205020404" pitchFamily="49" charset="0"/>
+                <a:cs typeface="Courier New" panose="02070309020205020404" pitchFamily="49" charset="0"/>
+              </a:rPr>
+              <a:t>usc</a:t>
+            </a:r>
+            <a:r>
+              <a:rPr lang="en-GB" sz="1100" dirty="0">
+                <a:latin typeface="Courier New" panose="02070309020205020404" pitchFamily="49" charset="0"/>
+                <a:cs typeface="Courier New" panose="02070309020205020404" pitchFamily="49" charset="0"/>
+              </a:rPr>
+              <a:t>[0] == </a:t>
+            </a:r>
+            <a:r>
+              <a:rPr lang="en-GB" sz="1100" dirty="0" err="1">
+                <a:latin typeface="Courier New" panose="02070309020205020404" pitchFamily="49" charset="0"/>
+                <a:cs typeface="Courier New" panose="02070309020205020404" pitchFamily="49" charset="0"/>
+              </a:rPr>
+              <a:t>usc</a:t>
+            </a:r>
+            <a:r>
+              <a:rPr lang="en-GB" sz="1100" dirty="0">
+                <a:latin typeface="Courier New" panose="02070309020205020404" pitchFamily="49" charset="0"/>
+                <a:cs typeface="Courier New" panose="02070309020205020404" pitchFamily="49" charset="0"/>
+              </a:rPr>
+              <a:t>[1]:</a:t>
+            </a:r>
+          </a:p>
+          <a:p>
+            <a:r>
+              <a:rPr lang="en-GB" sz="1100" dirty="0">
+                <a:latin typeface="Courier New" panose="02070309020205020404" pitchFamily="49" charset="0"/>
+                <a:cs typeface="Courier New" panose="02070309020205020404" pitchFamily="49" charset="0"/>
+              </a:rPr>
+              <a:t>    print("The 0th element is equal to the 1st element")</a:t>
+            </a:r>
+          </a:p>
+          <a:p>
+            <a:endParaRPr lang="en-GB" sz="1100" dirty="0">
+              <a:latin typeface="Courier New" panose="02070309020205020404" pitchFamily="49" charset="0"/>
+              <a:cs typeface="Courier New" panose="02070309020205020404" pitchFamily="49" charset="0"/>
+            </a:endParaRPr>
+          </a:p>
+          <a:p>
+            <a:r>
+              <a:rPr lang="en-GB" sz="1100" dirty="0">
+                <a:latin typeface="Courier New" panose="02070309020205020404" pitchFamily="49" charset="0"/>
+                <a:cs typeface="Courier New" panose="02070309020205020404" pitchFamily="49" charset="0"/>
+              </a:rPr>
+              <a:t>if </a:t>
+            </a:r>
+            <a:r>
+              <a:rPr lang="en-GB" sz="1100" dirty="0" err="1">
+                <a:latin typeface="Courier New" panose="02070309020205020404" pitchFamily="49" charset="0"/>
+                <a:cs typeface="Courier New" panose="02070309020205020404" pitchFamily="49" charset="0"/>
+              </a:rPr>
+              <a:t>usc</a:t>
+            </a:r>
+            <a:r>
+              <a:rPr lang="en-GB" sz="1100" dirty="0">
+                <a:latin typeface="Courier New" panose="02070309020205020404" pitchFamily="49" charset="0"/>
+                <a:cs typeface="Courier New" panose="02070309020205020404" pitchFamily="49" charset="0"/>
+              </a:rPr>
+              <a:t>[0] == </a:t>
+            </a:r>
+            <a:r>
+              <a:rPr lang="en-GB" sz="1100" dirty="0" err="1">
+                <a:latin typeface="Courier New" panose="02070309020205020404" pitchFamily="49" charset="0"/>
+                <a:cs typeface="Courier New" panose="02070309020205020404" pitchFamily="49" charset="0"/>
+              </a:rPr>
+              <a:t>usc</a:t>
+            </a:r>
+            <a:r>
+              <a:rPr lang="en-GB" sz="1100" dirty="0">
+                <a:latin typeface="Courier New" panose="02070309020205020404" pitchFamily="49" charset="0"/>
+                <a:cs typeface="Courier New" panose="02070309020205020404" pitchFamily="49" charset="0"/>
+              </a:rPr>
+              <a:t>[4]:</a:t>
+            </a:r>
+          </a:p>
+          <a:p>
+            <a:r>
+              <a:rPr lang="en-GB" sz="1100" dirty="0">
+                <a:latin typeface="Courier New" panose="02070309020205020404" pitchFamily="49" charset="0"/>
+                <a:cs typeface="Courier New" panose="02070309020205020404" pitchFamily="49" charset="0"/>
+              </a:rPr>
+              <a:t>    print("The 0th element is equal to the 4th element")</a:t>
+            </a:r>
+          </a:p>
+          <a:p>
+            <a:endParaRPr lang="en-GB" sz="1100" dirty="0">
+              <a:latin typeface="Courier New" panose="02070309020205020404" pitchFamily="49" charset="0"/>
+              <a:cs typeface="Courier New" panose="02070309020205020404" pitchFamily="49" charset="0"/>
+            </a:endParaRPr>
+          </a:p>
+          <a:p>
+            <a:r>
+              <a:rPr lang="en-GB" sz="1100" dirty="0">
+                <a:latin typeface="Courier New" panose="02070309020205020404" pitchFamily="49" charset="0"/>
+                <a:cs typeface="Courier New" panose="02070309020205020404" pitchFamily="49" charset="0"/>
+              </a:rPr>
+              <a:t>if </a:t>
+            </a:r>
+            <a:r>
+              <a:rPr lang="en-GB" sz="1100" dirty="0" err="1">
+                <a:latin typeface="Courier New" panose="02070309020205020404" pitchFamily="49" charset="0"/>
+                <a:cs typeface="Courier New" panose="02070309020205020404" pitchFamily="49" charset="0"/>
+              </a:rPr>
+              <a:t>usc</a:t>
+            </a:r>
+            <a:r>
+              <a:rPr lang="en-GB" sz="1100" dirty="0">
+                <a:latin typeface="Courier New" panose="02070309020205020404" pitchFamily="49" charset="0"/>
+                <a:cs typeface="Courier New" panose="02070309020205020404" pitchFamily="49" charset="0"/>
+              </a:rPr>
+              <a:t>[1] == </a:t>
+            </a:r>
+            <a:r>
+              <a:rPr lang="en-GB" sz="1100" dirty="0" err="1">
+                <a:latin typeface="Courier New" panose="02070309020205020404" pitchFamily="49" charset="0"/>
+                <a:cs typeface="Courier New" panose="02070309020205020404" pitchFamily="49" charset="0"/>
+              </a:rPr>
+              <a:t>usc</a:t>
+            </a:r>
+            <a:r>
+              <a:rPr lang="en-GB" sz="1100" dirty="0">
+                <a:latin typeface="Courier New" panose="02070309020205020404" pitchFamily="49" charset="0"/>
+                <a:cs typeface="Courier New" panose="02070309020205020404" pitchFamily="49" charset="0"/>
+              </a:rPr>
+              <a:t>[4]:</a:t>
+            </a:r>
+          </a:p>
+          <a:p>
+            <a:r>
+              <a:rPr lang="en-GB" sz="1100" dirty="0">
+                <a:latin typeface="Courier New" panose="02070309020205020404" pitchFamily="49" charset="0"/>
+                <a:cs typeface="Courier New" panose="02070309020205020404" pitchFamily="49" charset="0"/>
+              </a:rPr>
+              <a:t>    print("The 1st element is equal to the 4th element")</a:t>
+            </a:r>
+          </a:p>
+          <a:p>
+            <a:endParaRPr lang="en-GB" sz="1100" dirty="0">
+              <a:latin typeface="Courier New" panose="02070309020205020404" pitchFamily="49" charset="0"/>
+              <a:cs typeface="Courier New" panose="02070309020205020404" pitchFamily="49" charset="0"/>
+            </a:endParaRPr>
+          </a:p>
+          <a:p>
+            <a:r>
+              <a:rPr lang="en-GB" sz="1100" dirty="0">
+                <a:latin typeface="Courier New" panose="02070309020205020404" pitchFamily="49" charset="0"/>
+                <a:cs typeface="Courier New" panose="02070309020205020404" pitchFamily="49" charset="0"/>
+              </a:rPr>
+              <a:t>if </a:t>
+            </a:r>
+            <a:r>
+              <a:rPr lang="en-GB" sz="1100" dirty="0" err="1">
+                <a:latin typeface="Courier New" panose="02070309020205020404" pitchFamily="49" charset="0"/>
+                <a:cs typeface="Courier New" panose="02070309020205020404" pitchFamily="49" charset="0"/>
+              </a:rPr>
+              <a:t>usc</a:t>
+            </a:r>
+            <a:r>
+              <a:rPr lang="en-GB" sz="1100" dirty="0">
+                <a:latin typeface="Courier New" panose="02070309020205020404" pitchFamily="49" charset="0"/>
+                <a:cs typeface="Courier New" panose="02070309020205020404" pitchFamily="49" charset="0"/>
+              </a:rPr>
+              <a:t>[1] == </a:t>
+            </a:r>
+            <a:r>
+              <a:rPr lang="en-GB" sz="1100" dirty="0" err="1">
+                <a:latin typeface="Courier New" panose="02070309020205020404" pitchFamily="49" charset="0"/>
+                <a:cs typeface="Courier New" panose="02070309020205020404" pitchFamily="49" charset="0"/>
+              </a:rPr>
+              <a:t>usc</a:t>
+            </a:r>
+            <a:r>
+              <a:rPr lang="en-GB" sz="1100" dirty="0">
+                <a:latin typeface="Courier New" panose="02070309020205020404" pitchFamily="49" charset="0"/>
+                <a:cs typeface="Courier New" panose="02070309020205020404" pitchFamily="49" charset="0"/>
+              </a:rPr>
+              <a:t>[5]:</a:t>
+            </a:r>
+          </a:p>
+          <a:p>
+            <a:r>
+              <a:rPr lang="en-GB" sz="1100" dirty="0">
+                <a:latin typeface="Courier New" panose="02070309020205020404" pitchFamily="49" charset="0"/>
+                <a:cs typeface="Courier New" panose="02070309020205020404" pitchFamily="49" charset="0"/>
+              </a:rPr>
+              <a:t>    print("The 1st element is equal to the 5th element")</a:t>
+            </a:r>
           </a:p>
         </p:txBody>
       </p:sp>
     </p:spTree>
     <p:extLst>
       <p:ext uri="{BB962C8B-B14F-4D97-AF65-F5344CB8AC3E}">
-        <p14:creationId xmlns:p14="http://schemas.microsoft.com/office/powerpoint/2010/main" val="2187723298"/>
+        <p14:creationId xmlns:p14="http://schemas.microsoft.com/office/powerpoint/2010/main" val="1721557606"/>
       </p:ext>
     </p:extLst>
   </p:cSld>
@@ -11922,7 +12464,7 @@
           <a:p>
             <a:r>
               <a:rPr lang="en-GB" dirty="0" smtClean="0"/>
-              <a:t>Iteration Example.</a:t>
+              <a:t>Iterating Over Lists.</a:t>
             </a:r>
             <a:endParaRPr lang="en-GB" dirty="0"/>
           </a:p>
@@ -11930,215 +12472,95 @@
       </p:sp>
       <p:sp>
         <p:nvSpPr>
-          <p:cNvPr id="5" name="Rectangle 4"/>
-          <p:cNvSpPr/>
-          <p:nvPr/>
+          <p:cNvPr id="3" name="Content Placeholder 2"/>
+          <p:cNvSpPr>
+            <a:spLocks noGrp="1"/>
+          </p:cNvSpPr>
+          <p:nvPr>
+            <p:ph idx="1"/>
+          </p:nvPr>
         </p:nvSpPr>
         <p:spPr>
           <a:xfrm>
-            <a:off x="730779" y="5254326"/>
-            <a:ext cx="6796088" cy="923330"/>
+            <a:off x="646111" y="1853248"/>
+            <a:ext cx="9920289" cy="4302019"/>
           </a:xfrm>
-          <a:prstGeom prst="rect">
-            <a:avLst/>
-          </a:prstGeom>
         </p:spPr>
         <p:txBody>
-          <a:bodyPr wrap="square">
-            <a:spAutoFit/>
+          <a:bodyPr>
+            <a:normAutofit/>
           </a:bodyPr>
           <a:lstStyle/>
           <a:p>
-            <a:pPr marL="285750" indent="-285750">
-              <a:buFont typeface="Arial" panose="020B0604020202020204" pitchFamily="34" charset="0"/>
-              <a:buChar char="•"/>
-            </a:pPr>
-            <a:r>
-              <a:rPr lang="en-GB" b="1" u="sng" dirty="0">
-                <a:solidFill>
-                  <a:srgbClr val="FFFF00"/>
-                </a:solidFill>
-              </a:rPr>
-              <a:t>TASK:</a:t>
-            </a:r>
-            <a:r>
-              <a:rPr lang="en-GB" dirty="0">
-                <a:solidFill>
-                  <a:srgbClr val="FFFF00"/>
-                </a:solidFill>
-              </a:rPr>
+            <a:r>
+              <a:rPr lang="en-GB" dirty="0" smtClean="0"/>
+              <a:t>You can do an action on every element of a list.</a:t>
+            </a:r>
+          </a:p>
+          <a:p>
+            <a:r>
+              <a:rPr lang="en-GB" dirty="0" smtClean="0"/>
+              <a:t>This is called </a:t>
+            </a:r>
+            <a:r>
+              <a:rPr lang="en-GB" u="sng" dirty="0" smtClean="0"/>
+              <a:t>iterating over</a:t>
+            </a:r>
+            <a:r>
+              <a:rPr lang="en-GB" dirty="0" smtClean="0"/>
+              <a:t> the list.</a:t>
+            </a:r>
+          </a:p>
+          <a:p>
+            <a:r>
+              <a:rPr lang="en-GB" dirty="0" smtClean="0"/>
+              <a:t>We do this with a </a:t>
+            </a:r>
+            <a:r>
+              <a:rPr lang="en-GB" u="sng" dirty="0" smtClean="0"/>
+              <a:t>for loop.</a:t>
+            </a:r>
+          </a:p>
+          <a:p>
+            <a:endParaRPr lang="en-GB" u="sng" dirty="0"/>
+          </a:p>
+          <a:p>
+            <a:r>
+              <a:rPr lang="en-GB" dirty="0" smtClean="0"/>
+              <a:t>In English, we want Python to repeat a </a:t>
+            </a:r>
+            <a:r>
+              <a:rPr lang="en-GB" u="sng" dirty="0" smtClean="0"/>
+              <a:t>block</a:t>
+            </a:r>
+            <a:r>
+              <a:rPr lang="en-GB" b="1" dirty="0" smtClean="0"/>
               <a:t> </a:t>
             </a:r>
             <a:r>
-              <a:rPr lang="en-GB" dirty="0" smtClean="0">
-                <a:solidFill>
-                  <a:srgbClr val="FFFF00"/>
-                </a:solidFill>
-              </a:rPr>
-              <a:t>What do you think this program will do ?</a:t>
-            </a:r>
-          </a:p>
-          <a:p>
-            <a:pPr marL="285750" indent="-285750">
-              <a:buFont typeface="Arial" panose="020B0604020202020204" pitchFamily="34" charset="0"/>
-              <a:buChar char="•"/>
-            </a:pPr>
-            <a:r>
-              <a:rPr lang="en-GB" b="1" u="sng" dirty="0">
-                <a:solidFill>
-                  <a:srgbClr val="FFFF00"/>
-                </a:solidFill>
-              </a:rPr>
-              <a:t>TASK:</a:t>
-            </a:r>
-            <a:r>
-              <a:rPr lang="en-GB" dirty="0">
-                <a:solidFill>
-                  <a:srgbClr val="FFFF00"/>
-                </a:solidFill>
-              </a:rPr>
-              <a:t> </a:t>
-            </a:r>
-            <a:r>
-              <a:rPr lang="en-GB" dirty="0" smtClean="0">
-                <a:solidFill>
-                  <a:srgbClr val="FFFF00"/>
-                </a:solidFill>
-              </a:rPr>
-              <a:t>Type it in and run it and see if you are correct.</a:t>
-            </a:r>
-            <a:endParaRPr lang="en-GB" dirty="0">
-              <a:solidFill>
-                <a:srgbClr val="FFFF00"/>
-              </a:solidFill>
-            </a:endParaRPr>
-          </a:p>
-          <a:p>
-            <a:pPr marL="285750" indent="-285750">
-              <a:buFont typeface="Arial" panose="020B0604020202020204" pitchFamily="34" charset="0"/>
-              <a:buChar char="•"/>
-            </a:pPr>
-            <a:endParaRPr lang="en-GB" dirty="0" smtClean="0">
-              <a:solidFill>
-                <a:srgbClr val="FFFF00"/>
-              </a:solidFill>
-            </a:endParaRPr>
-          </a:p>
-        </p:txBody>
-      </p:sp>
-      <p:sp>
-        <p:nvSpPr>
-          <p:cNvPr id="8" name="Rectangle 7"/>
-          <p:cNvSpPr/>
-          <p:nvPr/>
-        </p:nvSpPr>
-        <p:spPr>
-          <a:xfrm>
-            <a:off x="872067" y="1853248"/>
-            <a:ext cx="7112000" cy="2462213"/>
-          </a:xfrm>
-          <a:prstGeom prst="rect">
-            <a:avLst/>
-          </a:prstGeom>
-        </p:spPr>
-        <p:txBody>
-          <a:bodyPr wrap="square">
-            <a:spAutoFit/>
-          </a:bodyPr>
-          <a:lstStyle/>
-          <a:p>
-            <a:r>
-              <a:rPr lang="en-GB" sz="1400" dirty="0">
-                <a:latin typeface="Courier New" panose="02070309020205020404" pitchFamily="49" charset="0"/>
-                <a:cs typeface="Courier New" panose="02070309020205020404" pitchFamily="49" charset="0"/>
-              </a:rPr>
-              <a:t># Week3, Program13</a:t>
-            </a:r>
-          </a:p>
-          <a:p>
-            <a:endParaRPr lang="en-GB" sz="1400" dirty="0">
-              <a:latin typeface="Courier New" panose="02070309020205020404" pitchFamily="49" charset="0"/>
-              <a:cs typeface="Courier New" panose="02070309020205020404" pitchFamily="49" charset="0"/>
-            </a:endParaRPr>
-          </a:p>
-          <a:p>
-            <a:r>
-              <a:rPr lang="en-GB" sz="1400" dirty="0">
-                <a:latin typeface="Courier New" panose="02070309020205020404" pitchFamily="49" charset="0"/>
-                <a:cs typeface="Courier New" panose="02070309020205020404" pitchFamily="49" charset="0"/>
-              </a:rPr>
-              <a:t>planets = ["Mercury", "Venus", "Earth", "Mars", "Jupiter"]</a:t>
-            </a:r>
-          </a:p>
-          <a:p>
-            <a:endParaRPr lang="en-GB" sz="1400" dirty="0">
-              <a:latin typeface="Courier New" panose="02070309020205020404" pitchFamily="49" charset="0"/>
-              <a:cs typeface="Courier New" panose="02070309020205020404" pitchFamily="49" charset="0"/>
-            </a:endParaRPr>
-          </a:p>
-          <a:p>
-            <a:r>
-              <a:rPr lang="en-GB" sz="1400" dirty="0">
-                <a:latin typeface="Courier New" panose="02070309020205020404" pitchFamily="49" charset="0"/>
-                <a:cs typeface="Courier New" panose="02070309020205020404" pitchFamily="49" charset="0"/>
-              </a:rPr>
-              <a:t>for planet in planets:</a:t>
-            </a:r>
-          </a:p>
-          <a:p>
-            <a:r>
-              <a:rPr lang="en-GB" sz="1400" dirty="0">
-                <a:latin typeface="Courier New" panose="02070309020205020404" pitchFamily="49" charset="0"/>
-                <a:cs typeface="Courier New" panose="02070309020205020404" pitchFamily="49" charset="0"/>
-              </a:rPr>
-              <a:t>    print(planet)</a:t>
-            </a:r>
-          </a:p>
-          <a:p>
-            <a:endParaRPr lang="en-GB" sz="1400" dirty="0">
-              <a:latin typeface="Courier New" panose="02070309020205020404" pitchFamily="49" charset="0"/>
-              <a:cs typeface="Courier New" panose="02070309020205020404" pitchFamily="49" charset="0"/>
-            </a:endParaRPr>
-          </a:p>
-          <a:p>
-            <a:r>
-              <a:rPr lang="en-GB" sz="1400" dirty="0">
-                <a:latin typeface="Courier New" panose="02070309020205020404" pitchFamily="49" charset="0"/>
-                <a:cs typeface="Courier New" panose="02070309020205020404" pitchFamily="49" charset="0"/>
-              </a:rPr>
-              <a:t>primes = [2, 3, 5, 7, 11, 13, 17]</a:t>
-            </a:r>
-          </a:p>
-          <a:p>
-            <a:endParaRPr lang="en-GB" sz="1400" dirty="0">
-              <a:latin typeface="Courier New" panose="02070309020205020404" pitchFamily="49" charset="0"/>
-              <a:cs typeface="Courier New" panose="02070309020205020404" pitchFamily="49" charset="0"/>
-            </a:endParaRPr>
-          </a:p>
-          <a:p>
-            <a:r>
-              <a:rPr lang="en-GB" sz="1400" dirty="0">
-                <a:latin typeface="Courier New" panose="02070309020205020404" pitchFamily="49" charset="0"/>
-                <a:cs typeface="Courier New" panose="02070309020205020404" pitchFamily="49" charset="0"/>
-              </a:rPr>
-              <a:t>for prime in primes:</a:t>
-            </a:r>
-          </a:p>
-          <a:p>
-            <a:r>
-              <a:rPr lang="en-GB" sz="1400" dirty="0">
-                <a:latin typeface="Courier New" panose="02070309020205020404" pitchFamily="49" charset="0"/>
-                <a:cs typeface="Courier New" panose="02070309020205020404" pitchFamily="49" charset="0"/>
-              </a:rPr>
-              <a:t>    print(f"{prime} * 2 = {prime * 2}")</a:t>
-            </a:r>
+              <a:rPr lang="en-GB" dirty="0" smtClean="0"/>
+              <a:t>of instructions with a variable that changes to the next element of the list each time we go around the loop.</a:t>
+            </a:r>
+          </a:p>
+          <a:p>
+            <a:endParaRPr lang="en-GB" u="sng" dirty="0" smtClean="0"/>
+          </a:p>
+          <a:p>
+            <a:r>
+              <a:rPr lang="en-GB" dirty="0" smtClean="0"/>
+              <a:t>Lets try an example of this.</a:t>
+            </a:r>
+            <a:endParaRPr lang="en-GB" u="sng" dirty="0"/>
+          </a:p>
+          <a:p>
+            <a:endParaRPr lang="en-GB" u="sng" dirty="0"/>
           </a:p>
         </p:txBody>
       </p:sp>
     </p:spTree>
     <p:extLst>
       <p:ext uri="{BB962C8B-B14F-4D97-AF65-F5344CB8AC3E}">
-        <p14:creationId xmlns:p14="http://schemas.microsoft.com/office/powerpoint/2010/main" val="4214590791"/>
+        <p14:creationId xmlns:p14="http://schemas.microsoft.com/office/powerpoint/2010/main" val="2187723298"/>
       </p:ext>
     </p:extLst>
   </p:cSld>
@@ -12182,13 +12604,348 @@
           <a:p>
             <a:r>
               <a:rPr lang="en-GB" dirty="0" smtClean="0"/>
-              <a:t>Homework Time </a:t>
+              <a:t>Iteration Example.</a:t>
+            </a:r>
+            <a:endParaRPr lang="en-GB" dirty="0"/>
+          </a:p>
+        </p:txBody>
+      </p:sp>
+      <p:sp>
+        <p:nvSpPr>
+          <p:cNvPr id="5" name="Rectangle 4"/>
+          <p:cNvSpPr/>
+          <p:nvPr/>
+        </p:nvSpPr>
+        <p:spPr>
+          <a:xfrm>
+            <a:off x="730779" y="5254326"/>
+            <a:ext cx="6796088" cy="923330"/>
+          </a:xfrm>
+          <a:prstGeom prst="rect">
+            <a:avLst/>
+          </a:prstGeom>
+        </p:spPr>
+        <p:txBody>
+          <a:bodyPr wrap="square">
+            <a:spAutoFit/>
+          </a:bodyPr>
+          <a:lstStyle/>
+          <a:p>
+            <a:pPr marL="285750" indent="-285750">
+              <a:buFont typeface="Arial" panose="020B0604020202020204" pitchFamily="34" charset="0"/>
+              <a:buChar char="•"/>
+            </a:pPr>
+            <a:r>
+              <a:rPr lang="en-GB" b="1" u="sng" dirty="0">
+                <a:solidFill>
+                  <a:srgbClr val="FFFF00"/>
+                </a:solidFill>
+              </a:rPr>
+              <a:t>TASK:</a:t>
+            </a:r>
+            <a:r>
+              <a:rPr lang="en-GB" dirty="0">
+                <a:solidFill>
+                  <a:srgbClr val="FFFF00"/>
+                </a:solidFill>
+              </a:rPr>
+              <a:t> </a:t>
             </a:r>
             <a:r>
               <a:rPr lang="en-GB" dirty="0" smtClean="0">
-                <a:sym typeface="Wingdings" panose="05000000000000000000" pitchFamily="2" charset="2"/>
-              </a:rPr>
-              <a:t>(Program 10).</a:t>
+                <a:solidFill>
+                  <a:srgbClr val="FFFF00"/>
+                </a:solidFill>
+              </a:rPr>
+              <a:t>What do you think this program will do ?</a:t>
+            </a:r>
+          </a:p>
+          <a:p>
+            <a:pPr marL="285750" indent="-285750">
+              <a:buFont typeface="Arial" panose="020B0604020202020204" pitchFamily="34" charset="0"/>
+              <a:buChar char="•"/>
+            </a:pPr>
+            <a:r>
+              <a:rPr lang="en-GB" b="1" u="sng" dirty="0">
+                <a:solidFill>
+                  <a:srgbClr val="FFFF00"/>
+                </a:solidFill>
+              </a:rPr>
+              <a:t>TASK:</a:t>
+            </a:r>
+            <a:r>
+              <a:rPr lang="en-GB" dirty="0">
+                <a:solidFill>
+                  <a:srgbClr val="FFFF00"/>
+                </a:solidFill>
+              </a:rPr>
+              <a:t> </a:t>
+            </a:r>
+            <a:r>
+              <a:rPr lang="en-GB" dirty="0" smtClean="0">
+                <a:solidFill>
+                  <a:srgbClr val="FFFF00"/>
+                </a:solidFill>
+              </a:rPr>
+              <a:t>Type it in and run it and see if you are correct.</a:t>
+            </a:r>
+            <a:endParaRPr lang="en-GB" dirty="0">
+              <a:solidFill>
+                <a:srgbClr val="FFFF00"/>
+              </a:solidFill>
+            </a:endParaRPr>
+          </a:p>
+          <a:p>
+            <a:pPr marL="285750" indent="-285750">
+              <a:buFont typeface="Arial" panose="020B0604020202020204" pitchFamily="34" charset="0"/>
+              <a:buChar char="•"/>
+            </a:pPr>
+            <a:endParaRPr lang="en-GB" dirty="0" smtClean="0">
+              <a:solidFill>
+                <a:srgbClr val="FFFF00"/>
+              </a:solidFill>
+            </a:endParaRPr>
+          </a:p>
+        </p:txBody>
+      </p:sp>
+      <p:sp>
+        <p:nvSpPr>
+          <p:cNvPr id="8" name="Rectangle 7"/>
+          <p:cNvSpPr/>
+          <p:nvPr/>
+        </p:nvSpPr>
+        <p:spPr>
+          <a:xfrm>
+            <a:off x="872067" y="1853248"/>
+            <a:ext cx="7112000" cy="2462213"/>
+          </a:xfrm>
+          <a:prstGeom prst="rect">
+            <a:avLst/>
+          </a:prstGeom>
+        </p:spPr>
+        <p:txBody>
+          <a:bodyPr wrap="square">
+            <a:spAutoFit/>
+          </a:bodyPr>
+          <a:lstStyle/>
+          <a:p>
+            <a:r>
+              <a:rPr lang="en-GB" sz="1400" dirty="0">
+                <a:latin typeface="Courier New" panose="02070309020205020404" pitchFamily="49" charset="0"/>
+                <a:cs typeface="Courier New" panose="02070309020205020404" pitchFamily="49" charset="0"/>
+              </a:rPr>
+              <a:t># Week3, Program13</a:t>
+            </a:r>
+          </a:p>
+          <a:p>
+            <a:endParaRPr lang="en-GB" sz="1400" dirty="0">
+              <a:latin typeface="Courier New" panose="02070309020205020404" pitchFamily="49" charset="0"/>
+              <a:cs typeface="Courier New" panose="02070309020205020404" pitchFamily="49" charset="0"/>
+            </a:endParaRPr>
+          </a:p>
+          <a:p>
+            <a:r>
+              <a:rPr lang="en-GB" sz="1400" dirty="0">
+                <a:latin typeface="Courier New" panose="02070309020205020404" pitchFamily="49" charset="0"/>
+                <a:cs typeface="Courier New" panose="02070309020205020404" pitchFamily="49" charset="0"/>
+              </a:rPr>
+              <a:t>planets = ["Mercury", "Venus", "Earth", "Mars", "Jupiter"]</a:t>
+            </a:r>
+          </a:p>
+          <a:p>
+            <a:endParaRPr lang="en-GB" sz="1400" dirty="0">
+              <a:latin typeface="Courier New" panose="02070309020205020404" pitchFamily="49" charset="0"/>
+              <a:cs typeface="Courier New" panose="02070309020205020404" pitchFamily="49" charset="0"/>
+            </a:endParaRPr>
+          </a:p>
+          <a:p>
+            <a:r>
+              <a:rPr lang="en-GB" sz="1400" dirty="0">
+                <a:latin typeface="Courier New" panose="02070309020205020404" pitchFamily="49" charset="0"/>
+                <a:cs typeface="Courier New" panose="02070309020205020404" pitchFamily="49" charset="0"/>
+              </a:rPr>
+              <a:t>for planet in planets:</a:t>
+            </a:r>
+          </a:p>
+          <a:p>
+            <a:r>
+              <a:rPr lang="en-GB" sz="1400" dirty="0">
+                <a:latin typeface="Courier New" panose="02070309020205020404" pitchFamily="49" charset="0"/>
+                <a:cs typeface="Courier New" panose="02070309020205020404" pitchFamily="49" charset="0"/>
+              </a:rPr>
+              <a:t>    print(planet)</a:t>
+            </a:r>
+          </a:p>
+          <a:p>
+            <a:endParaRPr lang="en-GB" sz="1400" dirty="0">
+              <a:latin typeface="Courier New" panose="02070309020205020404" pitchFamily="49" charset="0"/>
+              <a:cs typeface="Courier New" panose="02070309020205020404" pitchFamily="49" charset="0"/>
+            </a:endParaRPr>
+          </a:p>
+          <a:p>
+            <a:r>
+              <a:rPr lang="en-GB" sz="1400" dirty="0">
+                <a:latin typeface="Courier New" panose="02070309020205020404" pitchFamily="49" charset="0"/>
+                <a:cs typeface="Courier New" panose="02070309020205020404" pitchFamily="49" charset="0"/>
+              </a:rPr>
+              <a:t>primes = [2, 3, 5, 7, 11, 13, 17]</a:t>
+            </a:r>
+          </a:p>
+          <a:p>
+            <a:endParaRPr lang="en-GB" sz="1400" dirty="0">
+              <a:latin typeface="Courier New" panose="02070309020205020404" pitchFamily="49" charset="0"/>
+              <a:cs typeface="Courier New" panose="02070309020205020404" pitchFamily="49" charset="0"/>
+            </a:endParaRPr>
+          </a:p>
+          <a:p>
+            <a:r>
+              <a:rPr lang="en-GB" sz="1400" dirty="0">
+                <a:latin typeface="Courier New" panose="02070309020205020404" pitchFamily="49" charset="0"/>
+                <a:cs typeface="Courier New" panose="02070309020205020404" pitchFamily="49" charset="0"/>
+              </a:rPr>
+              <a:t>for prime in primes:</a:t>
+            </a:r>
+          </a:p>
+          <a:p>
+            <a:r>
+              <a:rPr lang="en-GB" sz="1400" dirty="0">
+                <a:latin typeface="Courier New" panose="02070309020205020404" pitchFamily="49" charset="0"/>
+                <a:cs typeface="Courier New" panose="02070309020205020404" pitchFamily="49" charset="0"/>
+              </a:rPr>
+              <a:t>    print(f"{prime} * 2 = {prime * 2}")</a:t>
+            </a:r>
+          </a:p>
+        </p:txBody>
+      </p:sp>
+    </p:spTree>
+    <p:extLst>
+      <p:ext uri="{BB962C8B-B14F-4D97-AF65-F5344CB8AC3E}">
+        <p14:creationId xmlns:p14="http://schemas.microsoft.com/office/powerpoint/2010/main" val="4214590791"/>
+      </p:ext>
+    </p:extLst>
+  </p:cSld>
+  <p:clrMapOvr>
+    <a:masterClrMapping/>
+  </p:clrMapOvr>
+</p:sld>
+</file>
+
+<file path=ppt/slides/slide26.xml><?xml version="1.0" encoding="utf-8"?>
+<p:sld xmlns:a="http://schemas.openxmlformats.org/drawingml/2006/main" xmlns:r="http://schemas.openxmlformats.org/officeDocument/2006/relationships" xmlns:p="http://schemas.openxmlformats.org/presentationml/2006/main">
+  <p:cSld>
+    <p:spTree>
+      <p:nvGrpSpPr>
+        <p:cNvPr id="1" name=""/>
+        <p:cNvGrpSpPr/>
+        <p:nvPr/>
+      </p:nvGrpSpPr>
+      <p:grpSpPr>
+        <a:xfrm>
+          <a:off x="0" y="0"/>
+          <a:ext cx="0" cy="0"/>
+          <a:chOff x="0" y="0"/>
+          <a:chExt cx="0" cy="0"/>
+        </a:xfrm>
+      </p:grpSpPr>
+      <p:sp>
+        <p:nvSpPr>
+          <p:cNvPr id="2" name="Title 1"/>
+          <p:cNvSpPr>
+            <a:spLocks noGrp="1"/>
+          </p:cNvSpPr>
+          <p:nvPr>
+            <p:ph type="title"/>
+          </p:nvPr>
+        </p:nvSpPr>
+        <p:spPr>
+          <a:xfrm>
+            <a:off x="1154955" y="296333"/>
+            <a:ext cx="8825657" cy="1915647"/>
+          </a:xfrm>
+        </p:spPr>
+        <p:txBody>
+          <a:bodyPr/>
+          <a:lstStyle/>
+          <a:p>
+            <a:r>
+              <a:rPr lang="en-GB" dirty="0" smtClean="0"/>
+              <a:t>Homework</a:t>
+            </a:r>
+            <a:endParaRPr lang="en-GB" dirty="0"/>
+          </a:p>
+        </p:txBody>
+      </p:sp>
+      <p:sp>
+        <p:nvSpPr>
+          <p:cNvPr id="3" name="Text Placeholder 2"/>
+          <p:cNvSpPr>
+            <a:spLocks noGrp="1"/>
+          </p:cNvSpPr>
+          <p:nvPr>
+            <p:ph type="body" idx="1"/>
+          </p:nvPr>
+        </p:nvSpPr>
+        <p:spPr/>
+        <p:txBody>
+          <a:bodyPr/>
+          <a:lstStyle/>
+          <a:p>
+            <a:endParaRPr lang="en-GB"/>
+          </a:p>
+        </p:txBody>
+      </p:sp>
+    </p:spTree>
+    <p:extLst>
+      <p:ext uri="{BB962C8B-B14F-4D97-AF65-F5344CB8AC3E}">
+        <p14:creationId xmlns:p14="http://schemas.microsoft.com/office/powerpoint/2010/main" val="2451294436"/>
+      </p:ext>
+    </p:extLst>
+  </p:cSld>
+  <p:clrMapOvr>
+    <a:masterClrMapping/>
+  </p:clrMapOvr>
+</p:sld>
+</file>
+
+<file path=ppt/slides/slide27.xml><?xml version="1.0" encoding="utf-8"?>
+<p:sld xmlns:a="http://schemas.openxmlformats.org/drawingml/2006/main" xmlns:r="http://schemas.openxmlformats.org/officeDocument/2006/relationships" xmlns:p="http://schemas.openxmlformats.org/presentationml/2006/main">
+  <p:cSld>
+    <p:spTree>
+      <p:nvGrpSpPr>
+        <p:cNvPr id="1" name=""/>
+        <p:cNvGrpSpPr/>
+        <p:nvPr/>
+      </p:nvGrpSpPr>
+      <p:grpSpPr>
+        <a:xfrm>
+          <a:off x="0" y="0"/>
+          <a:ext cx="0" cy="0"/>
+          <a:chOff x="0" y="0"/>
+          <a:chExt cx="0" cy="0"/>
+        </a:xfrm>
+      </p:grpSpPr>
+      <p:sp>
+        <p:nvSpPr>
+          <p:cNvPr id="2" name="Title 1"/>
+          <p:cNvSpPr>
+            <a:spLocks noGrp="1"/>
+          </p:cNvSpPr>
+          <p:nvPr>
+            <p:ph type="title"/>
+          </p:nvPr>
+        </p:nvSpPr>
+        <p:spPr/>
+        <p:txBody>
+          <a:bodyPr/>
+          <a:lstStyle/>
+          <a:p>
+            <a:r>
+              <a:rPr lang="en-GB" dirty="0" smtClean="0"/>
+              <a:t>Homework </a:t>
+            </a:r>
+            <a:r>
+              <a:rPr lang="en-GB" dirty="0" smtClean="0"/>
+              <a:t>1</a:t>
             </a:r>
             <a:endParaRPr lang="en-GB" dirty="0"/>
           </a:p>
@@ -12207,7 +12964,7 @@
         <p:spPr>
           <a:xfrm>
             <a:off x="646111" y="2027583"/>
-            <a:ext cx="10634802" cy="4032250"/>
+            <a:ext cx="4967289" cy="4032250"/>
           </a:xfrm>
         </p:spPr>
         <p:txBody>
@@ -12218,16 +12975,514 @@
           <a:p>
             <a:r>
               <a:rPr lang="en-GB" dirty="0" smtClean="0"/>
-              <a:t>TBC</a:t>
-            </a:r>
-            <a:endParaRPr lang="en-GB" b="1" u="sng" dirty="0">
-              <a:solidFill>
-                <a:srgbClr val="FFFF00"/>
-              </a:solidFill>
+              <a:t>Write a program which asks for :-</a:t>
+            </a:r>
+          </a:p>
+          <a:p>
+            <a:pPr lvl="1"/>
+            <a:r>
+              <a:rPr lang="en-GB" dirty="0" smtClean="0"/>
+              <a:t>A first number.</a:t>
+            </a:r>
+          </a:p>
+          <a:p>
+            <a:pPr lvl="1"/>
+            <a:r>
+              <a:rPr lang="en-GB" dirty="0" smtClean="0"/>
+              <a:t>An operator from the set of +, -, *, /</a:t>
+            </a:r>
+          </a:p>
+          <a:p>
+            <a:pPr lvl="1"/>
+            <a:r>
+              <a:rPr lang="en-GB" dirty="0" smtClean="0"/>
+              <a:t>A second number.</a:t>
+            </a:r>
+          </a:p>
+          <a:p>
+            <a:endParaRPr lang="en-GB" dirty="0"/>
+          </a:p>
+          <a:p>
+            <a:r>
+              <a:rPr lang="en-GB" dirty="0" smtClean="0"/>
+              <a:t>It will then perform the calculation and print the answer.</a:t>
+            </a:r>
+            <a:endParaRPr lang="en-GB" dirty="0"/>
+          </a:p>
+          <a:p>
+            <a:endParaRPr lang="en-GB" dirty="0"/>
+          </a:p>
+        </p:txBody>
+      </p:sp>
+      <p:sp>
+        <p:nvSpPr>
+          <p:cNvPr id="4" name="Content Placeholder 2"/>
+          <p:cNvSpPr txBox="1">
+            <a:spLocks/>
+          </p:cNvSpPr>
+          <p:nvPr/>
+        </p:nvSpPr>
+        <p:spPr>
+          <a:xfrm>
+            <a:off x="6013978" y="2027583"/>
+            <a:ext cx="4967289" cy="4618750"/>
+          </a:xfrm>
+          <a:prstGeom prst="rect">
+            <a:avLst/>
+          </a:prstGeom>
+        </p:spPr>
+        <p:txBody>
+          <a:bodyPr vert="horz" lIns="91440" tIns="45720" rIns="91440" bIns="45720" rtlCol="0">
+            <a:normAutofit/>
+          </a:bodyPr>
+          <a:lstStyle>
+            <a:lvl1pPr marL="342900" indent="-342900" algn="l" defTabSz="457200" rtl="0" eaLnBrk="1" latinLnBrk="0" hangingPunct="1">
+              <a:spcBef>
+                <a:spcPts val="1000"/>
+              </a:spcBef>
+              <a:spcAft>
+                <a:spcPts val="0"/>
+              </a:spcAft>
+              <a:buClr>
+                <a:schemeClr val="bg2">
+                  <a:lumMod val="40000"/>
+                  <a:lumOff val="60000"/>
+                </a:schemeClr>
+              </a:buClr>
+              <a:buSzPct val="80000"/>
+              <a:buFont typeface="Wingdings 3" charset="2"/>
+              <a:buChar char=""/>
+              <a:defRPr sz="2000" b="0" i="0" kern="1200">
+                <a:solidFill>
+                  <a:schemeClr val="tx1"/>
+                </a:solidFill>
+                <a:latin typeface="+mj-lt"/>
+                <a:ea typeface="+mj-ea"/>
+                <a:cs typeface="+mj-cs"/>
+              </a:defRPr>
+            </a:lvl1pPr>
+            <a:lvl2pPr marL="742950" indent="-285750" algn="l" defTabSz="457200" rtl="0" eaLnBrk="1" latinLnBrk="0" hangingPunct="1">
+              <a:spcBef>
+                <a:spcPts val="1000"/>
+              </a:spcBef>
+              <a:spcAft>
+                <a:spcPts val="0"/>
+              </a:spcAft>
+              <a:buClr>
+                <a:schemeClr val="bg2">
+                  <a:lumMod val="40000"/>
+                  <a:lumOff val="60000"/>
+                </a:schemeClr>
+              </a:buClr>
+              <a:buSzPct val="80000"/>
+              <a:buFont typeface="Wingdings 3" charset="2"/>
+              <a:buChar char=""/>
+              <a:defRPr sz="1800" b="0" i="0" kern="1200">
+                <a:solidFill>
+                  <a:schemeClr val="tx1"/>
+                </a:solidFill>
+                <a:latin typeface="+mj-lt"/>
+                <a:ea typeface="+mj-ea"/>
+                <a:cs typeface="+mj-cs"/>
+              </a:defRPr>
+            </a:lvl2pPr>
+            <a:lvl3pPr marL="1143000" indent="-228600" algn="l" defTabSz="457200" rtl="0" eaLnBrk="1" latinLnBrk="0" hangingPunct="1">
+              <a:spcBef>
+                <a:spcPts val="1000"/>
+              </a:spcBef>
+              <a:spcAft>
+                <a:spcPts val="0"/>
+              </a:spcAft>
+              <a:buClr>
+                <a:schemeClr val="bg2">
+                  <a:lumMod val="40000"/>
+                  <a:lumOff val="60000"/>
+                </a:schemeClr>
+              </a:buClr>
+              <a:buSzPct val="80000"/>
+              <a:buFont typeface="Wingdings 3" charset="2"/>
+              <a:buChar char=""/>
+              <a:defRPr sz="1600" b="0" i="0" kern="1200">
+                <a:solidFill>
+                  <a:schemeClr val="tx1"/>
+                </a:solidFill>
+                <a:latin typeface="+mj-lt"/>
+                <a:ea typeface="+mj-ea"/>
+                <a:cs typeface="+mj-cs"/>
+              </a:defRPr>
+            </a:lvl3pPr>
+            <a:lvl4pPr marL="1600200" indent="-228600" algn="l" defTabSz="457200" rtl="0" eaLnBrk="1" latinLnBrk="0" hangingPunct="1">
+              <a:spcBef>
+                <a:spcPts val="1000"/>
+              </a:spcBef>
+              <a:spcAft>
+                <a:spcPts val="0"/>
+              </a:spcAft>
+              <a:buClr>
+                <a:schemeClr val="bg2">
+                  <a:lumMod val="40000"/>
+                  <a:lumOff val="60000"/>
+                </a:schemeClr>
+              </a:buClr>
+              <a:buSzPct val="80000"/>
+              <a:buFont typeface="Wingdings 3" charset="2"/>
+              <a:buChar char=""/>
+              <a:defRPr sz="1400" b="0" i="0" kern="1200">
+                <a:solidFill>
+                  <a:schemeClr val="tx1"/>
+                </a:solidFill>
+                <a:latin typeface="+mj-lt"/>
+                <a:ea typeface="+mj-ea"/>
+                <a:cs typeface="+mj-cs"/>
+              </a:defRPr>
+            </a:lvl4pPr>
+            <a:lvl5pPr marL="2057400" indent="-228600" algn="l" defTabSz="457200" rtl="0" eaLnBrk="1" latinLnBrk="0" hangingPunct="1">
+              <a:spcBef>
+                <a:spcPts val="1000"/>
+              </a:spcBef>
+              <a:spcAft>
+                <a:spcPts val="0"/>
+              </a:spcAft>
+              <a:buClr>
+                <a:schemeClr val="bg2">
+                  <a:lumMod val="40000"/>
+                  <a:lumOff val="60000"/>
+                </a:schemeClr>
+              </a:buClr>
+              <a:buSzPct val="80000"/>
+              <a:buFont typeface="Wingdings 3" charset="2"/>
+              <a:buChar char=""/>
+              <a:defRPr sz="1400" b="0" i="0" kern="1200">
+                <a:solidFill>
+                  <a:schemeClr val="tx1"/>
+                </a:solidFill>
+                <a:latin typeface="+mj-lt"/>
+                <a:ea typeface="+mj-ea"/>
+                <a:cs typeface="+mj-cs"/>
+              </a:defRPr>
+            </a:lvl5pPr>
+            <a:lvl6pPr marL="2506000" indent="-228600" algn="l" defTabSz="457200" rtl="0" eaLnBrk="1" latinLnBrk="0" hangingPunct="1">
+              <a:spcBef>
+                <a:spcPts val="1000"/>
+              </a:spcBef>
+              <a:spcAft>
+                <a:spcPts val="0"/>
+              </a:spcAft>
+              <a:buClr>
+                <a:schemeClr val="bg2">
+                  <a:lumMod val="40000"/>
+                  <a:lumOff val="60000"/>
+                </a:schemeClr>
+              </a:buClr>
+              <a:buSzPct val="80000"/>
+              <a:buFont typeface="Wingdings 3" charset="2"/>
+              <a:buChar char=""/>
+              <a:defRPr sz="1400" b="0" i="0" kern="1200">
+                <a:solidFill>
+                  <a:schemeClr val="tx1"/>
+                </a:solidFill>
+                <a:latin typeface="+mj-lt"/>
+                <a:ea typeface="+mj-ea"/>
+                <a:cs typeface="+mj-cs"/>
+              </a:defRPr>
+            </a:lvl6pPr>
+            <a:lvl7pPr marL="2971800" indent="-228600" algn="l" defTabSz="457200" rtl="0" eaLnBrk="1" latinLnBrk="0" hangingPunct="1">
+              <a:spcBef>
+                <a:spcPts val="1000"/>
+              </a:spcBef>
+              <a:spcAft>
+                <a:spcPts val="0"/>
+              </a:spcAft>
+              <a:buClr>
+                <a:schemeClr val="bg2">
+                  <a:lumMod val="40000"/>
+                  <a:lumOff val="60000"/>
+                </a:schemeClr>
+              </a:buClr>
+              <a:buSzPct val="80000"/>
+              <a:buFont typeface="Wingdings 3" charset="2"/>
+              <a:buChar char=""/>
+              <a:defRPr sz="1400" b="0" i="0" kern="1200">
+                <a:solidFill>
+                  <a:schemeClr val="tx1"/>
+                </a:solidFill>
+                <a:latin typeface="+mj-lt"/>
+                <a:ea typeface="+mj-ea"/>
+                <a:cs typeface="+mj-cs"/>
+              </a:defRPr>
+            </a:lvl7pPr>
+            <a:lvl8pPr marL="3429000" indent="-228600" algn="l" defTabSz="457200" rtl="0" eaLnBrk="1" latinLnBrk="0" hangingPunct="1">
+              <a:spcBef>
+                <a:spcPts val="1000"/>
+              </a:spcBef>
+              <a:spcAft>
+                <a:spcPts val="0"/>
+              </a:spcAft>
+              <a:buClr>
+                <a:schemeClr val="bg2">
+                  <a:lumMod val="40000"/>
+                  <a:lumOff val="60000"/>
+                </a:schemeClr>
+              </a:buClr>
+              <a:buSzPct val="80000"/>
+              <a:buFont typeface="Wingdings 3" charset="2"/>
+              <a:buChar char=""/>
+              <a:defRPr sz="1400" b="0" i="0" kern="1200">
+                <a:solidFill>
+                  <a:schemeClr val="tx1"/>
+                </a:solidFill>
+                <a:latin typeface="+mj-lt"/>
+                <a:ea typeface="+mj-ea"/>
+                <a:cs typeface="+mj-cs"/>
+              </a:defRPr>
+            </a:lvl8pPr>
+            <a:lvl9pPr marL="3886200" indent="-228600" algn="l" defTabSz="457200" rtl="0" eaLnBrk="1" latinLnBrk="0" hangingPunct="1">
+              <a:spcBef>
+                <a:spcPts val="1000"/>
+              </a:spcBef>
+              <a:spcAft>
+                <a:spcPts val="0"/>
+              </a:spcAft>
+              <a:buClr>
+                <a:schemeClr val="bg2">
+                  <a:lumMod val="40000"/>
+                  <a:lumOff val="60000"/>
+                </a:schemeClr>
+              </a:buClr>
+              <a:buSzPct val="80000"/>
+              <a:buFont typeface="Wingdings 3" charset="2"/>
+              <a:buChar char=""/>
+              <a:defRPr sz="1400" b="0" i="0" kern="1200">
+                <a:solidFill>
+                  <a:schemeClr val="tx1"/>
+                </a:solidFill>
+                <a:latin typeface="+mj-lt"/>
+                <a:ea typeface="+mj-ea"/>
+                <a:cs typeface="+mj-cs"/>
+              </a:defRPr>
+            </a:lvl9pPr>
+          </a:lstStyle>
+          <a:p>
+            <a:pPr marL="0" indent="0">
+              <a:buNone/>
+            </a:pPr>
+            <a:r>
+              <a:rPr lang="en-GB" sz="1800" dirty="0" smtClean="0">
+                <a:latin typeface="Courier New" panose="02070309020205020404" pitchFamily="49" charset="0"/>
+                <a:cs typeface="Courier New" panose="02070309020205020404" pitchFamily="49" charset="0"/>
+              </a:rPr>
+              <a:t>Examples :-</a:t>
+            </a:r>
+          </a:p>
+          <a:p>
+            <a:pPr marL="0" indent="0">
+              <a:buNone/>
+            </a:pPr>
+            <a:r>
+              <a:rPr lang="en-GB" sz="1400" dirty="0">
+                <a:latin typeface="Courier New" panose="02070309020205020404" pitchFamily="49" charset="0"/>
+                <a:cs typeface="Courier New" panose="02070309020205020404" pitchFamily="49" charset="0"/>
+              </a:rPr>
+              <a:t>Enter the first number: </a:t>
+            </a:r>
+            <a:r>
+              <a:rPr lang="en-GB" sz="1400" dirty="0">
+                <a:solidFill>
+                  <a:srgbClr val="FFFF00"/>
+                </a:solidFill>
+                <a:latin typeface="Courier New" panose="02070309020205020404" pitchFamily="49" charset="0"/>
+                <a:cs typeface="Courier New" panose="02070309020205020404" pitchFamily="49" charset="0"/>
+              </a:rPr>
+              <a:t>10</a:t>
+            </a:r>
+          </a:p>
+          <a:p>
+            <a:pPr marL="0" indent="0">
+              <a:buNone/>
+            </a:pPr>
+            <a:r>
+              <a:rPr lang="en-GB" sz="1400" dirty="0">
+                <a:latin typeface="Courier New" panose="02070309020205020404" pitchFamily="49" charset="0"/>
+                <a:cs typeface="Courier New" panose="02070309020205020404" pitchFamily="49" charset="0"/>
+              </a:rPr>
+              <a:t>Enter an operator from +,-,*,/: </a:t>
+            </a:r>
+            <a:r>
+              <a:rPr lang="en-GB" sz="1400" dirty="0">
+                <a:solidFill>
+                  <a:srgbClr val="FFFF00"/>
+                </a:solidFill>
+                <a:latin typeface="Courier New" panose="02070309020205020404" pitchFamily="49" charset="0"/>
+                <a:cs typeface="Courier New" panose="02070309020205020404" pitchFamily="49" charset="0"/>
+              </a:rPr>
+              <a:t>*</a:t>
+            </a:r>
+          </a:p>
+          <a:p>
+            <a:pPr marL="0" indent="0">
+              <a:buNone/>
+            </a:pPr>
+            <a:r>
+              <a:rPr lang="en-GB" sz="1400" dirty="0">
+                <a:latin typeface="Courier New" panose="02070309020205020404" pitchFamily="49" charset="0"/>
+                <a:cs typeface="Courier New" panose="02070309020205020404" pitchFamily="49" charset="0"/>
+              </a:rPr>
+              <a:t>Enter the second number: </a:t>
+            </a:r>
+            <a:r>
+              <a:rPr lang="en-GB" sz="1400" dirty="0">
+                <a:solidFill>
+                  <a:srgbClr val="FFFF00"/>
+                </a:solidFill>
+                <a:latin typeface="Courier New" panose="02070309020205020404" pitchFamily="49" charset="0"/>
+                <a:cs typeface="Courier New" panose="02070309020205020404" pitchFamily="49" charset="0"/>
+              </a:rPr>
+              <a:t>8</a:t>
+            </a:r>
+          </a:p>
+          <a:p>
+            <a:pPr marL="0" indent="0">
+              <a:buNone/>
+            </a:pPr>
+            <a:r>
+              <a:rPr lang="en-GB" sz="1400" dirty="0">
+                <a:latin typeface="Courier New" panose="02070309020205020404" pitchFamily="49" charset="0"/>
+                <a:cs typeface="Courier New" panose="02070309020205020404" pitchFamily="49" charset="0"/>
+              </a:rPr>
+              <a:t>10 * 8 = 80</a:t>
+            </a:r>
+          </a:p>
+          <a:p>
+            <a:pPr marL="0" indent="0">
+              <a:buNone/>
+            </a:pPr>
+            <a:endParaRPr lang="en-GB" sz="1800" dirty="0" smtClean="0">
+              <a:latin typeface="Courier New" panose="02070309020205020404" pitchFamily="49" charset="0"/>
+              <a:cs typeface="Courier New" panose="02070309020205020404" pitchFamily="49" charset="0"/>
             </a:endParaRPr>
           </a:p>
           <a:p>
-            <a:endParaRPr lang="en-GB" dirty="0"/>
+            <a:pPr marL="0" indent="0">
+              <a:buNone/>
+            </a:pPr>
+            <a:r>
+              <a:rPr lang="en-GB" sz="1800" dirty="0" smtClean="0">
+                <a:latin typeface="Courier New" panose="02070309020205020404" pitchFamily="49" charset="0"/>
+                <a:cs typeface="Courier New" panose="02070309020205020404" pitchFamily="49" charset="0"/>
+              </a:rPr>
+              <a:t>-----------------------------</a:t>
+            </a:r>
+          </a:p>
+          <a:p>
+            <a:pPr marL="0" indent="0">
+              <a:buNone/>
+            </a:pPr>
+            <a:r>
+              <a:rPr lang="en-GB" sz="1400" dirty="0">
+                <a:latin typeface="Courier New" panose="02070309020205020404" pitchFamily="49" charset="0"/>
+                <a:cs typeface="Courier New" panose="02070309020205020404" pitchFamily="49" charset="0"/>
+              </a:rPr>
+              <a:t>Enter the first number: </a:t>
+            </a:r>
+            <a:r>
+              <a:rPr lang="en-GB" sz="1400" dirty="0">
+                <a:solidFill>
+                  <a:srgbClr val="FFFF00"/>
+                </a:solidFill>
+                <a:latin typeface="Courier New" panose="02070309020205020404" pitchFamily="49" charset="0"/>
+                <a:cs typeface="Courier New" panose="02070309020205020404" pitchFamily="49" charset="0"/>
+              </a:rPr>
+              <a:t>100</a:t>
+            </a:r>
+          </a:p>
+          <a:p>
+            <a:pPr marL="0" indent="0">
+              <a:buNone/>
+            </a:pPr>
+            <a:r>
+              <a:rPr lang="en-GB" sz="1400" dirty="0">
+                <a:latin typeface="Courier New" panose="02070309020205020404" pitchFamily="49" charset="0"/>
+                <a:cs typeface="Courier New" panose="02070309020205020404" pitchFamily="49" charset="0"/>
+              </a:rPr>
+              <a:t>Enter an operator from +,-,*,/: </a:t>
+            </a:r>
+            <a:r>
+              <a:rPr lang="en-GB" sz="1400" dirty="0">
+                <a:solidFill>
+                  <a:srgbClr val="FFFF00"/>
+                </a:solidFill>
+                <a:latin typeface="Courier New" panose="02070309020205020404" pitchFamily="49" charset="0"/>
+                <a:cs typeface="Courier New" panose="02070309020205020404" pitchFamily="49" charset="0"/>
+              </a:rPr>
+              <a:t>-</a:t>
+            </a:r>
+          </a:p>
+          <a:p>
+            <a:pPr marL="0" indent="0">
+              <a:buNone/>
+            </a:pPr>
+            <a:r>
+              <a:rPr lang="en-GB" sz="1400" dirty="0">
+                <a:latin typeface="Courier New" panose="02070309020205020404" pitchFamily="49" charset="0"/>
+                <a:cs typeface="Courier New" panose="02070309020205020404" pitchFamily="49" charset="0"/>
+              </a:rPr>
+              <a:t>Enter the second number: </a:t>
+            </a:r>
+            <a:r>
+              <a:rPr lang="en-GB" sz="1400" dirty="0">
+                <a:solidFill>
+                  <a:srgbClr val="FFFF00"/>
+                </a:solidFill>
+                <a:latin typeface="Courier New" panose="02070309020205020404" pitchFamily="49" charset="0"/>
+                <a:cs typeface="Courier New" panose="02070309020205020404" pitchFamily="49" charset="0"/>
+              </a:rPr>
+              <a:t>50</a:t>
+            </a:r>
+          </a:p>
+          <a:p>
+            <a:pPr marL="0" indent="0">
+              <a:buNone/>
+            </a:pPr>
+            <a:r>
+              <a:rPr lang="en-GB" sz="1400" dirty="0">
+                <a:latin typeface="Courier New" panose="02070309020205020404" pitchFamily="49" charset="0"/>
+                <a:cs typeface="Courier New" panose="02070309020205020404" pitchFamily="49" charset="0"/>
+              </a:rPr>
+              <a:t>100 - 50 = 50</a:t>
+            </a:r>
+          </a:p>
+          <a:p>
+            <a:pPr marL="0" indent="0">
+              <a:buNone/>
+            </a:pPr>
+            <a:endParaRPr lang="en-GB" sz="1800" dirty="0" smtClean="0">
+              <a:latin typeface="Courier New" panose="02070309020205020404" pitchFamily="49" charset="0"/>
+              <a:cs typeface="Courier New" panose="02070309020205020404" pitchFamily="49" charset="0"/>
+            </a:endParaRPr>
+          </a:p>
+          <a:p>
+            <a:pPr marL="0" indent="0">
+              <a:buNone/>
+            </a:pPr>
+            <a:endParaRPr lang="en-GB" sz="1400" dirty="0">
+              <a:latin typeface="Courier New" panose="02070309020205020404" pitchFamily="49" charset="0"/>
+              <a:cs typeface="Courier New" panose="02070309020205020404" pitchFamily="49" charset="0"/>
+            </a:endParaRPr>
+          </a:p>
+          <a:p>
+            <a:pPr marL="0" indent="0">
+              <a:buNone/>
+            </a:pPr>
+            <a:endParaRPr lang="en-GB" sz="1800" dirty="0" smtClean="0">
+              <a:latin typeface="Courier New" panose="02070309020205020404" pitchFamily="49" charset="0"/>
+              <a:cs typeface="Courier New" panose="02070309020205020404" pitchFamily="49" charset="0"/>
+            </a:endParaRPr>
+          </a:p>
+          <a:p>
+            <a:pPr marL="0" indent="0">
+              <a:buNone/>
+            </a:pPr>
+            <a:endParaRPr lang="en-GB" sz="1800" dirty="0"/>
           </a:p>
         </p:txBody>
       </p:sp>
@@ -12251,7 +13506,7 @@
 </p:sld>
 </file>
 
-<file path=ppt/slides/slide26.xml><?xml version="1.0" encoding="utf-8"?>
+<file path=ppt/slides/slide28.xml><?xml version="1.0" encoding="utf-8"?>
 <p:sld xmlns:a="http://schemas.openxmlformats.org/drawingml/2006/main" xmlns:r="http://schemas.openxmlformats.org/officeDocument/2006/relationships" xmlns:p="http://schemas.openxmlformats.org/presentationml/2006/main">
   <p:cSld>
     <p:spTree>
@@ -12285,7 +13540,11 @@
           <a:p>
             <a:r>
               <a:rPr lang="en-GB" dirty="0" smtClean="0"/>
-              <a:t>Next Week.</a:t>
+              <a:t>Homework </a:t>
+            </a:r>
+            <a:r>
+              <a:rPr lang="en-GB" dirty="0" smtClean="0"/>
+              <a:t>2</a:t>
             </a:r>
             <a:endParaRPr lang="en-GB" dirty="0"/>
           </a:p>
@@ -12301,15 +13560,47 @@
             <p:ph idx="1"/>
           </p:nvPr>
         </p:nvSpPr>
-        <p:spPr/>
-        <p:txBody>
-          <a:bodyPr/>
+        <p:spPr>
+          <a:xfrm>
+            <a:off x="646111" y="2027583"/>
+            <a:ext cx="10030356" cy="4032250"/>
+          </a:xfrm>
+        </p:spPr>
+        <p:txBody>
+          <a:bodyPr>
+            <a:normAutofit/>
+          </a:bodyPr>
           <a:lstStyle/>
           <a:p>
             <a:r>
               <a:rPr lang="en-GB" dirty="0" smtClean="0"/>
-              <a:t>TBC</a:t>
-            </a:r>
+              <a:t>What do you think happens if you convert 4.4 to an integer ?</a:t>
+            </a:r>
+          </a:p>
+          <a:p>
+            <a:r>
+              <a:rPr lang="en-GB" dirty="0" smtClean="0"/>
+              <a:t>What do you think happens if you convert 4.6 to an integer ?</a:t>
+            </a:r>
+          </a:p>
+          <a:p>
+            <a:endParaRPr lang="en-GB" dirty="0"/>
+          </a:p>
+          <a:p>
+            <a:r>
+              <a:rPr lang="en-GB" dirty="0" smtClean="0"/>
+              <a:t>Write a program to see what happens.</a:t>
+            </a:r>
+          </a:p>
+          <a:p>
+            <a:pPr lvl="1"/>
+            <a:r>
+              <a:rPr lang="en-GB" dirty="0" smtClean="0"/>
+              <a:t>Is it what you expected to happen ?</a:t>
+            </a:r>
+            <a:endParaRPr lang="en-GB" dirty="0"/>
+          </a:p>
+          <a:p>
             <a:endParaRPr lang="en-GB" dirty="0"/>
           </a:p>
         </p:txBody>
@@ -12317,13 +13608,153 @@
     </p:spTree>
     <p:extLst>
       <p:ext uri="{BB962C8B-B14F-4D97-AF65-F5344CB8AC3E}">
-        <p14:creationId xmlns:p14="http://schemas.microsoft.com/office/powerpoint/2010/main" val="4053531929"/>
+        <p14:creationId xmlns:p14="http://schemas.microsoft.com/office/powerpoint/2010/main" val="1042698887"/>
       </p:ext>
     </p:extLst>
   </p:cSld>
   <p:clrMapOvr>
     <a:masterClrMapping/>
   </p:clrMapOvr>
+  <p:timing>
+    <p:tnLst>
+      <p:par>
+        <p:cTn id="1" dur="indefinite" restart="never" nodeType="tmRoot"/>
+      </p:par>
+    </p:tnLst>
+  </p:timing>
+</p:sld>
+</file>
+
+<file path=ppt/slides/slide29.xml><?xml version="1.0" encoding="utf-8"?>
+<p:sld xmlns:a="http://schemas.openxmlformats.org/drawingml/2006/main" xmlns:r="http://schemas.openxmlformats.org/officeDocument/2006/relationships" xmlns:p="http://schemas.openxmlformats.org/presentationml/2006/main">
+  <p:cSld>
+    <p:spTree>
+      <p:nvGrpSpPr>
+        <p:cNvPr id="1" name=""/>
+        <p:cNvGrpSpPr/>
+        <p:nvPr/>
+      </p:nvGrpSpPr>
+      <p:grpSpPr>
+        <a:xfrm>
+          <a:off x="0" y="0"/>
+          <a:ext cx="0" cy="0"/>
+          <a:chOff x="0" y="0"/>
+          <a:chExt cx="0" cy="0"/>
+        </a:xfrm>
+      </p:grpSpPr>
+      <p:sp>
+        <p:nvSpPr>
+          <p:cNvPr id="2" name="Title 1"/>
+          <p:cNvSpPr>
+            <a:spLocks noGrp="1"/>
+          </p:cNvSpPr>
+          <p:nvPr>
+            <p:ph type="title"/>
+          </p:nvPr>
+        </p:nvSpPr>
+        <p:spPr/>
+        <p:txBody>
+          <a:bodyPr/>
+          <a:lstStyle/>
+          <a:p>
+            <a:r>
+              <a:rPr lang="en-GB" dirty="0" smtClean="0"/>
+              <a:t>Homework </a:t>
+            </a:r>
+            <a:r>
+              <a:rPr lang="en-GB" dirty="0"/>
+              <a:t>3</a:t>
+            </a:r>
+            <a:endParaRPr lang="en-GB" dirty="0"/>
+          </a:p>
+        </p:txBody>
+      </p:sp>
+      <p:sp>
+        <p:nvSpPr>
+          <p:cNvPr id="3" name="Content Placeholder 2"/>
+          <p:cNvSpPr>
+            <a:spLocks noGrp="1"/>
+          </p:cNvSpPr>
+          <p:nvPr>
+            <p:ph idx="1"/>
+          </p:nvPr>
+        </p:nvSpPr>
+        <p:spPr>
+          <a:xfrm>
+            <a:off x="646111" y="2027583"/>
+            <a:ext cx="10030356" cy="4032250"/>
+          </a:xfrm>
+        </p:spPr>
+        <p:txBody>
+          <a:bodyPr>
+            <a:normAutofit/>
+          </a:bodyPr>
+          <a:lstStyle/>
+          <a:p>
+            <a:r>
+              <a:rPr lang="el-GR" dirty="0" smtClean="0"/>
+              <a:t>π</a:t>
+            </a:r>
+            <a:r>
+              <a:rPr lang="en-GB" dirty="0" smtClean="0"/>
+              <a:t> is approximately 3.14159265359</a:t>
+            </a:r>
+          </a:p>
+          <a:p>
+            <a:r>
+              <a:rPr lang="en-GB" dirty="0" smtClean="0"/>
+              <a:t>e </a:t>
+            </a:r>
+            <a:r>
+              <a:rPr lang="en-GB" dirty="0"/>
+              <a:t>is approximately 2.7182818284</a:t>
+            </a:r>
+            <a:endParaRPr lang="en-GB" dirty="0" smtClean="0"/>
+          </a:p>
+          <a:p>
+            <a:endParaRPr lang="en-GB" dirty="0"/>
+          </a:p>
+          <a:p>
+            <a:r>
+              <a:rPr lang="en-GB" dirty="0" smtClean="0"/>
+              <a:t>Print </a:t>
+            </a:r>
+            <a:r>
+              <a:rPr lang="el-GR" dirty="0" smtClean="0"/>
+              <a:t>π</a:t>
+            </a:r>
+            <a:r>
+              <a:rPr lang="en-GB" dirty="0" smtClean="0"/>
+              <a:t> to 3 decimal places, 6 decimal places and 9 decimal places.</a:t>
+            </a:r>
+            <a:endParaRPr lang="en-GB" dirty="0"/>
+          </a:p>
+          <a:p>
+            <a:r>
+              <a:rPr lang="en-GB" dirty="0" smtClean="0"/>
+              <a:t>Print e to 2 decimal places, 4 decimal places and 6 decimal places.</a:t>
+            </a:r>
+            <a:endParaRPr lang="en-GB" dirty="0"/>
+          </a:p>
+        </p:txBody>
+      </p:sp>
+    </p:spTree>
+    <p:extLst>
+      <p:ext uri="{BB962C8B-B14F-4D97-AF65-F5344CB8AC3E}">
+        <p14:creationId xmlns:p14="http://schemas.microsoft.com/office/powerpoint/2010/main" val="1838443009"/>
+      </p:ext>
+    </p:extLst>
+  </p:cSld>
+  <p:clrMapOvr>
+    <a:masterClrMapping/>
+  </p:clrMapOvr>
+  <p:timing>
+    <p:tnLst>
+      <p:par>
+        <p:cTn id="1" dur="indefinite" restart="never" nodeType="tmRoot"/>
+      </p:par>
+    </p:tnLst>
+  </p:timing>
 </p:sld>
 </file>
 
@@ -12395,6 +13826,1732 @@
     <p:extLst>
       <p:ext uri="{BB962C8B-B14F-4D97-AF65-F5344CB8AC3E}">
         <p14:creationId xmlns:p14="http://schemas.microsoft.com/office/powerpoint/2010/main" val="376771991"/>
+      </p:ext>
+    </p:extLst>
+  </p:cSld>
+  <p:clrMapOvr>
+    <a:masterClrMapping/>
+  </p:clrMapOvr>
+</p:sld>
+</file>
+
+<file path=ppt/slides/slide30.xml><?xml version="1.0" encoding="utf-8"?>
+<p:sld xmlns:a="http://schemas.openxmlformats.org/drawingml/2006/main" xmlns:r="http://schemas.openxmlformats.org/officeDocument/2006/relationships" xmlns:p="http://schemas.openxmlformats.org/presentationml/2006/main">
+  <p:cSld>
+    <p:spTree>
+      <p:nvGrpSpPr>
+        <p:cNvPr id="1" name=""/>
+        <p:cNvGrpSpPr/>
+        <p:nvPr/>
+      </p:nvGrpSpPr>
+      <p:grpSpPr>
+        <a:xfrm>
+          <a:off x="0" y="0"/>
+          <a:ext cx="0" cy="0"/>
+          <a:chOff x="0" y="0"/>
+          <a:chExt cx="0" cy="0"/>
+        </a:xfrm>
+      </p:grpSpPr>
+      <p:sp>
+        <p:nvSpPr>
+          <p:cNvPr id="2" name="Title 1"/>
+          <p:cNvSpPr>
+            <a:spLocks noGrp="1"/>
+          </p:cNvSpPr>
+          <p:nvPr>
+            <p:ph type="title"/>
+          </p:nvPr>
+        </p:nvSpPr>
+        <p:spPr/>
+        <p:txBody>
+          <a:bodyPr/>
+          <a:lstStyle/>
+          <a:p>
+            <a:r>
+              <a:rPr lang="en-GB" dirty="0" smtClean="0"/>
+              <a:t>Homework </a:t>
+            </a:r>
+            <a:r>
+              <a:rPr lang="en-GB" dirty="0" smtClean="0"/>
+              <a:t>4</a:t>
+            </a:r>
+            <a:endParaRPr lang="en-GB" dirty="0"/>
+          </a:p>
+        </p:txBody>
+      </p:sp>
+      <p:sp>
+        <p:nvSpPr>
+          <p:cNvPr id="3" name="Content Placeholder 2"/>
+          <p:cNvSpPr>
+            <a:spLocks noGrp="1"/>
+          </p:cNvSpPr>
+          <p:nvPr>
+            <p:ph idx="1"/>
+          </p:nvPr>
+        </p:nvSpPr>
+        <p:spPr>
+          <a:xfrm>
+            <a:off x="646111" y="2027583"/>
+            <a:ext cx="10030356" cy="4032250"/>
+          </a:xfrm>
+        </p:spPr>
+        <p:txBody>
+          <a:bodyPr>
+            <a:normAutofit/>
+          </a:bodyPr>
+          <a:lstStyle/>
+          <a:p>
+            <a:r>
+              <a:rPr lang="en-GB" dirty="0" smtClean="0"/>
+              <a:t>Store the first 6 months of the year in a list.</a:t>
+            </a:r>
+          </a:p>
+          <a:p>
+            <a:r>
+              <a:rPr lang="en-GB" dirty="0" smtClean="0"/>
+              <a:t>Print the list.</a:t>
+            </a:r>
+          </a:p>
+          <a:p>
+            <a:r>
+              <a:rPr lang="en-GB" dirty="0" smtClean="0"/>
+              <a:t>Add the next 3 months of the year to the list.</a:t>
+            </a:r>
+          </a:p>
+          <a:p>
+            <a:r>
+              <a:rPr lang="en-GB" dirty="0" smtClean="0"/>
+              <a:t>Print the list again.</a:t>
+            </a:r>
+          </a:p>
+          <a:p>
+            <a:r>
+              <a:rPr lang="en-GB" dirty="0" smtClean="0"/>
+              <a:t>Add the final 3 months of the year to the list.</a:t>
+            </a:r>
+          </a:p>
+          <a:p>
+            <a:r>
+              <a:rPr lang="en-GB" dirty="0" smtClean="0"/>
+              <a:t>Print the list again.</a:t>
+            </a:r>
+          </a:p>
+          <a:p>
+            <a:r>
+              <a:rPr lang="en-GB" dirty="0" smtClean="0"/>
+              <a:t>Print the 4</a:t>
+            </a:r>
+            <a:r>
+              <a:rPr lang="en-GB" baseline="30000" dirty="0" smtClean="0"/>
+              <a:t>th</a:t>
+            </a:r>
+            <a:r>
+              <a:rPr lang="en-GB" dirty="0" smtClean="0"/>
+              <a:t> month.</a:t>
+            </a:r>
+          </a:p>
+          <a:p>
+            <a:r>
+              <a:rPr lang="en-GB" dirty="0" smtClean="0"/>
+              <a:t>Print the 8</a:t>
+            </a:r>
+            <a:r>
+              <a:rPr lang="en-GB" baseline="30000" dirty="0" smtClean="0"/>
+              <a:t>th</a:t>
+            </a:r>
+            <a:r>
+              <a:rPr lang="en-GB" dirty="0" smtClean="0"/>
+              <a:t> month.</a:t>
+            </a:r>
+            <a:endParaRPr lang="en-GB" dirty="0"/>
+          </a:p>
+        </p:txBody>
+      </p:sp>
+    </p:spTree>
+    <p:extLst>
+      <p:ext uri="{BB962C8B-B14F-4D97-AF65-F5344CB8AC3E}">
+        <p14:creationId xmlns:p14="http://schemas.microsoft.com/office/powerpoint/2010/main" val="2221248241"/>
+      </p:ext>
+    </p:extLst>
+  </p:cSld>
+  <p:clrMapOvr>
+    <a:masterClrMapping/>
+  </p:clrMapOvr>
+  <p:timing>
+    <p:tnLst>
+      <p:par>
+        <p:cTn id="1" dur="indefinite" restart="never" nodeType="tmRoot"/>
+      </p:par>
+    </p:tnLst>
+  </p:timing>
+</p:sld>
+</file>
+
+<file path=ppt/slides/slide31.xml><?xml version="1.0" encoding="utf-8"?>
+<p:sld xmlns:a="http://schemas.openxmlformats.org/drawingml/2006/main" xmlns:r="http://schemas.openxmlformats.org/officeDocument/2006/relationships" xmlns:p="http://schemas.openxmlformats.org/presentationml/2006/main">
+  <p:cSld>
+    <p:spTree>
+      <p:nvGrpSpPr>
+        <p:cNvPr id="1" name=""/>
+        <p:cNvGrpSpPr/>
+        <p:nvPr/>
+      </p:nvGrpSpPr>
+      <p:grpSpPr>
+        <a:xfrm>
+          <a:off x="0" y="0"/>
+          <a:ext cx="0" cy="0"/>
+          <a:chOff x="0" y="0"/>
+          <a:chExt cx="0" cy="0"/>
+        </a:xfrm>
+      </p:grpSpPr>
+      <p:sp>
+        <p:nvSpPr>
+          <p:cNvPr id="2" name="Title 1"/>
+          <p:cNvSpPr>
+            <a:spLocks noGrp="1"/>
+          </p:cNvSpPr>
+          <p:nvPr>
+            <p:ph type="title"/>
+          </p:nvPr>
+        </p:nvSpPr>
+        <p:spPr/>
+        <p:txBody>
+          <a:bodyPr/>
+          <a:lstStyle/>
+          <a:p>
+            <a:r>
+              <a:rPr lang="en-GB" dirty="0" smtClean="0"/>
+              <a:t>Homework </a:t>
+            </a:r>
+            <a:r>
+              <a:rPr lang="en-GB" dirty="0"/>
+              <a:t>5</a:t>
+            </a:r>
+            <a:endParaRPr lang="en-GB" dirty="0"/>
+          </a:p>
+        </p:txBody>
+      </p:sp>
+      <p:sp>
+        <p:nvSpPr>
+          <p:cNvPr id="3" name="Content Placeholder 2"/>
+          <p:cNvSpPr>
+            <a:spLocks noGrp="1"/>
+          </p:cNvSpPr>
+          <p:nvPr>
+            <p:ph idx="1"/>
+          </p:nvPr>
+        </p:nvSpPr>
+        <p:spPr>
+          <a:xfrm>
+            <a:off x="646111" y="2027583"/>
+            <a:ext cx="10030356" cy="4032250"/>
+          </a:xfrm>
+        </p:spPr>
+        <p:txBody>
+          <a:bodyPr>
+            <a:normAutofit lnSpcReduction="10000"/>
+          </a:bodyPr>
+          <a:lstStyle/>
+          <a:p>
+            <a:r>
+              <a:rPr lang="en-GB" dirty="0" smtClean="0"/>
+              <a:t>Store the first 13 letters of the alphabet in a list.</a:t>
+            </a:r>
+          </a:p>
+          <a:p>
+            <a:pPr lvl="1"/>
+            <a:r>
+              <a:rPr lang="en-GB" dirty="0" smtClean="0"/>
+              <a:t>Start with A, end with M.</a:t>
+            </a:r>
+          </a:p>
+          <a:p>
+            <a:endParaRPr lang="en-GB" dirty="0"/>
+          </a:p>
+          <a:p>
+            <a:r>
+              <a:rPr lang="en-GB" dirty="0" smtClean="0"/>
+              <a:t>Using a loop, write every 4</a:t>
+            </a:r>
+            <a:r>
+              <a:rPr lang="en-GB" baseline="30000" dirty="0" smtClean="0"/>
+              <a:t>th</a:t>
+            </a:r>
+            <a:r>
+              <a:rPr lang="en-GB" dirty="0" smtClean="0"/>
+              <a:t> letter of the first half of the alphabet.</a:t>
+            </a:r>
+          </a:p>
+          <a:p>
+            <a:endParaRPr lang="en-GB" dirty="0"/>
+          </a:p>
+          <a:p>
+            <a:r>
+              <a:rPr lang="en-GB" dirty="0" smtClean="0"/>
+              <a:t>You should get the following result.</a:t>
+            </a:r>
+          </a:p>
+          <a:p>
+            <a:endParaRPr lang="en-GB" dirty="0"/>
+          </a:p>
+          <a:p>
+            <a:pPr marL="0" indent="0">
+              <a:buNone/>
+            </a:pPr>
+            <a:r>
+              <a:rPr lang="en-GB" dirty="0" smtClean="0">
+                <a:latin typeface="Courier New" panose="02070309020205020404" pitchFamily="49" charset="0"/>
+                <a:cs typeface="Courier New" panose="02070309020205020404" pitchFamily="49" charset="0"/>
+              </a:rPr>
+              <a:t>D</a:t>
+            </a:r>
+          </a:p>
+          <a:p>
+            <a:pPr marL="0" indent="0">
+              <a:buNone/>
+            </a:pPr>
+            <a:r>
+              <a:rPr lang="en-GB" dirty="0" smtClean="0">
+                <a:latin typeface="Courier New" panose="02070309020205020404" pitchFamily="49" charset="0"/>
+                <a:cs typeface="Courier New" panose="02070309020205020404" pitchFamily="49" charset="0"/>
+              </a:rPr>
+              <a:t>H</a:t>
+            </a:r>
+          </a:p>
+          <a:p>
+            <a:pPr marL="0" indent="0">
+              <a:buNone/>
+            </a:pPr>
+            <a:r>
+              <a:rPr lang="en-GB" dirty="0">
+                <a:latin typeface="Courier New" panose="02070309020205020404" pitchFamily="49" charset="0"/>
+                <a:cs typeface="Courier New" panose="02070309020205020404" pitchFamily="49" charset="0"/>
+              </a:rPr>
+              <a:t>L</a:t>
+            </a:r>
+            <a:endParaRPr lang="en-GB" dirty="0">
+              <a:latin typeface="Courier New" panose="02070309020205020404" pitchFamily="49" charset="0"/>
+              <a:cs typeface="Courier New" panose="02070309020205020404" pitchFamily="49" charset="0"/>
+            </a:endParaRPr>
+          </a:p>
+        </p:txBody>
+      </p:sp>
+    </p:spTree>
+    <p:extLst>
+      <p:ext uri="{BB962C8B-B14F-4D97-AF65-F5344CB8AC3E}">
+        <p14:creationId xmlns:p14="http://schemas.microsoft.com/office/powerpoint/2010/main" val="3982515837"/>
+      </p:ext>
+    </p:extLst>
+  </p:cSld>
+  <p:clrMapOvr>
+    <a:masterClrMapping/>
+  </p:clrMapOvr>
+  <p:timing>
+    <p:tnLst>
+      <p:par>
+        <p:cTn id="1" dur="indefinite" restart="never" nodeType="tmRoot"/>
+      </p:par>
+    </p:tnLst>
+  </p:timing>
+</p:sld>
+</file>
+
+<file path=ppt/slides/slide32.xml><?xml version="1.0" encoding="utf-8"?>
+<p:sld xmlns:a="http://schemas.openxmlformats.org/drawingml/2006/main" xmlns:r="http://schemas.openxmlformats.org/officeDocument/2006/relationships" xmlns:p="http://schemas.openxmlformats.org/presentationml/2006/main">
+  <p:cSld>
+    <p:spTree>
+      <p:nvGrpSpPr>
+        <p:cNvPr id="1" name=""/>
+        <p:cNvGrpSpPr/>
+        <p:nvPr/>
+      </p:nvGrpSpPr>
+      <p:grpSpPr>
+        <a:xfrm>
+          <a:off x="0" y="0"/>
+          <a:ext cx="0" cy="0"/>
+          <a:chOff x="0" y="0"/>
+          <a:chExt cx="0" cy="0"/>
+        </a:xfrm>
+      </p:grpSpPr>
+      <p:sp>
+        <p:nvSpPr>
+          <p:cNvPr id="2" name="Title 1"/>
+          <p:cNvSpPr>
+            <a:spLocks noGrp="1"/>
+          </p:cNvSpPr>
+          <p:nvPr>
+            <p:ph type="title"/>
+          </p:nvPr>
+        </p:nvSpPr>
+        <p:spPr/>
+        <p:txBody>
+          <a:bodyPr/>
+          <a:lstStyle/>
+          <a:p>
+            <a:r>
+              <a:rPr lang="en-GB" dirty="0" smtClean="0"/>
+              <a:t>Homework </a:t>
+            </a:r>
+            <a:r>
+              <a:rPr lang="en-GB" dirty="0" smtClean="0"/>
+              <a:t>6</a:t>
+            </a:r>
+            <a:endParaRPr lang="en-GB" dirty="0"/>
+          </a:p>
+        </p:txBody>
+      </p:sp>
+      <p:sp>
+        <p:nvSpPr>
+          <p:cNvPr id="3" name="Content Placeholder 2"/>
+          <p:cNvSpPr>
+            <a:spLocks noGrp="1"/>
+          </p:cNvSpPr>
+          <p:nvPr>
+            <p:ph idx="1"/>
+          </p:nvPr>
+        </p:nvSpPr>
+        <p:spPr>
+          <a:xfrm>
+            <a:off x="646110" y="2027583"/>
+            <a:ext cx="10453689" cy="4032250"/>
+          </a:xfrm>
+        </p:spPr>
+        <p:txBody>
+          <a:bodyPr>
+            <a:normAutofit/>
+          </a:bodyPr>
+          <a:lstStyle/>
+          <a:p>
+            <a:r>
+              <a:rPr lang="en-GB" smtClean="0"/>
+              <a:t>Make a list with the values of the British coins in order from 1p to 200p.</a:t>
+            </a:r>
+          </a:p>
+          <a:p>
+            <a:r>
+              <a:rPr lang="en-GB" smtClean="0"/>
+              <a:t>If you have 15 of the 3</a:t>
+            </a:r>
+            <a:r>
+              <a:rPr lang="en-GB" baseline="30000" smtClean="0"/>
+              <a:t>rd</a:t>
+            </a:r>
+            <a:r>
+              <a:rPr lang="en-GB" smtClean="0"/>
+              <a:t> least valuable coin, how many pennies do you have ?</a:t>
+            </a:r>
+          </a:p>
+          <a:p>
+            <a:r>
+              <a:rPr lang="en-GB" smtClean="0"/>
+              <a:t>If you have 34 of the 5</a:t>
+            </a:r>
+            <a:r>
+              <a:rPr lang="en-GB" baseline="30000" smtClean="0"/>
+              <a:t>th</a:t>
+            </a:r>
+            <a:r>
+              <a:rPr lang="en-GB" smtClean="0"/>
+              <a:t> least valuable coin, how many pennies do you have ?</a:t>
+            </a:r>
+          </a:p>
+          <a:p>
+            <a:r>
+              <a:rPr lang="en-GB" smtClean="0"/>
+              <a:t>If you have 9 of the 4</a:t>
+            </a:r>
+            <a:r>
+              <a:rPr lang="en-GB" baseline="30000" smtClean="0"/>
+              <a:t>th</a:t>
+            </a:r>
+            <a:r>
+              <a:rPr lang="en-GB" smtClean="0"/>
+              <a:t> least valuable coin, how many pennies do you have ?</a:t>
+            </a:r>
+          </a:p>
+          <a:p>
+            <a:endParaRPr lang="en-GB" smtClean="0"/>
+          </a:p>
+          <a:p>
+            <a:r>
+              <a:rPr lang="en-GB" smtClean="0"/>
+              <a:t>Make a list with the values of the US coins, from 1cent to 100cents.</a:t>
+            </a:r>
+          </a:p>
+          <a:p>
+            <a:r>
+              <a:rPr lang="en-GB" smtClean="0"/>
+              <a:t>If you have 15 of the 3</a:t>
+            </a:r>
+            <a:r>
+              <a:rPr lang="en-GB" baseline="30000" smtClean="0"/>
+              <a:t>rd</a:t>
+            </a:r>
+            <a:r>
+              <a:rPr lang="en-GB" smtClean="0"/>
+              <a:t> least valuable coin, how many cents do you have ?</a:t>
+            </a:r>
+          </a:p>
+          <a:p>
+            <a:r>
+              <a:rPr lang="en-GB" smtClean="0"/>
+              <a:t>If you have 34 of the 5</a:t>
+            </a:r>
+            <a:r>
+              <a:rPr lang="en-GB" baseline="30000" smtClean="0"/>
+              <a:t>th</a:t>
+            </a:r>
+            <a:r>
+              <a:rPr lang="en-GB" smtClean="0"/>
+              <a:t> least valuable coin, how many cents do you have ?</a:t>
+            </a:r>
+          </a:p>
+          <a:p>
+            <a:r>
+              <a:rPr lang="en-GB" smtClean="0"/>
+              <a:t>If you have 9 of the 4</a:t>
+            </a:r>
+            <a:r>
+              <a:rPr lang="en-GB" baseline="30000" smtClean="0"/>
+              <a:t>th</a:t>
+            </a:r>
+            <a:r>
+              <a:rPr lang="en-GB" smtClean="0"/>
+              <a:t> least valuable coin, how many cents do you have ?</a:t>
+            </a:r>
+          </a:p>
+          <a:p>
+            <a:pPr marL="0" indent="0">
+              <a:buNone/>
+            </a:pPr>
+            <a:endParaRPr lang="en-GB" dirty="0" smtClean="0"/>
+          </a:p>
+        </p:txBody>
+      </p:sp>
+    </p:spTree>
+    <p:extLst>
+      <p:ext uri="{BB962C8B-B14F-4D97-AF65-F5344CB8AC3E}">
+        <p14:creationId xmlns:p14="http://schemas.microsoft.com/office/powerpoint/2010/main" val="1576534197"/>
+      </p:ext>
+    </p:extLst>
+  </p:cSld>
+  <p:clrMapOvr>
+    <a:masterClrMapping/>
+  </p:clrMapOvr>
+  <p:timing>
+    <p:tnLst>
+      <p:par>
+        <p:cTn id="1" dur="indefinite" restart="never" nodeType="tmRoot"/>
+      </p:par>
+    </p:tnLst>
+  </p:timing>
+</p:sld>
+</file>
+
+<file path=ppt/slides/slide33.xml><?xml version="1.0" encoding="utf-8"?>
+<p:sld xmlns:a="http://schemas.openxmlformats.org/drawingml/2006/main" xmlns:r="http://schemas.openxmlformats.org/officeDocument/2006/relationships" xmlns:p="http://schemas.openxmlformats.org/presentationml/2006/main">
+  <p:cSld>
+    <p:spTree>
+      <p:nvGrpSpPr>
+        <p:cNvPr id="1" name=""/>
+        <p:cNvGrpSpPr/>
+        <p:nvPr/>
+      </p:nvGrpSpPr>
+      <p:grpSpPr>
+        <a:xfrm>
+          <a:off x="0" y="0"/>
+          <a:ext cx="0" cy="0"/>
+          <a:chOff x="0" y="0"/>
+          <a:chExt cx="0" cy="0"/>
+        </a:xfrm>
+      </p:grpSpPr>
+      <p:sp>
+        <p:nvSpPr>
+          <p:cNvPr id="2" name="Title 1"/>
+          <p:cNvSpPr>
+            <a:spLocks noGrp="1"/>
+          </p:cNvSpPr>
+          <p:nvPr>
+            <p:ph type="title"/>
+          </p:nvPr>
+        </p:nvSpPr>
+        <p:spPr/>
+        <p:txBody>
+          <a:bodyPr/>
+          <a:lstStyle/>
+          <a:p>
+            <a:r>
+              <a:rPr lang="en-GB" dirty="0" smtClean="0"/>
+              <a:t>Homework </a:t>
+            </a:r>
+            <a:r>
+              <a:rPr lang="en-GB" dirty="0" smtClean="0"/>
+              <a:t>7</a:t>
+            </a:r>
+            <a:endParaRPr lang="en-GB" dirty="0"/>
+          </a:p>
+        </p:txBody>
+      </p:sp>
+      <p:sp>
+        <p:nvSpPr>
+          <p:cNvPr id="3" name="Content Placeholder 2"/>
+          <p:cNvSpPr>
+            <a:spLocks noGrp="1"/>
+          </p:cNvSpPr>
+          <p:nvPr>
+            <p:ph idx="1"/>
+          </p:nvPr>
+        </p:nvSpPr>
+        <p:spPr>
+          <a:xfrm>
+            <a:off x="646110" y="2027583"/>
+            <a:ext cx="10453689" cy="4032250"/>
+          </a:xfrm>
+        </p:spPr>
+        <p:txBody>
+          <a:bodyPr>
+            <a:normAutofit/>
+          </a:bodyPr>
+          <a:lstStyle/>
+          <a:p>
+            <a:r>
+              <a:rPr lang="en-GB" dirty="0" smtClean="0"/>
+              <a:t>Store "</a:t>
+            </a:r>
+            <a:r>
+              <a:rPr lang="en-GB" dirty="0" smtClean="0">
+                <a:latin typeface="Courier New" panose="02070309020205020404" pitchFamily="49" charset="0"/>
+                <a:cs typeface="Courier New" panose="02070309020205020404" pitchFamily="49" charset="0"/>
+              </a:rPr>
+              <a:t>King</a:t>
+            </a:r>
+            <a:r>
+              <a:rPr lang="en-GB" dirty="0" smtClean="0"/>
+              <a:t>" in a variable.</a:t>
+            </a:r>
+          </a:p>
+          <a:p>
+            <a:r>
+              <a:rPr lang="en-GB" dirty="0" smtClean="0"/>
+              <a:t>Store "</a:t>
+            </a:r>
+            <a:r>
+              <a:rPr lang="en-GB" dirty="0" smtClean="0">
+                <a:latin typeface="Courier New" panose="02070309020205020404" pitchFamily="49" charset="0"/>
+                <a:cs typeface="Courier New" panose="02070309020205020404" pitchFamily="49" charset="0"/>
+              </a:rPr>
+              <a:t>king</a:t>
+            </a:r>
+            <a:r>
+              <a:rPr lang="en-GB" dirty="0" smtClean="0"/>
+              <a:t>" in another variable.</a:t>
+            </a:r>
+          </a:p>
+          <a:p>
+            <a:endParaRPr lang="en-GB" dirty="0"/>
+          </a:p>
+          <a:p>
+            <a:r>
+              <a:rPr lang="en-GB" dirty="0" smtClean="0"/>
+              <a:t>Print "</a:t>
+            </a:r>
+            <a:r>
+              <a:rPr lang="en-GB" dirty="0" smtClean="0">
+                <a:latin typeface="Courier New" panose="02070309020205020404" pitchFamily="49" charset="0"/>
+                <a:cs typeface="Courier New" panose="02070309020205020404" pitchFamily="49" charset="0"/>
+              </a:rPr>
+              <a:t>These are the same</a:t>
+            </a:r>
+            <a:r>
+              <a:rPr lang="en-GB" dirty="0" smtClean="0"/>
+              <a:t>" if Python things these things are equal.</a:t>
+            </a:r>
+          </a:p>
+          <a:p>
+            <a:r>
+              <a:rPr lang="en-GB" dirty="0" smtClean="0"/>
+              <a:t>Otherwise print "</a:t>
+            </a:r>
+            <a:r>
+              <a:rPr lang="en-GB" dirty="0" smtClean="0">
+                <a:latin typeface="Courier New" panose="02070309020205020404" pitchFamily="49" charset="0"/>
+                <a:cs typeface="Courier New" panose="02070309020205020404" pitchFamily="49" charset="0"/>
+              </a:rPr>
+              <a:t>These are different</a:t>
+            </a:r>
+            <a:r>
+              <a:rPr lang="en-GB" dirty="0" smtClean="0"/>
+              <a:t>".</a:t>
+            </a:r>
+          </a:p>
+          <a:p>
+            <a:endParaRPr lang="en-GB" dirty="0"/>
+          </a:p>
+          <a:p>
+            <a:r>
+              <a:rPr lang="en-GB" dirty="0" smtClean="0">
+                <a:solidFill>
+                  <a:srgbClr val="FFFF00"/>
+                </a:solidFill>
+              </a:rPr>
+              <a:t>Do you think Python will think they are equal ?</a:t>
+            </a:r>
+          </a:p>
+          <a:p>
+            <a:r>
+              <a:rPr lang="en-GB" dirty="0" smtClean="0">
+                <a:solidFill>
+                  <a:srgbClr val="FFFF00"/>
+                </a:solidFill>
+              </a:rPr>
+              <a:t>What does your program do ?</a:t>
+            </a:r>
+          </a:p>
+          <a:p>
+            <a:pPr marL="0" indent="0">
+              <a:buNone/>
+            </a:pPr>
+            <a:endParaRPr lang="en-GB" dirty="0" smtClean="0"/>
+          </a:p>
+        </p:txBody>
+      </p:sp>
+    </p:spTree>
+    <p:extLst>
+      <p:ext uri="{BB962C8B-B14F-4D97-AF65-F5344CB8AC3E}">
+        <p14:creationId xmlns:p14="http://schemas.microsoft.com/office/powerpoint/2010/main" val="3918757240"/>
+      </p:ext>
+    </p:extLst>
+  </p:cSld>
+  <p:clrMapOvr>
+    <a:masterClrMapping/>
+  </p:clrMapOvr>
+  <p:timing>
+    <p:tnLst>
+      <p:par>
+        <p:cTn id="1" dur="indefinite" restart="never" nodeType="tmRoot"/>
+      </p:par>
+    </p:tnLst>
+  </p:timing>
+</p:sld>
+</file>
+
+<file path=ppt/slides/slide34.xml><?xml version="1.0" encoding="utf-8"?>
+<p:sld xmlns:a="http://schemas.openxmlformats.org/drawingml/2006/main" xmlns:r="http://schemas.openxmlformats.org/officeDocument/2006/relationships" xmlns:p="http://schemas.openxmlformats.org/presentationml/2006/main">
+  <p:cSld>
+    <p:spTree>
+      <p:nvGrpSpPr>
+        <p:cNvPr id="1" name=""/>
+        <p:cNvGrpSpPr/>
+        <p:nvPr/>
+      </p:nvGrpSpPr>
+      <p:grpSpPr>
+        <a:xfrm>
+          <a:off x="0" y="0"/>
+          <a:ext cx="0" cy="0"/>
+          <a:chOff x="0" y="0"/>
+          <a:chExt cx="0" cy="0"/>
+        </a:xfrm>
+      </p:grpSpPr>
+      <p:sp>
+        <p:nvSpPr>
+          <p:cNvPr id="2" name="Title 1"/>
+          <p:cNvSpPr>
+            <a:spLocks noGrp="1"/>
+          </p:cNvSpPr>
+          <p:nvPr>
+            <p:ph type="title"/>
+          </p:nvPr>
+        </p:nvSpPr>
+        <p:spPr/>
+        <p:txBody>
+          <a:bodyPr/>
+          <a:lstStyle/>
+          <a:p>
+            <a:r>
+              <a:rPr lang="en-GB" dirty="0" smtClean="0"/>
+              <a:t>Homework </a:t>
+            </a:r>
+            <a:r>
+              <a:rPr lang="en-GB" dirty="0" smtClean="0"/>
+              <a:t>8</a:t>
+            </a:r>
+            <a:endParaRPr lang="en-GB" dirty="0"/>
+          </a:p>
+        </p:txBody>
+      </p:sp>
+      <p:sp>
+        <p:nvSpPr>
+          <p:cNvPr id="3" name="Content Placeholder 2"/>
+          <p:cNvSpPr>
+            <a:spLocks noGrp="1"/>
+          </p:cNvSpPr>
+          <p:nvPr>
+            <p:ph idx="1"/>
+          </p:nvPr>
+        </p:nvSpPr>
+        <p:spPr>
+          <a:xfrm>
+            <a:off x="646110" y="2027583"/>
+            <a:ext cx="10453689" cy="4032250"/>
+          </a:xfrm>
+        </p:spPr>
+        <p:txBody>
+          <a:bodyPr>
+            <a:normAutofit/>
+          </a:bodyPr>
+          <a:lstStyle/>
+          <a:p>
+            <a:r>
+              <a:rPr lang="en-GB" dirty="0" smtClean="0"/>
+              <a:t>These are the names of the 6 nearest star systems to Earth.</a:t>
+            </a:r>
+          </a:p>
+          <a:p>
+            <a:r>
+              <a:rPr lang="en-GB" sz="1600" dirty="0" smtClean="0">
+                <a:latin typeface="Courier New" panose="02070309020205020404" pitchFamily="49" charset="0"/>
+                <a:cs typeface="Courier New" panose="02070309020205020404" pitchFamily="49" charset="0"/>
+              </a:rPr>
+              <a:t>["Centauri", "Barnard's Star", "</a:t>
+            </a:r>
+            <a:r>
+              <a:rPr lang="en-GB" sz="1600" dirty="0" err="1" smtClean="0">
+                <a:latin typeface="Courier New" panose="02070309020205020404" pitchFamily="49" charset="0"/>
+                <a:cs typeface="Courier New" panose="02070309020205020404" pitchFamily="49" charset="0"/>
+              </a:rPr>
+              <a:t>Luhman</a:t>
+            </a:r>
+            <a:r>
+              <a:rPr lang="en-GB" sz="1600" dirty="0" smtClean="0">
+                <a:latin typeface="Courier New" panose="02070309020205020404" pitchFamily="49" charset="0"/>
+                <a:cs typeface="Courier New" panose="02070309020205020404" pitchFamily="49" charset="0"/>
+              </a:rPr>
+              <a:t>", "Wise", "Wolf 359", "</a:t>
+            </a:r>
+            <a:r>
+              <a:rPr lang="en-GB" sz="1600" dirty="0" err="1" smtClean="0">
+                <a:latin typeface="Courier New" panose="02070309020205020404" pitchFamily="49" charset="0"/>
+                <a:cs typeface="Courier New" panose="02070309020205020404" pitchFamily="49" charset="0"/>
+              </a:rPr>
+              <a:t>Lalande</a:t>
+            </a:r>
+            <a:r>
+              <a:rPr lang="en-GB" sz="1600" dirty="0" smtClean="0">
+                <a:latin typeface="Courier New" panose="02070309020205020404" pitchFamily="49" charset="0"/>
+                <a:cs typeface="Courier New" panose="02070309020205020404" pitchFamily="49" charset="0"/>
+              </a:rPr>
+              <a:t> 21185"]</a:t>
+            </a:r>
+          </a:p>
+          <a:p>
+            <a:endParaRPr lang="en-GB" sz="1600" dirty="0" smtClean="0">
+              <a:latin typeface="Courier New" panose="02070309020205020404" pitchFamily="49" charset="0"/>
+              <a:cs typeface="Courier New" panose="02070309020205020404" pitchFamily="49" charset="0"/>
+            </a:endParaRPr>
+          </a:p>
+          <a:p>
+            <a:r>
+              <a:rPr lang="en-GB" dirty="0" smtClean="0"/>
+              <a:t>Using a loop, write these out in reverse order.</a:t>
+            </a:r>
+          </a:p>
+          <a:p>
+            <a:endParaRPr lang="en-GB" dirty="0"/>
+          </a:p>
+          <a:p>
+            <a:endParaRPr lang="en-GB" sz="1600" dirty="0">
+              <a:latin typeface="Courier New" panose="02070309020205020404" pitchFamily="49" charset="0"/>
+              <a:cs typeface="Courier New" panose="02070309020205020404" pitchFamily="49" charset="0"/>
+            </a:endParaRPr>
+          </a:p>
+          <a:p>
+            <a:endParaRPr lang="en-GB" sz="1600" dirty="0">
+              <a:latin typeface="Courier New" panose="02070309020205020404" pitchFamily="49" charset="0"/>
+              <a:cs typeface="Courier New" panose="02070309020205020404" pitchFamily="49" charset="0"/>
+            </a:endParaRPr>
+          </a:p>
+          <a:p>
+            <a:pPr marL="0" indent="0">
+              <a:buNone/>
+            </a:pPr>
+            <a:endParaRPr lang="en-GB" dirty="0" smtClean="0"/>
+          </a:p>
+        </p:txBody>
+      </p:sp>
+    </p:spTree>
+    <p:extLst>
+      <p:ext uri="{BB962C8B-B14F-4D97-AF65-F5344CB8AC3E}">
+        <p14:creationId xmlns:p14="http://schemas.microsoft.com/office/powerpoint/2010/main" val="3833604605"/>
+      </p:ext>
+    </p:extLst>
+  </p:cSld>
+  <p:clrMapOvr>
+    <a:masterClrMapping/>
+  </p:clrMapOvr>
+  <p:timing>
+    <p:tnLst>
+      <p:par>
+        <p:cTn id="1" dur="indefinite" restart="never" nodeType="tmRoot"/>
+      </p:par>
+    </p:tnLst>
+  </p:timing>
+</p:sld>
+</file>
+
+<file path=ppt/slides/slide35.xml><?xml version="1.0" encoding="utf-8"?>
+<p:sld xmlns:a="http://schemas.openxmlformats.org/drawingml/2006/main" xmlns:r="http://schemas.openxmlformats.org/officeDocument/2006/relationships" xmlns:p="http://schemas.openxmlformats.org/presentationml/2006/main">
+  <p:cSld>
+    <p:spTree>
+      <p:nvGrpSpPr>
+        <p:cNvPr id="1" name=""/>
+        <p:cNvGrpSpPr/>
+        <p:nvPr/>
+      </p:nvGrpSpPr>
+      <p:grpSpPr>
+        <a:xfrm>
+          <a:off x="0" y="0"/>
+          <a:ext cx="0" cy="0"/>
+          <a:chOff x="0" y="0"/>
+          <a:chExt cx="0" cy="0"/>
+        </a:xfrm>
+      </p:grpSpPr>
+      <p:sp>
+        <p:nvSpPr>
+          <p:cNvPr id="2" name="Title 1"/>
+          <p:cNvSpPr>
+            <a:spLocks noGrp="1"/>
+          </p:cNvSpPr>
+          <p:nvPr>
+            <p:ph type="title"/>
+          </p:nvPr>
+        </p:nvSpPr>
+        <p:spPr/>
+        <p:txBody>
+          <a:bodyPr/>
+          <a:lstStyle/>
+          <a:p>
+            <a:r>
+              <a:rPr lang="en-GB" dirty="0" smtClean="0"/>
+              <a:t>Homework </a:t>
+            </a:r>
+            <a:r>
+              <a:rPr lang="en-GB" dirty="0" smtClean="0"/>
+              <a:t>9</a:t>
+            </a:r>
+            <a:endParaRPr lang="en-GB" dirty="0"/>
+          </a:p>
+        </p:txBody>
+      </p:sp>
+      <mc:AlternateContent xmlns:mc="http://schemas.openxmlformats.org/markup-compatibility/2006">
+        <mc:Choice xmlns:a14="http://schemas.microsoft.com/office/drawing/2010/main" Requires="a14">
+          <p:sp>
+            <p:nvSpPr>
+              <p:cNvPr id="3" name="Content Placeholder 2"/>
+              <p:cNvSpPr>
+                <a:spLocks noGrp="1"/>
+              </p:cNvSpPr>
+              <p:nvPr>
+                <p:ph idx="1"/>
+              </p:nvPr>
+            </p:nvSpPr>
+            <p:spPr>
+              <a:xfrm>
+                <a:off x="646110" y="2027583"/>
+                <a:ext cx="10453689" cy="4032250"/>
+              </a:xfrm>
+            </p:spPr>
+            <p:txBody>
+              <a:bodyPr>
+                <a:normAutofit/>
+              </a:bodyPr>
+              <a:lstStyle/>
+              <a:p>
+                <a:r>
+                  <a:rPr lang="en-GB" dirty="0" smtClean="0"/>
+                  <a:t>Write a program which adds multiplies the numbers from 1 to 50 together.</a:t>
+                </a:r>
+              </a:p>
+              <a:p>
+                <a:endParaRPr lang="en-GB" dirty="0" smtClean="0"/>
+              </a:p>
+              <a:p>
+                <a:pPr marL="0" indent="0">
+                  <a:buNone/>
+                </a:pPr>
+                <a14:m>
+                  <m:oMathPara xmlns:m="http://schemas.openxmlformats.org/officeDocument/2006/math">
+                    <m:oMathParaPr>
+                      <m:jc m:val="centerGroup"/>
+                    </m:oMathParaPr>
+                    <m:oMath xmlns:m="http://schemas.openxmlformats.org/officeDocument/2006/math">
+                      <m:r>
+                        <a:rPr lang="en-GB" b="0" i="1" smtClean="0">
+                          <a:latin typeface="Cambria Math" panose="02040503050406030204" pitchFamily="18" charset="0"/>
+                        </a:rPr>
+                        <m:t>1 </m:t>
+                      </m:r>
+                      <m:r>
+                        <a:rPr lang="en-GB" b="0" i="1" smtClean="0">
+                          <a:latin typeface="Cambria Math" panose="02040503050406030204" pitchFamily="18" charset="0"/>
+                        </a:rPr>
+                        <m:t>𝑥</m:t>
+                      </m:r>
+                      <m:r>
+                        <a:rPr lang="en-GB" b="0" i="1" smtClean="0">
+                          <a:latin typeface="Cambria Math" panose="02040503050406030204" pitchFamily="18" charset="0"/>
+                        </a:rPr>
+                        <m:t> 2 </m:t>
+                      </m:r>
+                      <m:r>
+                        <a:rPr lang="en-GB" b="0" i="1" smtClean="0">
+                          <a:latin typeface="Cambria Math" panose="02040503050406030204" pitchFamily="18" charset="0"/>
+                        </a:rPr>
+                        <m:t>𝑥</m:t>
+                      </m:r>
+                      <m:r>
+                        <a:rPr lang="en-GB" b="0" i="1" smtClean="0">
+                          <a:latin typeface="Cambria Math" panose="02040503050406030204" pitchFamily="18" charset="0"/>
+                        </a:rPr>
+                        <m:t> 3 </m:t>
+                      </m:r>
+                      <m:r>
+                        <a:rPr lang="en-GB" b="0" i="1" smtClean="0">
+                          <a:latin typeface="Cambria Math" panose="02040503050406030204" pitchFamily="18" charset="0"/>
+                        </a:rPr>
+                        <m:t>𝑥</m:t>
+                      </m:r>
+                      <m:r>
+                        <a:rPr lang="en-GB" b="0" i="1" smtClean="0">
+                          <a:latin typeface="Cambria Math" panose="02040503050406030204" pitchFamily="18" charset="0"/>
+                        </a:rPr>
+                        <m:t> 4 </m:t>
+                      </m:r>
+                      <m:r>
+                        <a:rPr lang="en-GB" b="0" i="1" smtClean="0">
+                          <a:latin typeface="Cambria Math" panose="02040503050406030204" pitchFamily="18" charset="0"/>
+                        </a:rPr>
+                        <m:t>𝑥</m:t>
+                      </m:r>
+                      <m:r>
+                        <a:rPr lang="en-GB" b="0" i="1" smtClean="0">
+                          <a:latin typeface="Cambria Math" panose="02040503050406030204" pitchFamily="18" charset="0"/>
+                        </a:rPr>
+                        <m:t> 5 </m:t>
+                      </m:r>
+                      <m:r>
+                        <a:rPr lang="en-GB" b="0" i="1" smtClean="0">
+                          <a:latin typeface="Cambria Math" panose="02040503050406030204" pitchFamily="18" charset="0"/>
+                        </a:rPr>
+                        <m:t>𝑥</m:t>
+                      </m:r>
+                      <m:r>
+                        <a:rPr lang="en-GB" b="0" i="1" smtClean="0">
+                          <a:latin typeface="Cambria Math" panose="02040503050406030204" pitchFamily="18" charset="0"/>
+                        </a:rPr>
+                        <m:t> …</m:t>
+                      </m:r>
+                      <m:r>
+                        <a:rPr lang="en-GB" b="0" i="1" smtClean="0">
+                          <a:latin typeface="Cambria Math" panose="02040503050406030204" pitchFamily="18" charset="0"/>
+                        </a:rPr>
+                        <m:t>𝑥</m:t>
+                      </m:r>
+                      <m:r>
+                        <a:rPr lang="en-GB" b="0" i="1" smtClean="0">
+                          <a:latin typeface="Cambria Math" panose="02040503050406030204" pitchFamily="18" charset="0"/>
+                        </a:rPr>
+                        <m:t> 50= ?</m:t>
+                      </m:r>
+                    </m:oMath>
+                  </m:oMathPara>
+                </a14:m>
+                <a:endParaRPr lang="en-GB" dirty="0"/>
+              </a:p>
+              <a:p>
+                <a:endParaRPr lang="en-GB" sz="1600" dirty="0" smtClean="0">
+                  <a:latin typeface="Courier New" panose="02070309020205020404" pitchFamily="49" charset="0"/>
+                  <a:cs typeface="Courier New" panose="02070309020205020404" pitchFamily="49" charset="0"/>
+                </a:endParaRPr>
+              </a:p>
+              <a:p>
+                <a:r>
+                  <a:rPr lang="en-GB" dirty="0"/>
+                  <a:t>Expect to get a </a:t>
+                </a:r>
+                <a:r>
+                  <a:rPr lang="en-GB" dirty="0" smtClean="0"/>
+                  <a:t>very, </a:t>
+                </a:r>
+                <a:r>
+                  <a:rPr lang="en-GB" dirty="0"/>
+                  <a:t>very large number !</a:t>
+                </a:r>
+              </a:p>
+              <a:p>
+                <a:endParaRPr lang="en-GB" sz="1600" dirty="0">
+                  <a:latin typeface="Courier New" panose="02070309020205020404" pitchFamily="49" charset="0"/>
+                  <a:cs typeface="Courier New" panose="02070309020205020404" pitchFamily="49" charset="0"/>
+                </a:endParaRPr>
+              </a:p>
+              <a:p>
+                <a:endParaRPr lang="en-GB" sz="1600" dirty="0">
+                  <a:latin typeface="Courier New" panose="02070309020205020404" pitchFamily="49" charset="0"/>
+                  <a:cs typeface="Courier New" panose="02070309020205020404" pitchFamily="49" charset="0"/>
+                </a:endParaRPr>
+              </a:p>
+              <a:p>
+                <a:pPr marL="0" indent="0">
+                  <a:buNone/>
+                </a:pPr>
+                <a:endParaRPr lang="en-GB" dirty="0" smtClean="0"/>
+              </a:p>
+            </p:txBody>
+          </p:sp>
+        </mc:Choice>
+        <mc:Fallback>
+          <p:sp>
+            <p:nvSpPr>
+              <p:cNvPr id="3" name="Content Placeholder 2"/>
+              <p:cNvSpPr>
+                <a:spLocks noGrp="1" noRot="1" noChangeAspect="1" noMove="1" noResize="1" noEditPoints="1" noAdjustHandles="1" noChangeArrowheads="1" noChangeShapeType="1" noTextEdit="1"/>
+              </p:cNvSpPr>
+              <p:nvPr>
+                <p:ph idx="1"/>
+              </p:nvPr>
+            </p:nvSpPr>
+            <p:spPr>
+              <a:xfrm>
+                <a:off x="646110" y="2027583"/>
+                <a:ext cx="10453689" cy="4032250"/>
+              </a:xfrm>
+              <a:blipFill rotWithShape="0">
+                <a:blip r:embed="rId2"/>
+                <a:stretch>
+                  <a:fillRect l="-292" t="-908"/>
+                </a:stretch>
+              </a:blipFill>
+            </p:spPr>
+            <p:txBody>
+              <a:bodyPr/>
+              <a:lstStyle/>
+              <a:p>
+                <a:r>
+                  <a:rPr lang="en-GB">
+                    <a:noFill/>
+                  </a:rPr>
+                  <a:t> </a:t>
+                </a:r>
+              </a:p>
+            </p:txBody>
+          </p:sp>
+        </mc:Fallback>
+      </mc:AlternateContent>
+    </p:spTree>
+    <p:extLst>
+      <p:ext uri="{BB962C8B-B14F-4D97-AF65-F5344CB8AC3E}">
+        <p14:creationId xmlns:p14="http://schemas.microsoft.com/office/powerpoint/2010/main" val="3119807411"/>
+      </p:ext>
+    </p:extLst>
+  </p:cSld>
+  <p:clrMapOvr>
+    <a:masterClrMapping/>
+  </p:clrMapOvr>
+  <p:timing>
+    <p:tnLst>
+      <p:par>
+        <p:cTn id="1" dur="indefinite" restart="never" nodeType="tmRoot"/>
+      </p:par>
+    </p:tnLst>
+  </p:timing>
+</p:sld>
+</file>
+
+<file path=ppt/slides/slide36.xml><?xml version="1.0" encoding="utf-8"?>
+<p:sld xmlns:a="http://schemas.openxmlformats.org/drawingml/2006/main" xmlns:r="http://schemas.openxmlformats.org/officeDocument/2006/relationships" xmlns:p="http://schemas.openxmlformats.org/presentationml/2006/main">
+  <p:cSld>
+    <p:spTree>
+      <p:nvGrpSpPr>
+        <p:cNvPr id="1" name=""/>
+        <p:cNvGrpSpPr/>
+        <p:nvPr/>
+      </p:nvGrpSpPr>
+      <p:grpSpPr>
+        <a:xfrm>
+          <a:off x="0" y="0"/>
+          <a:ext cx="0" cy="0"/>
+          <a:chOff x="0" y="0"/>
+          <a:chExt cx="0" cy="0"/>
+        </a:xfrm>
+      </p:grpSpPr>
+      <p:sp>
+        <p:nvSpPr>
+          <p:cNvPr id="2" name="Title 1"/>
+          <p:cNvSpPr>
+            <a:spLocks noGrp="1"/>
+          </p:cNvSpPr>
+          <p:nvPr>
+            <p:ph type="title"/>
+          </p:nvPr>
+        </p:nvSpPr>
+        <p:spPr/>
+        <p:txBody>
+          <a:bodyPr/>
+          <a:lstStyle/>
+          <a:p>
+            <a:r>
+              <a:rPr lang="en-GB" dirty="0" smtClean="0"/>
+              <a:t>Homework </a:t>
+            </a:r>
+            <a:r>
+              <a:rPr lang="en-GB" dirty="0" smtClean="0"/>
+              <a:t>10</a:t>
+            </a:r>
+            <a:endParaRPr lang="en-GB" dirty="0"/>
+          </a:p>
+        </p:txBody>
+      </p:sp>
+      <mc:AlternateContent xmlns:mc="http://schemas.openxmlformats.org/markup-compatibility/2006">
+        <mc:Choice xmlns:a14="http://schemas.microsoft.com/office/drawing/2010/main" Requires="a14">
+          <p:sp>
+            <p:nvSpPr>
+              <p:cNvPr id="3" name="Content Placeholder 2"/>
+              <p:cNvSpPr>
+                <a:spLocks noGrp="1"/>
+              </p:cNvSpPr>
+              <p:nvPr>
+                <p:ph idx="1"/>
+              </p:nvPr>
+            </p:nvSpPr>
+            <p:spPr>
+              <a:xfrm>
+                <a:off x="646110" y="2027583"/>
+                <a:ext cx="10453689" cy="4032250"/>
+              </a:xfrm>
+            </p:spPr>
+            <p:txBody>
+              <a:bodyPr>
+                <a:normAutofit/>
+              </a:bodyPr>
+              <a:lstStyle/>
+              <a:p>
+                <a:r>
+                  <a:rPr lang="en-GB" dirty="0" smtClean="0"/>
+                  <a:t>Write a program using a loop which adds these 10 numbers together.</a:t>
+                </a:r>
+              </a:p>
+              <a:p>
+                <a:endParaRPr lang="en-GB" dirty="0"/>
+              </a:p>
+              <a:p>
+                <a:pPr marL="0" indent="0">
+                  <a:buNone/>
+                </a:pPr>
+                <a14:m>
+                  <m:oMathPara xmlns:m="http://schemas.openxmlformats.org/officeDocument/2006/math">
+                    <m:oMathParaPr>
+                      <m:jc m:val="centerGroup"/>
+                    </m:oMathParaPr>
+                    <m:oMath xmlns:m="http://schemas.openxmlformats.org/officeDocument/2006/math">
+                      <m:r>
+                        <a:rPr lang="en-GB" sz="1600" b="0" i="1" smtClean="0">
+                          <a:latin typeface="Cambria Math" panose="02040503050406030204" pitchFamily="18" charset="0"/>
+                          <a:cs typeface="Courier New" panose="02070309020205020404" pitchFamily="49" charset="0"/>
+                        </a:rPr>
+                        <m:t>1+</m:t>
+                      </m:r>
+                      <m:f>
+                        <m:fPr>
+                          <m:ctrlPr>
+                            <a:rPr lang="en-GB" sz="1600" b="0" i="1" smtClean="0">
+                              <a:latin typeface="Cambria Math" panose="02040503050406030204" pitchFamily="18" charset="0"/>
+                              <a:cs typeface="Courier New" panose="02070309020205020404" pitchFamily="49" charset="0"/>
+                            </a:rPr>
+                          </m:ctrlPr>
+                        </m:fPr>
+                        <m:num>
+                          <m:r>
+                            <a:rPr lang="en-GB" sz="1600" b="0" i="1" smtClean="0">
+                              <a:latin typeface="Cambria Math" panose="02040503050406030204" pitchFamily="18" charset="0"/>
+                              <a:cs typeface="Courier New" panose="02070309020205020404" pitchFamily="49" charset="0"/>
+                            </a:rPr>
+                            <m:t>1</m:t>
+                          </m:r>
+                        </m:num>
+                        <m:den>
+                          <m:r>
+                            <a:rPr lang="en-GB" sz="1600" b="0" i="1" smtClean="0">
+                              <a:latin typeface="Cambria Math" panose="02040503050406030204" pitchFamily="18" charset="0"/>
+                              <a:cs typeface="Courier New" panose="02070309020205020404" pitchFamily="49" charset="0"/>
+                            </a:rPr>
+                            <m:t>2</m:t>
+                          </m:r>
+                        </m:den>
+                      </m:f>
+                      <m:r>
+                        <a:rPr lang="en-GB" sz="1600" b="0" i="1" smtClean="0">
+                          <a:latin typeface="Cambria Math" panose="02040503050406030204" pitchFamily="18" charset="0"/>
+                          <a:cs typeface="Courier New" panose="02070309020205020404" pitchFamily="49" charset="0"/>
+                        </a:rPr>
+                        <m:t>+</m:t>
+                      </m:r>
+                      <m:f>
+                        <m:fPr>
+                          <m:ctrlPr>
+                            <a:rPr lang="en-GB" sz="1600" b="0" i="1" smtClean="0">
+                              <a:latin typeface="Cambria Math" panose="02040503050406030204" pitchFamily="18" charset="0"/>
+                              <a:cs typeface="Courier New" panose="02070309020205020404" pitchFamily="49" charset="0"/>
+                            </a:rPr>
+                          </m:ctrlPr>
+                        </m:fPr>
+                        <m:num>
+                          <m:r>
+                            <a:rPr lang="en-GB" sz="1600" b="0" i="1" smtClean="0">
+                              <a:latin typeface="Cambria Math" panose="02040503050406030204" pitchFamily="18" charset="0"/>
+                              <a:cs typeface="Courier New" panose="02070309020205020404" pitchFamily="49" charset="0"/>
+                            </a:rPr>
+                            <m:t>1</m:t>
+                          </m:r>
+                        </m:num>
+                        <m:den>
+                          <m:r>
+                            <a:rPr lang="en-GB" sz="1600" b="0" i="1" smtClean="0">
+                              <a:latin typeface="Cambria Math" panose="02040503050406030204" pitchFamily="18" charset="0"/>
+                              <a:cs typeface="Courier New" panose="02070309020205020404" pitchFamily="49" charset="0"/>
+                            </a:rPr>
+                            <m:t>4</m:t>
+                          </m:r>
+                        </m:den>
+                      </m:f>
+                      <m:r>
+                        <a:rPr lang="en-GB" sz="1600" b="0" i="1" smtClean="0">
+                          <a:latin typeface="Cambria Math" panose="02040503050406030204" pitchFamily="18" charset="0"/>
+                          <a:cs typeface="Courier New" panose="02070309020205020404" pitchFamily="49" charset="0"/>
+                        </a:rPr>
+                        <m:t>+</m:t>
+                      </m:r>
+                      <m:f>
+                        <m:fPr>
+                          <m:ctrlPr>
+                            <a:rPr lang="en-GB" sz="1600" b="0" i="1" smtClean="0">
+                              <a:latin typeface="Cambria Math" panose="02040503050406030204" pitchFamily="18" charset="0"/>
+                              <a:cs typeface="Courier New" panose="02070309020205020404" pitchFamily="49" charset="0"/>
+                            </a:rPr>
+                          </m:ctrlPr>
+                        </m:fPr>
+                        <m:num>
+                          <m:r>
+                            <a:rPr lang="en-GB" sz="1600" b="0" i="1" smtClean="0">
+                              <a:latin typeface="Cambria Math" panose="02040503050406030204" pitchFamily="18" charset="0"/>
+                              <a:cs typeface="Courier New" panose="02070309020205020404" pitchFamily="49" charset="0"/>
+                            </a:rPr>
+                            <m:t>1</m:t>
+                          </m:r>
+                        </m:num>
+                        <m:den>
+                          <m:r>
+                            <a:rPr lang="en-GB" sz="1600" b="0" i="1" smtClean="0">
+                              <a:latin typeface="Cambria Math" panose="02040503050406030204" pitchFamily="18" charset="0"/>
+                              <a:cs typeface="Courier New" panose="02070309020205020404" pitchFamily="49" charset="0"/>
+                            </a:rPr>
+                            <m:t>8</m:t>
+                          </m:r>
+                        </m:den>
+                      </m:f>
+                      <m:r>
+                        <a:rPr lang="en-GB" sz="1600" b="0" i="1" smtClean="0">
+                          <a:latin typeface="Cambria Math" panose="02040503050406030204" pitchFamily="18" charset="0"/>
+                          <a:cs typeface="Courier New" panose="02070309020205020404" pitchFamily="49" charset="0"/>
+                        </a:rPr>
+                        <m:t>+</m:t>
+                      </m:r>
+                      <m:f>
+                        <m:fPr>
+                          <m:ctrlPr>
+                            <a:rPr lang="en-GB" sz="1600" b="0" i="1" smtClean="0">
+                              <a:latin typeface="Cambria Math" panose="02040503050406030204" pitchFamily="18" charset="0"/>
+                              <a:cs typeface="Courier New" panose="02070309020205020404" pitchFamily="49" charset="0"/>
+                            </a:rPr>
+                          </m:ctrlPr>
+                        </m:fPr>
+                        <m:num>
+                          <m:r>
+                            <a:rPr lang="en-GB" sz="1600" b="0" i="1" smtClean="0">
+                              <a:latin typeface="Cambria Math" panose="02040503050406030204" pitchFamily="18" charset="0"/>
+                              <a:cs typeface="Courier New" panose="02070309020205020404" pitchFamily="49" charset="0"/>
+                            </a:rPr>
+                            <m:t>1</m:t>
+                          </m:r>
+                        </m:num>
+                        <m:den>
+                          <m:r>
+                            <a:rPr lang="en-GB" sz="1600" b="0" i="1" smtClean="0">
+                              <a:latin typeface="Cambria Math" panose="02040503050406030204" pitchFamily="18" charset="0"/>
+                              <a:cs typeface="Courier New" panose="02070309020205020404" pitchFamily="49" charset="0"/>
+                            </a:rPr>
+                            <m:t>16</m:t>
+                          </m:r>
+                        </m:den>
+                      </m:f>
+                      <m:r>
+                        <a:rPr lang="en-GB" sz="1600" b="0" i="1" smtClean="0">
+                          <a:latin typeface="Cambria Math" panose="02040503050406030204" pitchFamily="18" charset="0"/>
+                          <a:cs typeface="Courier New" panose="02070309020205020404" pitchFamily="49" charset="0"/>
+                        </a:rPr>
+                        <m:t>+</m:t>
+                      </m:r>
+                      <m:f>
+                        <m:fPr>
+                          <m:ctrlPr>
+                            <a:rPr lang="en-GB" sz="1600" b="0" i="1" smtClean="0">
+                              <a:latin typeface="Cambria Math" panose="02040503050406030204" pitchFamily="18" charset="0"/>
+                              <a:cs typeface="Courier New" panose="02070309020205020404" pitchFamily="49" charset="0"/>
+                            </a:rPr>
+                          </m:ctrlPr>
+                        </m:fPr>
+                        <m:num>
+                          <m:r>
+                            <a:rPr lang="en-GB" sz="1600" b="0" i="1" smtClean="0">
+                              <a:latin typeface="Cambria Math" panose="02040503050406030204" pitchFamily="18" charset="0"/>
+                              <a:cs typeface="Courier New" panose="02070309020205020404" pitchFamily="49" charset="0"/>
+                            </a:rPr>
+                            <m:t>1</m:t>
+                          </m:r>
+                        </m:num>
+                        <m:den>
+                          <m:r>
+                            <a:rPr lang="en-GB" sz="1600" b="0" i="1" smtClean="0">
+                              <a:latin typeface="Cambria Math" panose="02040503050406030204" pitchFamily="18" charset="0"/>
+                              <a:cs typeface="Courier New" panose="02070309020205020404" pitchFamily="49" charset="0"/>
+                            </a:rPr>
+                            <m:t>32</m:t>
+                          </m:r>
+                        </m:den>
+                      </m:f>
+                      <m:r>
+                        <a:rPr lang="en-GB" sz="1600" b="0" i="1" smtClean="0">
+                          <a:latin typeface="Cambria Math" panose="02040503050406030204" pitchFamily="18" charset="0"/>
+                          <a:cs typeface="Courier New" panose="02070309020205020404" pitchFamily="49" charset="0"/>
+                        </a:rPr>
+                        <m:t>+</m:t>
+                      </m:r>
+                      <m:f>
+                        <m:fPr>
+                          <m:ctrlPr>
+                            <a:rPr lang="en-GB" sz="1600" b="0" i="1" smtClean="0">
+                              <a:latin typeface="Cambria Math" panose="02040503050406030204" pitchFamily="18" charset="0"/>
+                              <a:cs typeface="Courier New" panose="02070309020205020404" pitchFamily="49" charset="0"/>
+                            </a:rPr>
+                          </m:ctrlPr>
+                        </m:fPr>
+                        <m:num>
+                          <m:r>
+                            <a:rPr lang="en-GB" sz="1600" b="0" i="1" smtClean="0">
+                              <a:latin typeface="Cambria Math" panose="02040503050406030204" pitchFamily="18" charset="0"/>
+                              <a:cs typeface="Courier New" panose="02070309020205020404" pitchFamily="49" charset="0"/>
+                            </a:rPr>
+                            <m:t>1</m:t>
+                          </m:r>
+                        </m:num>
+                        <m:den>
+                          <m:r>
+                            <a:rPr lang="en-GB" sz="1600" b="0" i="1" smtClean="0">
+                              <a:latin typeface="Cambria Math" panose="02040503050406030204" pitchFamily="18" charset="0"/>
+                              <a:cs typeface="Courier New" panose="02070309020205020404" pitchFamily="49" charset="0"/>
+                            </a:rPr>
+                            <m:t>64</m:t>
+                          </m:r>
+                        </m:den>
+                      </m:f>
+                      <m:r>
+                        <a:rPr lang="en-GB" sz="1600" b="0" i="1" smtClean="0">
+                          <a:latin typeface="Cambria Math" panose="02040503050406030204" pitchFamily="18" charset="0"/>
+                          <a:cs typeface="Courier New" panose="02070309020205020404" pitchFamily="49" charset="0"/>
+                        </a:rPr>
+                        <m:t>+</m:t>
+                      </m:r>
+                      <m:f>
+                        <m:fPr>
+                          <m:ctrlPr>
+                            <a:rPr lang="en-GB" sz="1600" b="0" i="1" smtClean="0">
+                              <a:latin typeface="Cambria Math" panose="02040503050406030204" pitchFamily="18" charset="0"/>
+                              <a:cs typeface="Courier New" panose="02070309020205020404" pitchFamily="49" charset="0"/>
+                            </a:rPr>
+                          </m:ctrlPr>
+                        </m:fPr>
+                        <m:num>
+                          <m:r>
+                            <a:rPr lang="en-GB" sz="1600" b="0" i="1" smtClean="0">
+                              <a:latin typeface="Cambria Math" panose="02040503050406030204" pitchFamily="18" charset="0"/>
+                              <a:cs typeface="Courier New" panose="02070309020205020404" pitchFamily="49" charset="0"/>
+                            </a:rPr>
+                            <m:t>1</m:t>
+                          </m:r>
+                        </m:num>
+                        <m:den>
+                          <m:r>
+                            <a:rPr lang="en-GB" sz="1600" b="0" i="1" smtClean="0">
+                              <a:latin typeface="Cambria Math" panose="02040503050406030204" pitchFamily="18" charset="0"/>
+                              <a:cs typeface="Courier New" panose="02070309020205020404" pitchFamily="49" charset="0"/>
+                            </a:rPr>
+                            <m:t>128</m:t>
+                          </m:r>
+                        </m:den>
+                      </m:f>
+                      <m:r>
+                        <a:rPr lang="en-GB" sz="1600" b="0" i="1" smtClean="0">
+                          <a:latin typeface="Cambria Math" panose="02040503050406030204" pitchFamily="18" charset="0"/>
+                          <a:cs typeface="Courier New" panose="02070309020205020404" pitchFamily="49" charset="0"/>
+                        </a:rPr>
+                        <m:t>+</m:t>
+                      </m:r>
+                      <m:f>
+                        <m:fPr>
+                          <m:ctrlPr>
+                            <a:rPr lang="en-GB" sz="1600" b="0" i="1" smtClean="0">
+                              <a:latin typeface="Cambria Math" panose="02040503050406030204" pitchFamily="18" charset="0"/>
+                              <a:cs typeface="Courier New" panose="02070309020205020404" pitchFamily="49" charset="0"/>
+                            </a:rPr>
+                          </m:ctrlPr>
+                        </m:fPr>
+                        <m:num>
+                          <m:r>
+                            <a:rPr lang="en-GB" sz="1600" b="0" i="1" smtClean="0">
+                              <a:latin typeface="Cambria Math" panose="02040503050406030204" pitchFamily="18" charset="0"/>
+                              <a:cs typeface="Courier New" panose="02070309020205020404" pitchFamily="49" charset="0"/>
+                            </a:rPr>
+                            <m:t>1</m:t>
+                          </m:r>
+                        </m:num>
+                        <m:den>
+                          <m:r>
+                            <a:rPr lang="en-GB" sz="1600" b="0" i="1" smtClean="0">
+                              <a:latin typeface="Cambria Math" panose="02040503050406030204" pitchFamily="18" charset="0"/>
+                              <a:cs typeface="Courier New" panose="02070309020205020404" pitchFamily="49" charset="0"/>
+                            </a:rPr>
+                            <m:t>256</m:t>
+                          </m:r>
+                        </m:den>
+                      </m:f>
+                      <m:r>
+                        <a:rPr lang="en-GB" sz="1600" b="0" i="1" smtClean="0">
+                          <a:latin typeface="Cambria Math" panose="02040503050406030204" pitchFamily="18" charset="0"/>
+                          <a:cs typeface="Courier New" panose="02070309020205020404" pitchFamily="49" charset="0"/>
+                        </a:rPr>
+                        <m:t>+</m:t>
+                      </m:r>
+                      <m:f>
+                        <m:fPr>
+                          <m:ctrlPr>
+                            <a:rPr lang="en-GB" sz="1600" b="0" i="1" smtClean="0">
+                              <a:latin typeface="Cambria Math" panose="02040503050406030204" pitchFamily="18" charset="0"/>
+                              <a:cs typeface="Courier New" panose="02070309020205020404" pitchFamily="49" charset="0"/>
+                            </a:rPr>
+                          </m:ctrlPr>
+                        </m:fPr>
+                        <m:num>
+                          <m:r>
+                            <a:rPr lang="en-GB" sz="1600" b="0" i="1" smtClean="0">
+                              <a:latin typeface="Cambria Math" panose="02040503050406030204" pitchFamily="18" charset="0"/>
+                              <a:cs typeface="Courier New" panose="02070309020205020404" pitchFamily="49" charset="0"/>
+                            </a:rPr>
+                            <m:t>1</m:t>
+                          </m:r>
+                        </m:num>
+                        <m:den>
+                          <m:r>
+                            <a:rPr lang="en-GB" sz="1600" b="0" i="1" smtClean="0">
+                              <a:latin typeface="Cambria Math" panose="02040503050406030204" pitchFamily="18" charset="0"/>
+                              <a:cs typeface="Courier New" panose="02070309020205020404" pitchFamily="49" charset="0"/>
+                            </a:rPr>
+                            <m:t>512</m:t>
+                          </m:r>
+                        </m:den>
+                      </m:f>
+                    </m:oMath>
+                  </m:oMathPara>
+                </a14:m>
+                <a:endParaRPr lang="en-GB" sz="1600" dirty="0">
+                  <a:latin typeface="Courier New" panose="02070309020205020404" pitchFamily="49" charset="0"/>
+                  <a:cs typeface="Courier New" panose="02070309020205020404" pitchFamily="49" charset="0"/>
+                </a:endParaRPr>
+              </a:p>
+              <a:p>
+                <a:endParaRPr lang="en-GB" sz="1600" dirty="0">
+                  <a:latin typeface="Courier New" panose="02070309020205020404" pitchFamily="49" charset="0"/>
+                  <a:cs typeface="Courier New" panose="02070309020205020404" pitchFamily="49" charset="0"/>
+                </a:endParaRPr>
+              </a:p>
+              <a:p>
+                <a:r>
+                  <a:rPr lang="en-GB" dirty="0" smtClean="0"/>
+                  <a:t>Extend your program to add the first 10,000,000 numbers in this sequence together.</a:t>
+                </a:r>
+              </a:p>
+            </p:txBody>
+          </p:sp>
+        </mc:Choice>
+        <mc:Fallback>
+          <p:sp>
+            <p:nvSpPr>
+              <p:cNvPr id="3" name="Content Placeholder 2"/>
+              <p:cNvSpPr>
+                <a:spLocks noGrp="1" noRot="1" noChangeAspect="1" noMove="1" noResize="1" noEditPoints="1" noAdjustHandles="1" noChangeArrowheads="1" noChangeShapeType="1" noTextEdit="1"/>
+              </p:cNvSpPr>
+              <p:nvPr>
+                <p:ph idx="1"/>
+              </p:nvPr>
+            </p:nvSpPr>
+            <p:spPr>
+              <a:xfrm>
+                <a:off x="646110" y="2027583"/>
+                <a:ext cx="10453689" cy="4032250"/>
+              </a:xfrm>
+              <a:blipFill rotWithShape="0">
+                <a:blip r:embed="rId2"/>
+                <a:stretch>
+                  <a:fillRect l="-292" t="-908"/>
+                </a:stretch>
+              </a:blipFill>
+            </p:spPr>
+            <p:txBody>
+              <a:bodyPr/>
+              <a:lstStyle/>
+              <a:p>
+                <a:r>
+                  <a:rPr lang="en-GB">
+                    <a:noFill/>
+                  </a:rPr>
+                  <a:t> </a:t>
+                </a:r>
+              </a:p>
+            </p:txBody>
+          </p:sp>
+        </mc:Fallback>
+      </mc:AlternateContent>
+    </p:spTree>
+    <p:extLst>
+      <p:ext uri="{BB962C8B-B14F-4D97-AF65-F5344CB8AC3E}">
+        <p14:creationId xmlns:p14="http://schemas.microsoft.com/office/powerpoint/2010/main" val="1656900669"/>
+      </p:ext>
+    </p:extLst>
+  </p:cSld>
+  <p:clrMapOvr>
+    <a:masterClrMapping/>
+  </p:clrMapOvr>
+  <p:timing>
+    <p:tnLst>
+      <p:par>
+        <p:cTn id="1" dur="indefinite" restart="never" nodeType="tmRoot"/>
+      </p:par>
+    </p:tnLst>
+  </p:timing>
+</p:sld>
+</file>
+
+<file path=ppt/slides/slide37.xml><?xml version="1.0" encoding="utf-8"?>
+<p:sld xmlns:a="http://schemas.openxmlformats.org/drawingml/2006/main" xmlns:r="http://schemas.openxmlformats.org/officeDocument/2006/relationships" xmlns:p="http://schemas.openxmlformats.org/presentationml/2006/main">
+  <p:cSld>
+    <p:spTree>
+      <p:nvGrpSpPr>
+        <p:cNvPr id="1" name=""/>
+        <p:cNvGrpSpPr/>
+        <p:nvPr/>
+      </p:nvGrpSpPr>
+      <p:grpSpPr>
+        <a:xfrm>
+          <a:off x="0" y="0"/>
+          <a:ext cx="0" cy="0"/>
+          <a:chOff x="0" y="0"/>
+          <a:chExt cx="0" cy="0"/>
+        </a:xfrm>
+      </p:grpSpPr>
+      <p:sp>
+        <p:nvSpPr>
+          <p:cNvPr id="2" name="Title 1"/>
+          <p:cNvSpPr>
+            <a:spLocks noGrp="1"/>
+          </p:cNvSpPr>
+          <p:nvPr>
+            <p:ph type="title"/>
+          </p:nvPr>
+        </p:nvSpPr>
+        <p:spPr/>
+        <p:txBody>
+          <a:bodyPr/>
+          <a:lstStyle/>
+          <a:p>
+            <a:r>
+              <a:rPr lang="en-GB" dirty="0" smtClean="0"/>
+              <a:t>Next Week.</a:t>
+            </a:r>
+            <a:endParaRPr lang="en-GB" dirty="0"/>
+          </a:p>
+        </p:txBody>
+      </p:sp>
+      <p:sp>
+        <p:nvSpPr>
+          <p:cNvPr id="3" name="Content Placeholder 2"/>
+          <p:cNvSpPr>
+            <a:spLocks noGrp="1"/>
+          </p:cNvSpPr>
+          <p:nvPr>
+            <p:ph idx="1"/>
+          </p:nvPr>
+        </p:nvSpPr>
+        <p:spPr/>
+        <p:txBody>
+          <a:bodyPr/>
+          <a:lstStyle/>
+          <a:p>
+            <a:r>
+              <a:rPr lang="en-GB" dirty="0" smtClean="0"/>
+              <a:t>We will learn much more about lists.</a:t>
+            </a:r>
+          </a:p>
+          <a:p>
+            <a:endParaRPr lang="en-GB" dirty="0" smtClean="0"/>
+          </a:p>
+          <a:p>
+            <a:r>
+              <a:rPr lang="en-GB" dirty="0" smtClean="0"/>
+              <a:t>We will learn better methods to write some of the programs we wrote this week.</a:t>
+            </a:r>
+          </a:p>
+          <a:p>
+            <a:endParaRPr lang="en-GB" dirty="0"/>
+          </a:p>
+          <a:p>
+            <a:r>
+              <a:rPr lang="en-GB" dirty="0" smtClean="0"/>
+              <a:t>We will learn more about testing things with </a:t>
+            </a:r>
+            <a:r>
+              <a:rPr lang="en-GB" dirty="0" smtClean="0">
+                <a:latin typeface="Courier New" panose="02070309020205020404" pitchFamily="49" charset="0"/>
+                <a:cs typeface="Courier New" panose="02070309020205020404" pitchFamily="49" charset="0"/>
+              </a:rPr>
+              <a:t>if</a:t>
+            </a:r>
+            <a:r>
+              <a:rPr lang="en-GB" dirty="0" smtClean="0"/>
+              <a:t>.</a:t>
+            </a:r>
+          </a:p>
+          <a:p>
+            <a:endParaRPr lang="en-GB" dirty="0"/>
+          </a:p>
+          <a:p>
+            <a:r>
+              <a:rPr lang="en-GB" dirty="0" smtClean="0"/>
+              <a:t>We will learn how strings work a little bit like lists.</a:t>
+            </a:r>
+          </a:p>
+        </p:txBody>
+      </p:sp>
+    </p:spTree>
+    <p:extLst>
+      <p:ext uri="{BB962C8B-B14F-4D97-AF65-F5344CB8AC3E}">
+        <p14:creationId xmlns:p14="http://schemas.microsoft.com/office/powerpoint/2010/main" val="4053531929"/>
       </p:ext>
     </p:extLst>
   </p:cSld>

</xml_diff>

<commit_message>
Altered title page layout
</commit_message>
<xml_diff>
--- a/week3/week3.pptx
+++ b/week3/week3.pptx
@@ -251,7 +251,7 @@
           </a:lstStyle>
           <a:p>
             <a:r>
-              <a:rPr lang="en-US" smtClean="0"/>
+              <a:rPr lang="en-US"/>
               <a:t>Click to edit Master title style</a:t>
             </a:r>
             <a:endParaRPr lang="en-US" dirty="0"/>
@@ -371,7 +371,7 @@
           </a:lstStyle>
           <a:p>
             <a:r>
-              <a:rPr lang="en-US" smtClean="0"/>
+              <a:rPr lang="en-US"/>
               <a:t>Click to edit Master subtitle style</a:t>
             </a:r>
             <a:endParaRPr lang="en-US" dirty="0"/>
@@ -395,7 +395,7 @@
           <a:p>
             <a:fld id="{4AAD347D-5ACD-4C99-B74B-A9C85AD731AF}" type="datetimeFigureOut">
               <a:rPr lang="en-US" dirty="0"/>
-              <a:t>3/3/2018</a:t>
+              <a:t>6/27/2018</a:t>
             </a:fld>
             <a:endParaRPr lang="en-US" dirty="0"/>
           </a:p>
@@ -495,7 +495,7 @@
           </a:lstStyle>
           <a:p>
             <a:r>
-              <a:rPr lang="en-US" smtClean="0"/>
+              <a:rPr lang="en-US"/>
               <a:t>Click to edit Master title style</a:t>
             </a:r>
             <a:endParaRPr lang="en-US" dirty="0"/>
@@ -574,7 +574,7 @@
           </a:lstStyle>
           <a:p>
             <a:r>
-              <a:rPr lang="en-US" smtClean="0"/>
+              <a:rPr lang="en-US"/>
               <a:t>Click icon to add picture</a:t>
             </a:r>
             <a:endParaRPr lang="en-US" dirty="0"/>
@@ -642,7 +642,7 @@
           <a:p>
             <a:pPr lvl="0"/>
             <a:r>
-              <a:rPr lang="en-US" smtClean="0"/>
+              <a:rPr lang="en-US"/>
               <a:t>Click to edit Master text styles</a:t>
             </a:r>
           </a:p>
@@ -665,7 +665,7 @@
           <a:p>
             <a:fld id="{4509A250-FF31-4206-8172-F9D3106AACB1}" type="datetimeFigureOut">
               <a:rPr lang="en-US" dirty="0"/>
-              <a:t>3/3/2018</a:t>
+              <a:t>6/27/2018</a:t>
             </a:fld>
             <a:endParaRPr lang="en-US" dirty="0"/>
           </a:p>
@@ -763,7 +763,7 @@
           </a:lstStyle>
           <a:p>
             <a:r>
-              <a:rPr lang="en-US" smtClean="0"/>
+              <a:rPr lang="en-US"/>
               <a:t>Click to edit Master title style</a:t>
             </a:r>
             <a:endParaRPr lang="en-US" dirty="0"/>
@@ -831,7 +831,7 @@
           <a:p>
             <a:pPr lvl="0"/>
             <a:r>
-              <a:rPr lang="en-US" smtClean="0"/>
+              <a:rPr lang="en-US"/>
               <a:t>Click to edit Master text styles</a:t>
             </a:r>
           </a:p>
@@ -854,7 +854,7 @@
           <a:p>
             <a:fld id="{4509A250-FF31-4206-8172-F9D3106AACB1}" type="datetimeFigureOut">
               <a:rPr lang="en-US" dirty="0"/>
-              <a:t>3/3/2018</a:t>
+              <a:t>6/27/2018</a:t>
             </a:fld>
             <a:endParaRPr lang="en-US" dirty="0"/>
           </a:p>
@@ -952,7 +952,7 @@
           </a:lstStyle>
           <a:p>
             <a:r>
-              <a:rPr lang="en-US" smtClean="0"/>
+              <a:rPr lang="en-US"/>
               <a:t>Click to edit Master title style</a:t>
             </a:r>
             <a:endParaRPr lang="en-US" dirty="0"/>
@@ -1032,7 +1032,7 @@
               <a:buNone/>
             </a:pPr>
             <a:r>
-              <a:rPr lang="en-US" smtClean="0"/>
+              <a:rPr lang="en-US"/>
               <a:t>Click to edit Master text styles</a:t>
             </a:r>
           </a:p>
@@ -1099,7 +1099,7 @@
           <a:p>
             <a:pPr lvl="0"/>
             <a:r>
-              <a:rPr lang="en-US" smtClean="0"/>
+              <a:rPr lang="en-US"/>
               <a:t>Click to edit Master text styles</a:t>
             </a:r>
           </a:p>
@@ -1122,7 +1122,7 @@
           <a:p>
             <a:fld id="{4509A250-FF31-4206-8172-F9D3106AACB1}" type="datetimeFigureOut">
               <a:rPr lang="en-US" dirty="0"/>
-              <a:t>3/3/2018</a:t>
+              <a:t>6/27/2018</a:t>
             </a:fld>
             <a:endParaRPr lang="en-US" dirty="0"/>
           </a:p>
@@ -1314,7 +1314,7 @@
           </a:lstStyle>
           <a:p>
             <a:r>
-              <a:rPr lang="en-US" smtClean="0"/>
+              <a:rPr lang="en-US"/>
               <a:t>Click to edit Master title style</a:t>
             </a:r>
             <a:endParaRPr lang="en-US" dirty="0"/>
@@ -1435,7 +1435,7 @@
           <a:p>
             <a:pPr lvl="0"/>
             <a:r>
-              <a:rPr lang="en-US" smtClean="0"/>
+              <a:rPr lang="en-US"/>
               <a:t>Click to edit Master text styles</a:t>
             </a:r>
           </a:p>
@@ -1458,7 +1458,7 @@
           <a:p>
             <a:fld id="{4509A250-FF31-4206-8172-F9D3106AACB1}" type="datetimeFigureOut">
               <a:rPr lang="en-US" dirty="0"/>
-              <a:t>3/3/2018</a:t>
+              <a:t>6/27/2018</a:t>
             </a:fld>
             <a:endParaRPr lang="en-US" dirty="0"/>
           </a:p>
@@ -1551,7 +1551,7 @@
           </a:lstStyle>
           <a:p>
             <a:r>
-              <a:rPr lang="en-US" smtClean="0"/>
+              <a:rPr lang="en-US"/>
               <a:t>Click to edit Master title style</a:t>
             </a:r>
             <a:endParaRPr lang="en-US" dirty="0"/>
@@ -1626,7 +1626,7 @@
           <a:p>
             <a:pPr lvl="0"/>
             <a:r>
-              <a:rPr lang="en-US" smtClean="0"/>
+              <a:rPr lang="en-US"/>
               <a:t>Click to edit Master text styles</a:t>
             </a:r>
           </a:p>
@@ -1693,7 +1693,7 @@
           <a:p>
             <a:pPr lvl="0"/>
             <a:r>
-              <a:rPr lang="en-US" smtClean="0"/>
+              <a:rPr lang="en-US"/>
               <a:t>Click to edit Master text styles</a:t>
             </a:r>
           </a:p>
@@ -1767,7 +1767,7 @@
           <a:p>
             <a:pPr lvl="0"/>
             <a:r>
-              <a:rPr lang="en-US" smtClean="0"/>
+              <a:rPr lang="en-US"/>
               <a:t>Click to edit Master text styles</a:t>
             </a:r>
           </a:p>
@@ -1834,7 +1834,7 @@
           <a:p>
             <a:pPr lvl="0"/>
             <a:r>
-              <a:rPr lang="en-US" smtClean="0"/>
+              <a:rPr lang="en-US"/>
               <a:t>Click to edit Master text styles</a:t>
             </a:r>
           </a:p>
@@ -1908,7 +1908,7 @@
           <a:p>
             <a:pPr lvl="0"/>
             <a:r>
-              <a:rPr lang="en-US" smtClean="0"/>
+              <a:rPr lang="en-US"/>
               <a:t>Click to edit Master text styles</a:t>
             </a:r>
           </a:p>
@@ -1975,7 +1975,7 @@
           <a:p>
             <a:pPr lvl="0"/>
             <a:r>
-              <a:rPr lang="en-US" smtClean="0"/>
+              <a:rPr lang="en-US"/>
               <a:t>Click to edit Master text styles</a:t>
             </a:r>
           </a:p>
@@ -2076,7 +2076,7 @@
           <a:p>
             <a:fld id="{4509A250-FF31-4206-8172-F9D3106AACB1}" type="datetimeFigureOut">
               <a:rPr lang="en-US" dirty="0"/>
-              <a:t>3/3/2018</a:t>
+              <a:t>6/27/2018</a:t>
             </a:fld>
             <a:endParaRPr lang="en-US" dirty="0"/>
           </a:p>
@@ -2169,7 +2169,7 @@
           </a:lstStyle>
           <a:p>
             <a:r>
-              <a:rPr lang="en-US" smtClean="0"/>
+              <a:rPr lang="en-US"/>
               <a:t>Click to edit Master title style</a:t>
             </a:r>
             <a:endParaRPr lang="en-US" dirty="0"/>
@@ -2244,7 +2244,7 @@
           <a:p>
             <a:pPr lvl="0"/>
             <a:r>
-              <a:rPr lang="en-US" smtClean="0"/>
+              <a:rPr lang="en-US"/>
               <a:t>Click to edit Master text styles</a:t>
             </a:r>
           </a:p>
@@ -2322,7 +2322,7 @@
           </a:lstStyle>
           <a:p>
             <a:r>
-              <a:rPr lang="en-US" smtClean="0"/>
+              <a:rPr lang="en-US"/>
               <a:t>Click icon to add picture</a:t>
             </a:r>
             <a:endParaRPr lang="en-US" dirty="0"/>
@@ -2390,7 +2390,7 @@
           <a:p>
             <a:pPr lvl="0"/>
             <a:r>
-              <a:rPr lang="en-US" smtClean="0"/>
+              <a:rPr lang="en-US"/>
               <a:t>Click to edit Master text styles</a:t>
             </a:r>
           </a:p>
@@ -2464,7 +2464,7 @@
           <a:p>
             <a:pPr lvl="0"/>
             <a:r>
-              <a:rPr lang="en-US" smtClean="0"/>
+              <a:rPr lang="en-US"/>
               <a:t>Click to edit Master text styles</a:t>
             </a:r>
           </a:p>
@@ -2542,7 +2542,7 @@
           </a:lstStyle>
           <a:p>
             <a:r>
-              <a:rPr lang="en-US" smtClean="0"/>
+              <a:rPr lang="en-US"/>
               <a:t>Click icon to add picture</a:t>
             </a:r>
             <a:endParaRPr lang="en-US" dirty="0"/>
@@ -2610,7 +2610,7 @@
           <a:p>
             <a:pPr lvl="0"/>
             <a:r>
-              <a:rPr lang="en-US" smtClean="0"/>
+              <a:rPr lang="en-US"/>
               <a:t>Click to edit Master text styles</a:t>
             </a:r>
           </a:p>
@@ -2684,7 +2684,7 @@
           <a:p>
             <a:pPr lvl="0"/>
             <a:r>
-              <a:rPr lang="en-US" smtClean="0"/>
+              <a:rPr lang="en-US"/>
               <a:t>Click to edit Master text styles</a:t>
             </a:r>
           </a:p>
@@ -2762,7 +2762,7 @@
           </a:lstStyle>
           <a:p>
             <a:r>
-              <a:rPr lang="en-US" smtClean="0"/>
+              <a:rPr lang="en-US"/>
               <a:t>Click icon to add picture</a:t>
             </a:r>
             <a:endParaRPr lang="en-US" dirty="0"/>
@@ -2830,7 +2830,7 @@
           <a:p>
             <a:pPr lvl="0"/>
             <a:r>
-              <a:rPr lang="en-US" smtClean="0"/>
+              <a:rPr lang="en-US"/>
               <a:t>Click to edit Master text styles</a:t>
             </a:r>
           </a:p>
@@ -2931,7 +2931,7 @@
           <a:p>
             <a:fld id="{4509A250-FF31-4206-8172-F9D3106AACB1}" type="datetimeFigureOut">
               <a:rPr lang="en-US" dirty="0"/>
-              <a:t>3/3/2018</a:t>
+              <a:t>6/27/2018</a:t>
             </a:fld>
             <a:endParaRPr lang="en-US" dirty="0"/>
           </a:p>
@@ -3020,7 +3020,7 @@
           <a:lstStyle/>
           <a:p>
             <a:r>
-              <a:rPr lang="en-US" smtClean="0"/>
+              <a:rPr lang="en-US"/>
               <a:t>Click to edit Master title style</a:t>
             </a:r>
             <a:endParaRPr lang="en-US" dirty="0"/>
@@ -3044,35 +3044,35 @@
           <a:p>
             <a:pPr lvl="0"/>
             <a:r>
-              <a:rPr lang="en-US" smtClean="0"/>
+              <a:rPr lang="en-US"/>
               <a:t>Click to edit Master text styles</a:t>
             </a:r>
           </a:p>
           <a:p>
             <a:pPr lvl="1"/>
             <a:r>
-              <a:rPr lang="en-US" smtClean="0"/>
+              <a:rPr lang="en-US"/>
               <a:t>Second level</a:t>
             </a:r>
           </a:p>
           <a:p>
             <a:pPr lvl="2"/>
             <a:r>
-              <a:rPr lang="en-US" smtClean="0"/>
+              <a:rPr lang="en-US"/>
               <a:t>Third level</a:t>
             </a:r>
           </a:p>
           <a:p>
             <a:pPr lvl="3"/>
             <a:r>
-              <a:rPr lang="en-US" smtClean="0"/>
+              <a:rPr lang="en-US"/>
               <a:t>Fourth level</a:t>
             </a:r>
           </a:p>
           <a:p>
             <a:pPr lvl="4"/>
             <a:r>
-              <a:rPr lang="en-US" smtClean="0"/>
+              <a:rPr lang="en-US"/>
               <a:t>Fifth level</a:t>
             </a:r>
             <a:endParaRPr lang="en-US" dirty="0"/>
@@ -3096,7 +3096,7 @@
           <a:p>
             <a:fld id="{4509A250-FF31-4206-8172-F9D3106AACB1}" type="datetimeFigureOut">
               <a:rPr lang="en-US" dirty="0"/>
-              <a:t>3/3/2018</a:t>
+              <a:t>6/27/2018</a:t>
             </a:fld>
             <a:endParaRPr lang="en-US" dirty="0"/>
           </a:p>
@@ -3190,7 +3190,7 @@
           <a:lstStyle/>
           <a:p>
             <a:r>
-              <a:rPr lang="en-US" smtClean="0"/>
+              <a:rPr lang="en-US"/>
               <a:t>Click to edit Master title style</a:t>
             </a:r>
             <a:endParaRPr lang="en-US" dirty="0"/>
@@ -3219,35 +3219,35 @@
           <a:p>
             <a:pPr lvl="0"/>
             <a:r>
-              <a:rPr lang="en-US" smtClean="0"/>
+              <a:rPr lang="en-US"/>
               <a:t>Click to edit Master text styles</a:t>
             </a:r>
           </a:p>
           <a:p>
             <a:pPr lvl="1"/>
             <a:r>
-              <a:rPr lang="en-US" smtClean="0"/>
+              <a:rPr lang="en-US"/>
               <a:t>Second level</a:t>
             </a:r>
           </a:p>
           <a:p>
             <a:pPr lvl="2"/>
             <a:r>
-              <a:rPr lang="en-US" smtClean="0"/>
+              <a:rPr lang="en-US"/>
               <a:t>Third level</a:t>
             </a:r>
           </a:p>
           <a:p>
             <a:pPr lvl="3"/>
             <a:r>
-              <a:rPr lang="en-US" smtClean="0"/>
+              <a:rPr lang="en-US"/>
               <a:t>Fourth level</a:t>
             </a:r>
           </a:p>
           <a:p>
             <a:pPr lvl="4"/>
             <a:r>
-              <a:rPr lang="en-US" smtClean="0"/>
+              <a:rPr lang="en-US"/>
               <a:t>Fifth level</a:t>
             </a:r>
             <a:endParaRPr lang="en-US" dirty="0"/>
@@ -3271,7 +3271,7 @@
           <a:p>
             <a:fld id="{4509A250-FF31-4206-8172-F9D3106AACB1}" type="datetimeFigureOut">
               <a:rPr lang="en-US" dirty="0"/>
-              <a:t>3/3/2018</a:t>
+              <a:t>6/27/2018</a:t>
             </a:fld>
             <a:endParaRPr lang="en-US" dirty="0"/>
           </a:p>
@@ -3360,7 +3360,7 @@
           <a:lstStyle/>
           <a:p>
             <a:r>
-              <a:rPr lang="en-US" smtClean="0"/>
+              <a:rPr lang="en-US"/>
               <a:t>Click to edit Master title style</a:t>
             </a:r>
             <a:endParaRPr lang="en-US" dirty="0"/>
@@ -3384,35 +3384,35 @@
           <a:p>
             <a:pPr lvl="0"/>
             <a:r>
-              <a:rPr lang="en-US" smtClean="0"/>
+              <a:rPr lang="en-US"/>
               <a:t>Click to edit Master text styles</a:t>
             </a:r>
           </a:p>
           <a:p>
             <a:pPr lvl="1"/>
             <a:r>
-              <a:rPr lang="en-US" smtClean="0"/>
+              <a:rPr lang="en-US"/>
               <a:t>Second level</a:t>
             </a:r>
           </a:p>
           <a:p>
             <a:pPr lvl="2"/>
             <a:r>
-              <a:rPr lang="en-US" smtClean="0"/>
+              <a:rPr lang="en-US"/>
               <a:t>Third level</a:t>
             </a:r>
           </a:p>
           <a:p>
             <a:pPr lvl="3"/>
             <a:r>
-              <a:rPr lang="en-US" smtClean="0"/>
+              <a:rPr lang="en-US"/>
               <a:t>Fourth level</a:t>
             </a:r>
           </a:p>
           <a:p>
             <a:pPr lvl="4"/>
             <a:r>
-              <a:rPr lang="en-US" smtClean="0"/>
+              <a:rPr lang="en-US"/>
               <a:t>Fifth level</a:t>
             </a:r>
             <a:endParaRPr lang="en-US" dirty="0"/>
@@ -3436,7 +3436,7 @@
           <a:p>
             <a:fld id="{4509A250-FF31-4206-8172-F9D3106AACB1}" type="datetimeFigureOut">
               <a:rPr lang="en-US" dirty="0"/>
-              <a:t>3/3/2018</a:t>
+              <a:t>6/27/2018</a:t>
             </a:fld>
             <a:endParaRPr lang="en-US" dirty="0"/>
           </a:p>
@@ -3534,7 +3534,7 @@
           </a:lstStyle>
           <a:p>
             <a:r>
-              <a:rPr lang="en-US" smtClean="0"/>
+              <a:rPr lang="en-US"/>
               <a:t>Click to edit Master title style</a:t>
             </a:r>
             <a:endParaRPr lang="en-US" dirty="0"/>
@@ -3655,7 +3655,7 @@
           <a:p>
             <a:pPr lvl="0"/>
             <a:r>
-              <a:rPr lang="en-US" smtClean="0"/>
+              <a:rPr lang="en-US"/>
               <a:t>Click to edit Master text styles</a:t>
             </a:r>
           </a:p>
@@ -3678,7 +3678,7 @@
           <a:p>
             <a:fld id="{9796027F-7875-4030-9381-8BD8C4F21935}" type="datetimeFigureOut">
               <a:rPr lang="en-US" dirty="0"/>
-              <a:t>3/3/2018</a:t>
+              <a:t>6/27/2018</a:t>
             </a:fld>
             <a:endParaRPr lang="en-US" dirty="0"/>
           </a:p>
@@ -3767,7 +3767,7 @@
           <a:lstStyle/>
           <a:p>
             <a:r>
-              <a:rPr lang="en-US" smtClean="0"/>
+              <a:rPr lang="en-US"/>
               <a:t>Click to edit Master title style</a:t>
             </a:r>
             <a:endParaRPr lang="en-US" dirty="0"/>
@@ -3826,35 +3826,35 @@
           <a:p>
             <a:pPr lvl="0"/>
             <a:r>
-              <a:rPr lang="en-US" smtClean="0"/>
+              <a:rPr lang="en-US"/>
               <a:t>Click to edit Master text styles</a:t>
             </a:r>
           </a:p>
           <a:p>
             <a:pPr lvl="1"/>
             <a:r>
-              <a:rPr lang="en-US" smtClean="0"/>
+              <a:rPr lang="en-US"/>
               <a:t>Second level</a:t>
             </a:r>
           </a:p>
           <a:p>
             <a:pPr lvl="2"/>
             <a:r>
-              <a:rPr lang="en-US" smtClean="0"/>
+              <a:rPr lang="en-US"/>
               <a:t>Third level</a:t>
             </a:r>
           </a:p>
           <a:p>
             <a:pPr lvl="3"/>
             <a:r>
-              <a:rPr lang="en-US" smtClean="0"/>
+              <a:rPr lang="en-US"/>
               <a:t>Fourth level</a:t>
             </a:r>
           </a:p>
           <a:p>
             <a:pPr lvl="4"/>
             <a:r>
-              <a:rPr lang="en-US" smtClean="0"/>
+              <a:rPr lang="en-US"/>
               <a:t>Fifth level</a:t>
             </a:r>
             <a:endParaRPr lang="en-US" dirty="0"/>
@@ -3913,35 +3913,35 @@
           <a:p>
             <a:pPr lvl="0"/>
             <a:r>
-              <a:rPr lang="en-US" smtClean="0"/>
+              <a:rPr lang="en-US"/>
               <a:t>Click to edit Master text styles</a:t>
             </a:r>
           </a:p>
           <a:p>
             <a:pPr lvl="1"/>
             <a:r>
-              <a:rPr lang="en-US" smtClean="0"/>
+              <a:rPr lang="en-US"/>
               <a:t>Second level</a:t>
             </a:r>
           </a:p>
           <a:p>
             <a:pPr lvl="2"/>
             <a:r>
-              <a:rPr lang="en-US" smtClean="0"/>
+              <a:rPr lang="en-US"/>
               <a:t>Third level</a:t>
             </a:r>
           </a:p>
           <a:p>
             <a:pPr lvl="3"/>
             <a:r>
-              <a:rPr lang="en-US" smtClean="0"/>
+              <a:rPr lang="en-US"/>
               <a:t>Fourth level</a:t>
             </a:r>
           </a:p>
           <a:p>
             <a:pPr lvl="4"/>
             <a:r>
-              <a:rPr lang="en-US" smtClean="0"/>
+              <a:rPr lang="en-US"/>
               <a:t>Fifth level</a:t>
             </a:r>
             <a:endParaRPr lang="en-US" dirty="0"/>
@@ -3965,7 +3965,7 @@
           <a:p>
             <a:fld id="{9796027F-7875-4030-9381-8BD8C4F21935}" type="datetimeFigureOut">
               <a:rPr lang="en-US" dirty="0"/>
-              <a:t>3/3/2018</a:t>
+              <a:t>6/27/2018</a:t>
             </a:fld>
             <a:endParaRPr lang="en-US" dirty="0"/>
           </a:p>
@@ -4058,7 +4058,7 @@
           </a:lstStyle>
           <a:p>
             <a:r>
-              <a:rPr lang="en-US" smtClean="0"/>
+              <a:rPr lang="en-US"/>
               <a:t>Click to edit Master title style</a:t>
             </a:r>
             <a:endParaRPr lang="en-US" dirty="0"/>
@@ -4133,7 +4133,7 @@
           <a:p>
             <a:pPr lvl="0"/>
             <a:r>
-              <a:rPr lang="en-US" smtClean="0"/>
+              <a:rPr lang="en-US"/>
               <a:t>Click to edit Master text styles</a:t>
             </a:r>
           </a:p>
@@ -4191,35 +4191,35 @@
           <a:p>
             <a:pPr lvl="0"/>
             <a:r>
-              <a:rPr lang="en-US" smtClean="0"/>
+              <a:rPr lang="en-US"/>
               <a:t>Click to edit Master text styles</a:t>
             </a:r>
           </a:p>
           <a:p>
             <a:pPr lvl="1"/>
             <a:r>
-              <a:rPr lang="en-US" smtClean="0"/>
+              <a:rPr lang="en-US"/>
               <a:t>Second level</a:t>
             </a:r>
           </a:p>
           <a:p>
             <a:pPr lvl="2"/>
             <a:r>
-              <a:rPr lang="en-US" smtClean="0"/>
+              <a:rPr lang="en-US"/>
               <a:t>Third level</a:t>
             </a:r>
           </a:p>
           <a:p>
             <a:pPr lvl="3"/>
             <a:r>
-              <a:rPr lang="en-US" smtClean="0"/>
+              <a:rPr lang="en-US"/>
               <a:t>Fourth level</a:t>
             </a:r>
           </a:p>
           <a:p>
             <a:pPr lvl="4"/>
             <a:r>
-              <a:rPr lang="en-US" smtClean="0"/>
+              <a:rPr lang="en-US"/>
               <a:t>Fifth level</a:t>
             </a:r>
             <a:endParaRPr lang="en-US" dirty="0"/>
@@ -4294,7 +4294,7 @@
           <a:p>
             <a:pPr lvl="0"/>
             <a:r>
-              <a:rPr lang="en-US" smtClean="0"/>
+              <a:rPr lang="en-US"/>
               <a:t>Click to edit Master text styles</a:t>
             </a:r>
           </a:p>
@@ -4352,35 +4352,35 @@
           <a:p>
             <a:pPr lvl="0"/>
             <a:r>
-              <a:rPr lang="en-US" smtClean="0"/>
+              <a:rPr lang="en-US"/>
               <a:t>Click to edit Master text styles</a:t>
             </a:r>
           </a:p>
           <a:p>
             <a:pPr lvl="1"/>
             <a:r>
-              <a:rPr lang="en-US" smtClean="0"/>
+              <a:rPr lang="en-US"/>
               <a:t>Second level</a:t>
             </a:r>
           </a:p>
           <a:p>
             <a:pPr lvl="2"/>
             <a:r>
-              <a:rPr lang="en-US" smtClean="0"/>
+              <a:rPr lang="en-US"/>
               <a:t>Third level</a:t>
             </a:r>
           </a:p>
           <a:p>
             <a:pPr lvl="3"/>
             <a:r>
-              <a:rPr lang="en-US" smtClean="0"/>
+              <a:rPr lang="en-US"/>
               <a:t>Fourth level</a:t>
             </a:r>
           </a:p>
           <a:p>
             <a:pPr lvl="4"/>
             <a:r>
-              <a:rPr lang="en-US" smtClean="0"/>
+              <a:rPr lang="en-US"/>
               <a:t>Fifth level</a:t>
             </a:r>
             <a:endParaRPr lang="en-US" dirty="0"/>
@@ -4404,7 +4404,7 @@
           <a:p>
             <a:fld id="{9796027F-7875-4030-9381-8BD8C4F21935}" type="datetimeFigureOut">
               <a:rPr lang="en-US" dirty="0"/>
-              <a:t>3/3/2018</a:t>
+              <a:t>6/27/2018</a:t>
             </a:fld>
             <a:endParaRPr lang="en-US" dirty="0"/>
           </a:p>
@@ -4493,7 +4493,7 @@
           <a:lstStyle/>
           <a:p>
             <a:r>
-              <a:rPr lang="en-US" smtClean="0"/>
+              <a:rPr lang="en-US"/>
               <a:t>Click to edit Master title style</a:t>
             </a:r>
             <a:endParaRPr lang="en-US" dirty="0"/>
@@ -4517,7 +4517,7 @@
           <a:p>
             <a:fld id="{4509A250-FF31-4206-8172-F9D3106AACB1}" type="datetimeFigureOut">
               <a:rPr lang="en-US" dirty="0"/>
-              <a:t>3/3/2018</a:t>
+              <a:t>6/27/2018</a:t>
             </a:fld>
             <a:endParaRPr lang="en-US" dirty="0"/>
           </a:p>
@@ -4607,7 +4607,7 @@
           <a:p>
             <a:fld id="{4509A250-FF31-4206-8172-F9D3106AACB1}" type="datetimeFigureOut">
               <a:rPr lang="en-US" dirty="0"/>
-              <a:t>3/3/2018</a:t>
+              <a:t>6/27/2018</a:t>
             </a:fld>
             <a:endParaRPr lang="en-US" dirty="0"/>
           </a:p>
@@ -4705,7 +4705,7 @@
           </a:lstStyle>
           <a:p>
             <a:r>
-              <a:rPr lang="en-US" smtClean="0"/>
+              <a:rPr lang="en-US"/>
               <a:t>Click to edit Master title style</a:t>
             </a:r>
             <a:endParaRPr lang="en-US" dirty="0"/>
@@ -4764,35 +4764,35 @@
           <a:p>
             <a:pPr lvl="0"/>
             <a:r>
-              <a:rPr lang="en-US" smtClean="0"/>
+              <a:rPr lang="en-US"/>
               <a:t>Click to edit Master text styles</a:t>
             </a:r>
           </a:p>
           <a:p>
             <a:pPr lvl="1"/>
             <a:r>
-              <a:rPr lang="en-US" smtClean="0"/>
+              <a:rPr lang="en-US"/>
               <a:t>Second level</a:t>
             </a:r>
           </a:p>
           <a:p>
             <a:pPr lvl="2"/>
             <a:r>
-              <a:rPr lang="en-US" smtClean="0"/>
+              <a:rPr lang="en-US"/>
               <a:t>Third level</a:t>
             </a:r>
           </a:p>
           <a:p>
             <a:pPr lvl="3"/>
             <a:r>
-              <a:rPr lang="en-US" smtClean="0"/>
+              <a:rPr lang="en-US"/>
               <a:t>Fourth level</a:t>
             </a:r>
           </a:p>
           <a:p>
             <a:pPr lvl="4"/>
             <a:r>
-              <a:rPr lang="en-US" smtClean="0"/>
+              <a:rPr lang="en-US"/>
               <a:t>Fifth level</a:t>
             </a:r>
             <a:endParaRPr lang="en-US" dirty="0"/>
@@ -4858,7 +4858,7 @@
           <a:p>
             <a:pPr lvl="0"/>
             <a:r>
-              <a:rPr lang="en-US" smtClean="0"/>
+              <a:rPr lang="en-US"/>
               <a:t>Click to edit Master text styles</a:t>
             </a:r>
           </a:p>
@@ -4881,7 +4881,7 @@
           <a:p>
             <a:fld id="{4509A250-FF31-4206-8172-F9D3106AACB1}" type="datetimeFigureOut">
               <a:rPr lang="en-US" dirty="0"/>
-              <a:t>3/3/2018</a:t>
+              <a:t>6/27/2018</a:t>
             </a:fld>
             <a:endParaRPr lang="en-US" dirty="0"/>
           </a:p>
@@ -4981,7 +4981,7 @@
           </a:lstStyle>
           <a:p>
             <a:r>
-              <a:rPr lang="en-US" smtClean="0"/>
+              <a:rPr lang="en-US"/>
               <a:t>Click to edit Master title style</a:t>
             </a:r>
             <a:endParaRPr lang="en-US" dirty="0"/>
@@ -5060,7 +5060,7 @@
           </a:lstStyle>
           <a:p>
             <a:r>
-              <a:rPr lang="en-US" smtClean="0"/>
+              <a:rPr lang="en-US"/>
               <a:t>Click icon to add picture</a:t>
             </a:r>
             <a:endParaRPr lang="en-US" dirty="0"/>
@@ -5128,7 +5128,7 @@
           <a:p>
             <a:pPr lvl="0"/>
             <a:r>
-              <a:rPr lang="en-US" smtClean="0"/>
+              <a:rPr lang="en-US"/>
               <a:t>Click to edit Master text styles</a:t>
             </a:r>
           </a:p>
@@ -5151,7 +5151,7 @@
           <a:p>
             <a:fld id="{4509A250-FF31-4206-8172-F9D3106AACB1}" type="datetimeFigureOut">
               <a:rPr lang="en-US" dirty="0"/>
-              <a:t>3/3/2018</a:t>
+              <a:t>6/27/2018</a:t>
             </a:fld>
             <a:endParaRPr lang="en-US" dirty="0"/>
           </a:p>
@@ -5470,7 +5470,7 @@
           <a:lstStyle/>
           <a:p>
             <a:r>
-              <a:rPr lang="en-US" smtClean="0"/>
+              <a:rPr lang="en-US"/>
               <a:t>Click to edit Master title style</a:t>
             </a:r>
             <a:endParaRPr lang="en-US" dirty="0"/>
@@ -5504,35 +5504,35 @@
           <a:p>
             <a:pPr lvl="0"/>
             <a:r>
-              <a:rPr lang="en-US" smtClean="0"/>
+              <a:rPr lang="en-US"/>
               <a:t>Click to edit Master text styles</a:t>
             </a:r>
           </a:p>
           <a:p>
             <a:pPr lvl="1"/>
             <a:r>
-              <a:rPr lang="en-US" smtClean="0"/>
+              <a:rPr lang="en-US"/>
               <a:t>Second level</a:t>
             </a:r>
           </a:p>
           <a:p>
             <a:pPr lvl="2"/>
             <a:r>
-              <a:rPr lang="en-US" smtClean="0"/>
+              <a:rPr lang="en-US"/>
               <a:t>Third level</a:t>
             </a:r>
           </a:p>
           <a:p>
             <a:pPr lvl="3"/>
             <a:r>
-              <a:rPr lang="en-US" smtClean="0"/>
+              <a:rPr lang="en-US"/>
               <a:t>Fourth level</a:t>
             </a:r>
           </a:p>
           <a:p>
             <a:pPr lvl="4"/>
             <a:r>
-              <a:rPr lang="en-US" smtClean="0"/>
+              <a:rPr lang="en-US"/>
               <a:t>Fifth level</a:t>
             </a:r>
             <a:endParaRPr lang="en-US" dirty="0"/>
@@ -5575,7 +5575,7 @@
           <a:p>
             <a:fld id="{4AAD347D-5ACD-4C99-B74B-A9C85AD731AF}" type="datetimeFigureOut">
               <a:rPr lang="en-US" dirty="0"/>
-              <a:t>3/3/2018</a:t>
+              <a:t>6/27/2018</a:t>
             </a:fld>
             <a:endParaRPr lang="en-US" dirty="0"/>
           </a:p>
@@ -6115,11 +6115,11 @@
           <a:lstStyle/>
           <a:p>
             <a:r>
-              <a:rPr lang="en-GB" dirty="0" smtClean="0"/>
+              <a:rPr lang="en-GB" dirty="0"/>
               <a:t>Learning Python 3</a:t>
             </a:r>
             <a:br>
-              <a:rPr lang="en-GB" dirty="0" smtClean="0"/>
+              <a:rPr lang="en-GB" dirty="0"/>
             </a:br>
             <a:endParaRPr lang="en-GB" dirty="0"/>
           </a:p>
@@ -6135,16 +6135,34 @@
             <p:ph type="subTitle" idx="1"/>
           </p:nvPr>
         </p:nvSpPr>
-        <p:spPr/>
-        <p:txBody>
-          <a:bodyPr/>
+        <p:spPr>
+          <a:xfrm>
+            <a:off x="1154955" y="4364611"/>
+            <a:ext cx="8825658" cy="2234152"/>
+          </a:xfrm>
+        </p:spPr>
+        <p:txBody>
+          <a:bodyPr>
+            <a:normAutofit/>
+          </a:bodyPr>
           <a:lstStyle/>
           <a:p>
             <a:r>
-              <a:rPr lang="en-GB" dirty="0" smtClean="0"/>
-              <a:t>Week 3: Strings and numbers combined, more loop structures and lists.</a:t>
-            </a:r>
-            <a:endParaRPr lang="en-GB" dirty="0"/>
+              <a:rPr lang="en-GB" dirty="0"/>
+              <a:t>Week 3: </a:t>
+            </a:r>
+          </a:p>
+          <a:p>
+            <a:r>
+              <a:rPr lang="en-GB" dirty="0"/>
+              <a:t>Strings and numbers combined</a:t>
+            </a:r>
+          </a:p>
+          <a:p>
+            <a:r>
+              <a:rPr lang="en-GB" dirty="0"/>
+              <a:t>more loop structures and lists.</a:t>
+            </a:r>
           </a:p>
         </p:txBody>
       </p:sp>
@@ -6158,13 +6176,6 @@
   <p:clrMapOvr>
     <a:masterClrMapping/>
   </p:clrMapOvr>
-  <p:timing>
-    <p:tnLst>
-      <p:par>
-        <p:cTn id="1" dur="indefinite" restart="never" nodeType="tmRoot"/>
-      </p:par>
-    </p:tnLst>
-  </p:timing>
 </p:sld>
 </file>
 
@@ -6206,10 +6217,9 @@
           <a:lstStyle/>
           <a:p>
             <a:r>
-              <a:rPr lang="en-GB" dirty="0" smtClean="0"/>
+              <a:rPr lang="en-GB" dirty="0"/>
               <a:t>Using string formatting.</a:t>
             </a:r>
-            <a:endParaRPr lang="en-GB" dirty="0"/>
           </a:p>
         </p:txBody>
       </p:sp>
@@ -6238,7 +6248,7 @@
             <a:pPr marL="0" indent="0">
               <a:buNone/>
             </a:pPr>
-            <a:endParaRPr lang="en-GB" dirty="0" smtClean="0"/>
+            <a:endParaRPr lang="en-GB" dirty="0"/>
           </a:p>
           <a:p>
             <a:endParaRPr lang="en-GB" dirty="0"/>
@@ -6551,15 +6561,7 @@
                   <a:srgbClr val="FFFF00"/>
                 </a:solidFill>
               </a:rPr>
-              <a:t> </a:t>
-            </a:r>
-            <a:r>
-              <a:rPr lang="en-GB" dirty="0" smtClean="0">
-                <a:solidFill>
-                  <a:srgbClr val="FFFF00"/>
-                </a:solidFill>
-              </a:rPr>
-              <a:t>What do you think this program will do ?</a:t>
+              <a:t> What do you think this program will do ?</a:t>
             </a:r>
           </a:p>
           <a:p>
@@ -6581,28 +6583,15 @@
                   <a:srgbClr val="FFFF00"/>
                 </a:solidFill>
               </a:rPr>
-              <a:t> </a:t>
-            </a:r>
-            <a:r>
-              <a:rPr lang="en-GB" dirty="0" smtClean="0">
-                <a:solidFill>
-                  <a:srgbClr val="FFFF00"/>
-                </a:solidFill>
-              </a:rPr>
-              <a:t>Type it in (carefully) and run it. Does it do what you expected ?</a:t>
-            </a:r>
-            <a:endParaRPr lang="en-GB" dirty="0">
-              <a:solidFill>
-                <a:srgbClr val="FFFF00"/>
-              </a:solidFill>
-            </a:endParaRPr>
+              <a:t> Type it in (carefully) and run it. Does it do what you expected ?</a:t>
+            </a:r>
           </a:p>
           <a:p>
             <a:pPr marL="285750" indent="-285750">
               <a:buFont typeface="Arial" panose="020B0604020202020204" pitchFamily="34" charset="0"/>
               <a:buChar char="•"/>
             </a:pPr>
-            <a:endParaRPr lang="en-GB" dirty="0" smtClean="0">
+            <a:endParaRPr lang="en-GB" dirty="0">
               <a:solidFill>
                 <a:srgbClr val="FFFF00"/>
               </a:solidFill>
@@ -6661,10 +6650,9 @@
           <a:lstStyle/>
           <a:p>
             <a:r>
-              <a:rPr lang="en-GB" dirty="0" smtClean="0"/>
+              <a:rPr lang="en-GB" dirty="0"/>
               <a:t>Much more about Division.</a:t>
             </a:r>
-            <a:endParaRPr lang="en-GB" dirty="0"/>
           </a:p>
         </p:txBody>
       </p:sp>
@@ -6738,10 +6726,9 @@
           <a:lstStyle/>
           <a:p>
             <a:r>
-              <a:rPr lang="en-GB" dirty="0" smtClean="0"/>
+              <a:rPr lang="en-GB" dirty="0"/>
               <a:t>Division.</a:t>
             </a:r>
-            <a:endParaRPr lang="en-GB" dirty="0"/>
           </a:p>
         </p:txBody>
       </p:sp>
@@ -6768,20 +6755,20 @@
           <a:lstStyle/>
           <a:p>
             <a:r>
-              <a:rPr lang="en-GB" dirty="0" smtClean="0"/>
+              <a:rPr lang="en-GB" dirty="0"/>
               <a:t>We have done division before.</a:t>
             </a:r>
           </a:p>
           <a:p>
             <a:r>
-              <a:rPr lang="en-GB" dirty="0" smtClean="0"/>
+              <a:rPr lang="en-GB" dirty="0"/>
               <a:t>Remember we got a "." in the result. Now we will find out why. Remember :-</a:t>
             </a:r>
           </a:p>
           <a:p>
             <a:pPr lvl="1"/>
             <a:r>
-              <a:rPr lang="en-GB" dirty="0" smtClean="0">
+              <a:rPr lang="en-GB" dirty="0">
                 <a:latin typeface="Courier New" panose="02070309020205020404" pitchFamily="49" charset="0"/>
                 <a:cs typeface="Courier New" panose="02070309020205020404" pitchFamily="49" charset="0"/>
               </a:rPr>
@@ -6793,21 +6780,20 @@
           </a:p>
           <a:p>
             <a:r>
-              <a:rPr lang="en-GB" dirty="0" smtClean="0"/>
+              <a:rPr lang="en-GB" dirty="0"/>
               <a:t>Lets use the </a:t>
             </a:r>
             <a:r>
-              <a:rPr lang="en-GB" dirty="0" smtClean="0">
+              <a:rPr lang="en-GB" dirty="0">
                 <a:latin typeface="Courier New" panose="02070309020205020404" pitchFamily="49" charset="0"/>
                 <a:cs typeface="Courier New" panose="02070309020205020404" pitchFamily="49" charset="0"/>
               </a:rPr>
               <a:t>type()</a:t>
             </a:r>
             <a:r>
-              <a:rPr lang="en-GB" dirty="0" smtClean="0"/>
+              <a:rPr lang="en-GB" dirty="0"/>
               <a:t> function again to try to find out what is going on.</a:t>
             </a:r>
-            <a:endParaRPr lang="en-GB" dirty="0"/>
           </a:p>
         </p:txBody>
       </p:sp>
@@ -7103,15 +7089,7 @@
                   <a:srgbClr val="FFFF00"/>
                 </a:solidFill>
               </a:rPr>
-              <a:t> </a:t>
-            </a:r>
-            <a:r>
-              <a:rPr lang="en-GB" dirty="0" smtClean="0">
-                <a:solidFill>
-                  <a:srgbClr val="FFFF00"/>
-                </a:solidFill>
-              </a:rPr>
-              <a:t>Type in the program and run it.</a:t>
+              <a:t> Type in the program and run it.</a:t>
             </a:r>
           </a:p>
           <a:p>
@@ -7133,28 +7111,15 @@
                   <a:srgbClr val="FFFF00"/>
                 </a:solidFill>
               </a:rPr>
-              <a:t> </a:t>
-            </a:r>
-            <a:r>
-              <a:rPr lang="en-GB" dirty="0" smtClean="0">
-                <a:solidFill>
-                  <a:srgbClr val="FFFF00"/>
-                </a:solidFill>
-              </a:rPr>
-              <a:t>What do you think the result means ?</a:t>
-            </a:r>
-            <a:endParaRPr lang="en-GB" dirty="0">
-              <a:solidFill>
-                <a:srgbClr val="FFFF00"/>
-              </a:solidFill>
-            </a:endParaRPr>
+              <a:t> What do you think the result means ?</a:t>
+            </a:r>
           </a:p>
           <a:p>
             <a:pPr marL="285750" indent="-285750">
               <a:buFont typeface="Arial" panose="020B0604020202020204" pitchFamily="34" charset="0"/>
               <a:buChar char="•"/>
             </a:pPr>
-            <a:endParaRPr lang="en-GB" dirty="0" smtClean="0">
+            <a:endParaRPr lang="en-GB" dirty="0">
               <a:solidFill>
                 <a:srgbClr val="FFFF00"/>
               </a:solidFill>
@@ -7505,13 +7470,6 @@
   <p:clrMapOvr>
     <a:masterClrMapping/>
   </p:clrMapOvr>
-  <p:timing>
-    <p:tnLst>
-      <p:par>
-        <p:cTn id="1" dur="indefinite" restart="never" nodeType="tmRoot"/>
-      </p:par>
-    </p:tnLst>
-  </p:timing>
 </p:sld>
 </file>
 
@@ -7553,10 +7511,9 @@
           <a:lstStyle/>
           <a:p>
             <a:r>
-              <a:rPr lang="en-GB" dirty="0" smtClean="0"/>
+              <a:rPr lang="en-GB" dirty="0"/>
               <a:t>A new type of thing !</a:t>
             </a:r>
-            <a:endParaRPr lang="en-GB" dirty="0"/>
           </a:p>
         </p:txBody>
       </p:sp>
@@ -7583,53 +7540,53 @@
           <a:lstStyle/>
           <a:p>
             <a:r>
-              <a:rPr lang="en-GB" dirty="0" smtClean="0"/>
+              <a:rPr lang="en-GB" dirty="0"/>
               <a:t>Floats are another type in Python, like integers and strings.</a:t>
             </a:r>
           </a:p>
           <a:p>
             <a:r>
-              <a:rPr lang="en-GB" dirty="0" smtClean="0"/>
+              <a:rPr lang="en-GB" dirty="0"/>
               <a:t>Float stands for "</a:t>
             </a:r>
             <a:r>
-              <a:rPr lang="en-GB" u="sng" dirty="0" smtClean="0"/>
+              <a:rPr lang="en-GB" u="sng" dirty="0"/>
               <a:t>Floating Point Number</a:t>
             </a:r>
             <a:r>
-              <a:rPr lang="en-GB" dirty="0" smtClean="0"/>
+              <a:rPr lang="en-GB" dirty="0"/>
               <a:t>". It is a way to store numbers in a computer (which can only use 1's and 0's) with fractional parts.</a:t>
             </a:r>
           </a:p>
           <a:p>
             <a:pPr lvl="1"/>
             <a:r>
-              <a:rPr lang="en-GB" i="1" dirty="0" smtClean="0"/>
+              <a:rPr lang="en-GB" i="1" dirty="0"/>
               <a:t>You will also note that the these things are described as being </a:t>
             </a:r>
             <a:r>
-              <a:rPr lang="en-GB" b="1" i="1" u="sng" dirty="0" smtClean="0"/>
+              <a:rPr lang="en-GB" b="1" i="1" u="sng" dirty="0"/>
               <a:t>classes.</a:t>
             </a:r>
             <a:r>
-              <a:rPr lang="en-GB" i="1" dirty="0" smtClean="0"/>
+              <a:rPr lang="en-GB" i="1" dirty="0"/>
               <a:t> The class is a very important concept in Python. We will be making our own in a few weeks.</a:t>
             </a:r>
-            <a:endParaRPr lang="en-GB" b="1" i="1" u="sng" dirty="0" smtClean="0"/>
+            <a:endParaRPr lang="en-GB" b="1" i="1" u="sng" dirty="0"/>
           </a:p>
           <a:p>
             <a:endParaRPr lang="en-GB" dirty="0"/>
           </a:p>
           <a:p>
             <a:r>
-              <a:rPr lang="en-GB" dirty="0" smtClean="0"/>
+              <a:rPr lang="en-GB" dirty="0"/>
               <a:t>Examples of floating point numbers are :-</a:t>
             </a:r>
           </a:p>
           <a:p>
             <a:pPr lvl="1"/>
             <a:r>
-              <a:rPr lang="en-GB" b="1" u="sng" dirty="0" smtClean="0">
+              <a:rPr lang="en-GB" b="1" u="sng" dirty="0">
                 <a:latin typeface="Courier New" panose="02070309020205020404" pitchFamily="49" charset="0"/>
                 <a:cs typeface="Courier New" panose="02070309020205020404" pitchFamily="49" charset="0"/>
               </a:rPr>
@@ -7643,63 +7600,63 @@
               <a:t>, </a:t>
             </a:r>
             <a:r>
-              <a:rPr lang="en-GB" b="1" u="sng" dirty="0" smtClean="0">
+              <a:rPr lang="en-GB" b="1" u="sng" dirty="0">
                 <a:latin typeface="Courier New" panose="02070309020205020404" pitchFamily="49" charset="0"/>
                 <a:cs typeface="Courier New" panose="02070309020205020404" pitchFamily="49" charset="0"/>
               </a:rPr>
               <a:t>1.4142</a:t>
             </a:r>
             <a:r>
-              <a:rPr lang="en-GB" dirty="0" smtClean="0">
+              <a:rPr lang="en-GB" dirty="0">
                 <a:latin typeface="Courier New" panose="02070309020205020404" pitchFamily="49" charset="0"/>
                 <a:cs typeface="Courier New" panose="02070309020205020404" pitchFamily="49" charset="0"/>
               </a:rPr>
               <a:t>, </a:t>
             </a:r>
             <a:r>
-              <a:rPr lang="en-GB" b="1" u="sng" dirty="0" smtClean="0">
+              <a:rPr lang="en-GB" b="1" u="sng" dirty="0">
                 <a:latin typeface="Courier New" panose="02070309020205020404" pitchFamily="49" charset="0"/>
                 <a:cs typeface="Courier New" panose="02070309020205020404" pitchFamily="49" charset="0"/>
               </a:rPr>
               <a:t>3.14159</a:t>
             </a:r>
             <a:r>
-              <a:rPr lang="en-GB" dirty="0" smtClean="0">
+              <a:rPr lang="en-GB" dirty="0">
                 <a:latin typeface="Courier New" panose="02070309020205020404" pitchFamily="49" charset="0"/>
                 <a:cs typeface="Courier New" panose="02070309020205020404" pitchFamily="49" charset="0"/>
               </a:rPr>
               <a:t>, </a:t>
             </a:r>
             <a:r>
-              <a:rPr lang="en-GB" b="1" u="sng" dirty="0" smtClean="0">
+              <a:rPr lang="en-GB" b="1" u="sng" dirty="0">
                 <a:latin typeface="Courier New" panose="02070309020205020404" pitchFamily="49" charset="0"/>
                 <a:cs typeface="Courier New" panose="02070309020205020404" pitchFamily="49" charset="0"/>
               </a:rPr>
               <a:t>-3.75</a:t>
             </a:r>
             <a:r>
-              <a:rPr lang="en-GB" dirty="0" smtClean="0">
+              <a:rPr lang="en-GB" dirty="0">
                 <a:latin typeface="Courier New" panose="02070309020205020404" pitchFamily="49" charset="0"/>
                 <a:cs typeface="Courier New" panose="02070309020205020404" pitchFamily="49" charset="0"/>
               </a:rPr>
               <a:t>, </a:t>
             </a:r>
             <a:r>
-              <a:rPr lang="en-GB" b="1" u="sng" dirty="0" smtClean="0">
+              <a:rPr lang="en-GB" b="1" u="sng" dirty="0">
                 <a:latin typeface="Courier New" panose="02070309020205020404" pitchFamily="49" charset="0"/>
                 <a:cs typeface="Courier New" panose="02070309020205020404" pitchFamily="49" charset="0"/>
               </a:rPr>
               <a:t>-9.99</a:t>
             </a:r>
             <a:r>
-              <a:rPr lang="en-GB" dirty="0" smtClean="0">
+              <a:rPr lang="en-GB" dirty="0">
                 <a:latin typeface="Courier New" panose="02070309020205020404" pitchFamily="49" charset="0"/>
                 <a:cs typeface="Courier New" panose="02070309020205020404" pitchFamily="49" charset="0"/>
               </a:rPr>
               <a:t>, </a:t>
             </a:r>
             <a:r>
-              <a:rPr lang="en-GB" b="1" u="sng" dirty="0" smtClean="0">
+              <a:rPr lang="en-GB" b="1" u="sng" dirty="0">
                 <a:latin typeface="Courier New" panose="02070309020205020404" pitchFamily="49" charset="0"/>
                 <a:cs typeface="Courier New" panose="02070309020205020404" pitchFamily="49" charset="0"/>
               </a:rPr>
@@ -7708,14 +7665,14 @@
           </a:p>
           <a:p>
             <a:pPr lvl="1"/>
-            <a:endParaRPr lang="en-GB" b="1" u="sng" dirty="0" smtClean="0">
+            <a:endParaRPr lang="en-GB" b="1" u="sng" dirty="0">
               <a:latin typeface="Courier New" panose="02070309020205020404" pitchFamily="49" charset="0"/>
               <a:cs typeface="Courier New" panose="02070309020205020404" pitchFamily="49" charset="0"/>
             </a:endParaRPr>
           </a:p>
           <a:p>
             <a:r>
-              <a:rPr lang="en-GB" dirty="0" smtClean="0"/>
+              <a:rPr lang="en-GB" dirty="0"/>
               <a:t>Lets look at some simple examples of arithmetic with floats.</a:t>
             </a:r>
             <a:endParaRPr lang="en-GB" b="1" u="sng" dirty="0">
@@ -7988,13 +7945,6 @@
   <p:clrMapOvr>
     <a:masterClrMapping/>
   </p:clrMapOvr>
-  <p:timing>
-    <p:tnLst>
-      <p:par>
-        <p:cTn id="1" dur="indefinite" restart="never" nodeType="tmRoot"/>
-      </p:par>
-    </p:tnLst>
-  </p:timing>
 </p:sld>
 </file>
 
@@ -8036,10 +7986,9 @@
           <a:lstStyle/>
           <a:p>
             <a:r>
-              <a:rPr lang="en-GB" dirty="0" smtClean="0"/>
+              <a:rPr lang="en-GB" dirty="0"/>
               <a:t>More Division Examples.</a:t>
             </a:r>
-            <a:endParaRPr lang="en-GB" dirty="0"/>
           </a:p>
         </p:txBody>
       </p:sp>
@@ -8066,24 +8015,23 @@
           <a:lstStyle/>
           <a:p>
             <a:r>
-              <a:rPr lang="en-GB" dirty="0" smtClean="0"/>
+              <a:rPr lang="en-GB" dirty="0"/>
               <a:t>Here are some simple division examples.</a:t>
             </a:r>
           </a:p>
           <a:p>
             <a:r>
-              <a:rPr lang="en-GB" dirty="0" smtClean="0"/>
+              <a:rPr lang="en-GB" dirty="0"/>
               <a:t>Note: Whenever you use the / operator for division, you always get a </a:t>
             </a:r>
             <a:r>
-              <a:rPr lang="en-GB" b="1" dirty="0" smtClean="0"/>
+              <a:rPr lang="en-GB" b="1" dirty="0"/>
               <a:t>Float</a:t>
             </a:r>
             <a:r>
-              <a:rPr lang="en-GB" dirty="0" smtClean="0"/>
+              <a:rPr lang="en-GB" dirty="0"/>
               <a:t> as a result.</a:t>
             </a:r>
-            <a:endParaRPr lang="en-GB" dirty="0"/>
           </a:p>
         </p:txBody>
       </p:sp>
@@ -8379,15 +8327,7 @@
                   <a:srgbClr val="FFFF00"/>
                 </a:solidFill>
               </a:rPr>
-              <a:t> </a:t>
-            </a:r>
-            <a:r>
-              <a:rPr lang="en-GB" dirty="0" smtClean="0">
-                <a:solidFill>
-                  <a:srgbClr val="FFFF00"/>
-                </a:solidFill>
-              </a:rPr>
-              <a:t>Type in the program and run it.</a:t>
+              <a:t> Type in the program and run it.</a:t>
             </a:r>
           </a:p>
           <a:p>
@@ -8409,28 +8349,15 @@
                   <a:srgbClr val="FFFF00"/>
                 </a:solidFill>
               </a:rPr>
-              <a:t> </a:t>
-            </a:r>
-            <a:r>
-              <a:rPr lang="en-GB" dirty="0" smtClean="0">
-                <a:solidFill>
-                  <a:srgbClr val="FFFF00"/>
-                </a:solidFill>
-              </a:rPr>
-              <a:t>What do you think the result means ?</a:t>
-            </a:r>
-            <a:endParaRPr lang="en-GB" dirty="0">
-              <a:solidFill>
-                <a:srgbClr val="FFFF00"/>
-              </a:solidFill>
-            </a:endParaRPr>
+              <a:t> What do you think the result means ?</a:t>
+            </a:r>
           </a:p>
           <a:p>
             <a:pPr marL="285750" indent="-285750">
               <a:buFont typeface="Arial" panose="020B0604020202020204" pitchFamily="34" charset="0"/>
               <a:buChar char="•"/>
             </a:pPr>
-            <a:endParaRPr lang="en-GB" dirty="0" smtClean="0">
+            <a:endParaRPr lang="en-GB" dirty="0">
               <a:solidFill>
                 <a:srgbClr val="FFFF00"/>
               </a:solidFill>
@@ -8548,30 +8475,16 @@
                 <a:latin typeface="Courier New" panose="02070309020205020404" pitchFamily="49" charset="0"/>
                 <a:cs typeface="Courier New" panose="02070309020205020404" pitchFamily="49" charset="0"/>
               </a:rPr>
-              <a:t>print(0.75 / 0.25</a:t>
-            </a:r>
-            <a:r>
-              <a:rPr lang="en-GB" dirty="0" smtClean="0">
-                <a:latin typeface="Courier New" panose="02070309020205020404" pitchFamily="49" charset="0"/>
-                <a:cs typeface="Courier New" panose="02070309020205020404" pitchFamily="49" charset="0"/>
-              </a:rPr>
-              <a:t>)</a:t>
-            </a:r>
-          </a:p>
-          <a:p>
-            <a:r>
-              <a:rPr lang="en-GB" dirty="0" smtClean="0">
-                <a:latin typeface="Courier New" panose="02070309020205020404" pitchFamily="49" charset="0"/>
-                <a:cs typeface="Courier New" panose="02070309020205020404" pitchFamily="49" charset="0"/>
-              </a:rPr>
-              <a:t>print(45 / 332</a:t>
-            </a:r>
+              <a:t>print(0.75 / 0.25)</a:t>
+            </a:r>
+          </a:p>
+          <a:p>
             <a:r>
               <a:rPr lang="en-GB" dirty="0">
                 <a:latin typeface="Courier New" panose="02070309020205020404" pitchFamily="49" charset="0"/>
                 <a:cs typeface="Courier New" panose="02070309020205020404" pitchFamily="49" charset="0"/>
               </a:rPr>
-              <a:t>)</a:t>
+              <a:t>print(45 / 332)</a:t>
             </a:r>
           </a:p>
         </p:txBody>
@@ -8586,13 +8499,6 @@
   <p:clrMapOvr>
     <a:masterClrMapping/>
   </p:clrMapOvr>
-  <p:timing>
-    <p:tnLst>
-      <p:par>
-        <p:cTn id="1" dur="indefinite" restart="never" nodeType="tmRoot"/>
-      </p:par>
-    </p:tnLst>
-  </p:timing>
 </p:sld>
 </file>
 
@@ -8629,10 +8535,9 @@
           <a:lstStyle/>
           <a:p>
             <a:r>
-              <a:rPr lang="en-GB" dirty="0" smtClean="0"/>
+              <a:rPr lang="en-GB" dirty="0"/>
               <a:t>Formatting Floats</a:t>
             </a:r>
-            <a:endParaRPr lang="en-GB" dirty="0"/>
           </a:p>
         </p:txBody>
       </p:sp>
@@ -8659,11 +8564,11 @@
           <a:lstStyle/>
           <a:p>
             <a:r>
-              <a:rPr lang="en-GB" dirty="0" smtClean="0"/>
+              <a:rPr lang="en-GB" dirty="0"/>
               <a:t>You might not have wanted so many decimal places in your answers. </a:t>
             </a:r>
             <a:r>
-              <a:rPr lang="en-GB" dirty="0" smtClean="0">
+              <a:rPr lang="en-GB" dirty="0">
                 <a:latin typeface="Courier New" panose="02070309020205020404" pitchFamily="49" charset="0"/>
                 <a:cs typeface="Courier New" panose="02070309020205020404" pitchFamily="49" charset="0"/>
               </a:rPr>
@@ -8674,7 +8579,7 @@
               <a:t> was </a:t>
             </a:r>
             <a:r>
-              <a:rPr lang="en-GB" dirty="0" smtClean="0">
+              <a:rPr lang="en-GB" dirty="0">
                 <a:latin typeface="Courier New" panose="02070309020205020404" pitchFamily="49" charset="0"/>
                 <a:cs typeface="Courier New" panose="02070309020205020404" pitchFamily="49" charset="0"/>
               </a:rPr>
@@ -8683,41 +8588,40 @@
           </a:p>
           <a:p>
             <a:r>
-              <a:rPr lang="en-GB" dirty="0" smtClean="0"/>
+              <a:rPr lang="en-GB" dirty="0"/>
               <a:t>You can add things to the format string to get a specific number of decimal places.</a:t>
             </a:r>
-            <a:endParaRPr lang="en-GB" dirty="0"/>
-          </a:p>
-          <a:p>
-            <a:r>
-              <a:rPr lang="en-GB" dirty="0" smtClean="0"/>
+          </a:p>
+          <a:p>
+            <a:r>
+              <a:rPr lang="en-GB" dirty="0"/>
               <a:t>In this case it is.</a:t>
             </a:r>
           </a:p>
           <a:p>
             <a:pPr lvl="1"/>
             <a:r>
-              <a:rPr lang="en-GB" dirty="0" smtClean="0"/>
+              <a:rPr lang="en-GB" dirty="0"/>
               <a:t>A ":", to say this is how you want to format the variable.</a:t>
             </a:r>
           </a:p>
           <a:p>
             <a:pPr lvl="1"/>
             <a:r>
-              <a:rPr lang="en-GB" dirty="0" smtClean="0"/>
+              <a:rPr lang="en-GB" dirty="0"/>
               <a:t>A ".", to say you will be going to a specific number of decimal places.</a:t>
             </a:r>
           </a:p>
           <a:p>
             <a:pPr lvl="1"/>
             <a:r>
-              <a:rPr lang="en-GB" dirty="0" smtClean="0"/>
+              <a:rPr lang="en-GB" dirty="0"/>
               <a:t>The number of decimal places.</a:t>
             </a:r>
           </a:p>
           <a:p>
             <a:r>
-              <a:rPr lang="en-GB" dirty="0" smtClean="0"/>
+              <a:rPr lang="en-GB" dirty="0"/>
               <a:t>This will be easier to follow by looking at the example on the right.</a:t>
             </a:r>
           </a:p>
@@ -8770,15 +8674,7 @@
                   <a:srgbClr val="FFFF00"/>
                 </a:solidFill>
               </a:rPr>
-              <a:t> </a:t>
-            </a:r>
-            <a:r>
-              <a:rPr lang="en-GB" dirty="0" smtClean="0">
-                <a:solidFill>
-                  <a:srgbClr val="FFFF00"/>
-                </a:solidFill>
-              </a:rPr>
-              <a:t>Type in the program and run it.</a:t>
+              <a:t> Type in the program and run it.</a:t>
             </a:r>
           </a:p>
           <a:p>
@@ -8800,28 +8696,15 @@
                   <a:srgbClr val="FFFF00"/>
                 </a:solidFill>
               </a:rPr>
-              <a:t> </a:t>
-            </a:r>
-            <a:r>
-              <a:rPr lang="en-GB" dirty="0" smtClean="0">
-                <a:solidFill>
-                  <a:srgbClr val="FFFF00"/>
-                </a:solidFill>
-              </a:rPr>
-              <a:t>What can you notice about the results ?</a:t>
-            </a:r>
-            <a:endParaRPr lang="en-GB" dirty="0">
-              <a:solidFill>
-                <a:srgbClr val="FFFF00"/>
-              </a:solidFill>
-            </a:endParaRPr>
+              <a:t> What can you notice about the results ?</a:t>
+            </a:r>
           </a:p>
           <a:p>
             <a:pPr marL="285750" indent="-285750">
               <a:buFont typeface="Arial" panose="020B0604020202020204" pitchFamily="34" charset="0"/>
               <a:buChar char="•"/>
             </a:pPr>
-            <a:endParaRPr lang="en-GB" dirty="0" smtClean="0">
+            <a:endParaRPr lang="en-GB" dirty="0">
               <a:solidFill>
                 <a:srgbClr val="FFFF00"/>
               </a:solidFill>
@@ -8977,10 +8860,9 @@
           <a:lstStyle/>
           <a:p>
             <a:r>
-              <a:rPr lang="en-GB" dirty="0" smtClean="0"/>
+              <a:rPr lang="en-GB" dirty="0"/>
               <a:t>Lists.</a:t>
             </a:r>
-            <a:endParaRPr lang="en-GB" dirty="0"/>
           </a:p>
         </p:txBody>
       </p:sp>
@@ -9049,10 +8931,9 @@
           <a:lstStyle/>
           <a:p>
             <a:r>
-              <a:rPr lang="en-GB" dirty="0" smtClean="0"/>
+              <a:rPr lang="en-GB" dirty="0"/>
               <a:t>Lists</a:t>
             </a:r>
-            <a:endParaRPr lang="en-GB" dirty="0"/>
           </a:p>
         </p:txBody>
       </p:sp>
@@ -9079,35 +8960,35 @@
           <a:lstStyle/>
           <a:p>
             <a:r>
-              <a:rPr lang="en-GB" dirty="0" smtClean="0"/>
+              <a:rPr lang="en-GB" dirty="0"/>
               <a:t>The last new thing this week is a new datatype, the </a:t>
             </a:r>
             <a:r>
-              <a:rPr lang="en-GB" u="sng" dirty="0" smtClean="0"/>
+              <a:rPr lang="en-GB" u="sng" dirty="0"/>
               <a:t>list.</a:t>
             </a:r>
           </a:p>
           <a:p>
             <a:r>
-              <a:rPr lang="en-GB" dirty="0" smtClean="0"/>
+              <a:rPr lang="en-GB" dirty="0"/>
               <a:t>Lists in Python are much like they are in English. They are just a list of "things".</a:t>
             </a:r>
           </a:p>
           <a:p>
             <a:r>
-              <a:rPr lang="en-GB" dirty="0" smtClean="0"/>
+              <a:rPr lang="en-GB" dirty="0"/>
               <a:t>Those things can be strings, integers, floats or a variety of other types we will learn about later.</a:t>
             </a:r>
           </a:p>
           <a:p>
             <a:pPr lvl="1"/>
             <a:r>
-              <a:rPr lang="en-GB" i="1" dirty="0" smtClean="0"/>
+              <a:rPr lang="en-GB" i="1" dirty="0"/>
               <a:t>Note: You can even have a list that contains other lists, but we will do this another week !</a:t>
             </a:r>
           </a:p>
           <a:p>
-            <a:endParaRPr lang="en-GB" i="1" dirty="0" smtClean="0"/>
+            <a:endParaRPr lang="en-GB" i="1" dirty="0"/>
           </a:p>
           <a:p>
             <a:pPr lvl="1"/>
@@ -9165,10 +9046,9 @@
           <a:lstStyle/>
           <a:p>
             <a:r>
-              <a:rPr lang="en-GB" dirty="0" smtClean="0"/>
+              <a:rPr lang="en-GB" dirty="0"/>
               <a:t>Defining a list.</a:t>
             </a:r>
-            <a:endParaRPr lang="en-GB" dirty="0"/>
           </a:p>
         </p:txBody>
       </p:sp>
@@ -9195,21 +9075,21 @@
           <a:lstStyle/>
           <a:p>
             <a:r>
-              <a:rPr lang="en-GB" dirty="0" smtClean="0"/>
+              <a:rPr lang="en-GB" dirty="0"/>
               <a:t>You define a </a:t>
             </a:r>
             <a:r>
-              <a:rPr lang="en-GB" b="1" u="sng" dirty="0" smtClean="0"/>
+              <a:rPr lang="en-GB" b="1" u="sng" dirty="0"/>
               <a:t>list</a:t>
             </a:r>
             <a:r>
-              <a:rPr lang="en-GB" dirty="0" smtClean="0"/>
+              <a:rPr lang="en-GB" dirty="0"/>
               <a:t> by using square brackets "[" and "]".</a:t>
             </a:r>
           </a:p>
           <a:p>
             <a:r>
-              <a:rPr lang="en-GB" dirty="0" smtClean="0">
+              <a:rPr lang="en-GB" dirty="0">
                 <a:latin typeface="Courier New" panose="02070309020205020404" pitchFamily="49" charset="0"/>
                 <a:cs typeface="Courier New" panose="02070309020205020404" pitchFamily="49" charset="0"/>
               </a:rPr>
@@ -9242,11 +9122,7 @@
             <a:pPr lvl="1"/>
             <a:r>
               <a:rPr lang="en-GB" dirty="0"/>
-              <a:t>The </a:t>
-            </a:r>
-            <a:r>
-              <a:rPr lang="en-GB" dirty="0" smtClean="0"/>
-              <a:t>0th </a:t>
+              <a:t>The 0th </a:t>
             </a:r>
             <a:r>
               <a:rPr lang="en-GB" b="1" u="sng" dirty="0"/>
@@ -9260,7 +9136,7 @@
           <a:p>
             <a:pPr lvl="1"/>
             <a:r>
-              <a:rPr lang="en-GB" dirty="0" smtClean="0"/>
+              <a:rPr lang="en-GB" dirty="0"/>
               <a:t>The 1st </a:t>
             </a:r>
             <a:r>
@@ -9269,20 +9145,15 @@
             </a:r>
             <a:r>
               <a:rPr lang="en-GB" dirty="0"/>
-              <a:t> is "World</a:t>
-            </a:r>
-            <a:r>
-              <a:rPr lang="en-GB" dirty="0" smtClean="0"/>
-              <a:t>".</a:t>
+              <a:t> is "World".</a:t>
             </a:r>
           </a:p>
           <a:p>
             <a:pPr lvl="2"/>
             <a:r>
-              <a:rPr lang="en-GB" i="1" dirty="0" smtClean="0"/>
+              <a:rPr lang="en-GB" i="1" dirty="0"/>
               <a:t>Remember computer science tends to start counting from 0 !</a:t>
             </a:r>
-            <a:endParaRPr lang="en-GB" i="1" dirty="0"/>
           </a:p>
           <a:p>
             <a:pPr lvl="1"/>
@@ -9341,10 +9212,9 @@
           <a:lstStyle/>
           <a:p>
             <a:r>
-              <a:rPr lang="en-GB" dirty="0" smtClean="0"/>
+              <a:rPr lang="en-GB" dirty="0"/>
               <a:t>A first list example.</a:t>
             </a:r>
-            <a:endParaRPr lang="en-GB" dirty="0"/>
           </a:p>
         </p:txBody>
       </p:sp>
@@ -9371,19 +9241,19 @@
           <a:lstStyle/>
           <a:p>
             <a:r>
-              <a:rPr lang="en-GB" dirty="0" smtClean="0"/>
+              <a:rPr lang="en-GB" dirty="0"/>
               <a:t>Here we define some lists and print them.</a:t>
             </a:r>
           </a:p>
           <a:p>
             <a:r>
-              <a:rPr lang="en-GB" dirty="0" smtClean="0"/>
+              <a:rPr lang="en-GB" dirty="0"/>
               <a:t>We can see lists can have different types of things.</a:t>
             </a:r>
           </a:p>
           <a:p>
             <a:r>
-              <a:rPr lang="en-GB" dirty="0" smtClean="0"/>
+              <a:rPr lang="en-GB" dirty="0"/>
               <a:t>A list can even have different types of things within it. A list doesn't have to only have strings or integers or floats as elements, it can be a mixture.</a:t>
             </a:r>
           </a:p>
@@ -9681,15 +9551,7 @@
                   <a:srgbClr val="FFFF00"/>
                 </a:solidFill>
               </a:rPr>
-              <a:t> </a:t>
-            </a:r>
-            <a:r>
-              <a:rPr lang="en-GB" dirty="0" smtClean="0">
-                <a:solidFill>
-                  <a:srgbClr val="FFFF00"/>
-                </a:solidFill>
-              </a:rPr>
-              <a:t>Type in the program and run it.</a:t>
+              <a:t> Type in the program and run it.</a:t>
             </a:r>
           </a:p>
           <a:p>
@@ -9711,28 +9573,15 @@
                   <a:srgbClr val="FFFF00"/>
                 </a:solidFill>
               </a:rPr>
-              <a:t> </a:t>
-            </a:r>
-            <a:r>
-              <a:rPr lang="en-GB" dirty="0" smtClean="0">
-                <a:solidFill>
-                  <a:srgbClr val="FFFF00"/>
-                </a:solidFill>
-              </a:rPr>
-              <a:t>Do you understand why you get the result you do ?</a:t>
-            </a:r>
-            <a:endParaRPr lang="en-GB" dirty="0">
-              <a:solidFill>
-                <a:srgbClr val="FFFF00"/>
-              </a:solidFill>
-            </a:endParaRPr>
+              <a:t> Do you understand why you get the result you do ?</a:t>
+            </a:r>
           </a:p>
           <a:p>
             <a:pPr marL="285750" indent="-285750">
               <a:buFont typeface="Arial" panose="020B0604020202020204" pitchFamily="34" charset="0"/>
               <a:buChar char="•"/>
             </a:pPr>
-            <a:endParaRPr lang="en-GB" dirty="0" smtClean="0">
+            <a:endParaRPr lang="en-GB" dirty="0">
               <a:solidFill>
                 <a:srgbClr val="FFFF00"/>
               </a:solidFill>
@@ -9877,13 +9726,6 @@
   <p:clrMapOvr>
     <a:masterClrMapping/>
   </p:clrMapOvr>
-  <p:timing>
-    <p:tnLst>
-      <p:par>
-        <p:cTn id="1" dur="indefinite" restart="never" nodeType="tmRoot"/>
-      </p:par>
-    </p:tnLst>
-  </p:timing>
 </p:sld>
 </file>
 
@@ -9920,10 +9762,9 @@
           <a:lstStyle/>
           <a:p>
             <a:r>
-              <a:rPr lang="en-GB" dirty="0" smtClean="0"/>
+              <a:rPr lang="en-GB" dirty="0"/>
               <a:t>Goals of this week.</a:t>
             </a:r>
-            <a:endParaRPr lang="en-GB" dirty="0"/>
           </a:p>
         </p:txBody>
       </p:sp>
@@ -9945,39 +9786,36 @@
           <a:lstStyle/>
           <a:p>
             <a:r>
-              <a:rPr lang="en-GB" dirty="0" smtClean="0"/>
+              <a:rPr lang="en-GB" dirty="0"/>
               <a:t>This week, we will learn :-</a:t>
             </a:r>
           </a:p>
           <a:p>
             <a:pPr lvl="1"/>
             <a:r>
-              <a:rPr lang="en-GB" dirty="0" smtClean="0"/>
+              <a:rPr lang="en-GB" dirty="0"/>
               <a:t>To mix numbers and strings.</a:t>
             </a:r>
+          </a:p>
+          <a:p>
             <a:endParaRPr lang="en-GB" dirty="0"/>
           </a:p>
           <a:p>
+            <a:pPr lvl="1"/>
+            <a:r>
+              <a:rPr lang="en-GB" dirty="0"/>
+              <a:t>To do more work with division.</a:t>
+            </a:r>
+          </a:p>
+          <a:p>
             <a:endParaRPr lang="en-GB" dirty="0"/>
           </a:p>
           <a:p>
             <a:pPr lvl="1"/>
             <a:r>
-              <a:rPr lang="en-GB" dirty="0" smtClean="0"/>
-              <a:t>To do more work with division.</a:t>
-            </a:r>
-            <a:endParaRPr lang="en-GB" dirty="0"/>
-          </a:p>
-          <a:p>
-            <a:endParaRPr lang="en-GB" dirty="0"/>
-          </a:p>
-          <a:p>
-            <a:pPr lvl="1"/>
-            <a:r>
-              <a:rPr lang="en-GB" dirty="0" smtClean="0"/>
+              <a:rPr lang="en-GB" dirty="0"/>
               <a:t>To work with lists of things.</a:t>
             </a:r>
-            <a:endParaRPr lang="en-GB" dirty="0"/>
           </a:p>
         </p:txBody>
       </p:sp>
@@ -9991,13 +9829,6 @@
   <p:clrMapOvr>
     <a:masterClrMapping/>
   </p:clrMapOvr>
-  <p:timing>
-    <p:tnLst>
-      <p:par>
-        <p:cTn id="1" dur="indefinite" restart="never" nodeType="tmRoot"/>
-      </p:par>
-    </p:tnLst>
-  </p:timing>
 </p:sld>
 </file>
 
@@ -10039,10 +9870,9 @@
           <a:lstStyle/>
           <a:p>
             <a:r>
-              <a:rPr lang="en-GB" dirty="0" smtClean="0"/>
+              <a:rPr lang="en-GB" dirty="0"/>
               <a:t>Adding things to lists.</a:t>
             </a:r>
-            <a:endParaRPr lang="en-GB" dirty="0"/>
           </a:p>
         </p:txBody>
       </p:sp>
@@ -10069,101 +9899,101 @@
           <a:lstStyle/>
           <a:p>
             <a:r>
-              <a:rPr lang="en-GB" dirty="0" smtClean="0"/>
+              <a:rPr lang="en-GB" dirty="0"/>
               <a:t>To put something new on the end of the list, you need to use the </a:t>
             </a:r>
             <a:r>
-              <a:rPr lang="en-GB" b="1" dirty="0" smtClean="0"/>
+              <a:rPr lang="en-GB" b="1" dirty="0"/>
               <a:t>append</a:t>
             </a:r>
             <a:r>
-              <a:rPr lang="en-GB" dirty="0" smtClean="0"/>
+              <a:rPr lang="en-GB" dirty="0"/>
               <a:t> </a:t>
             </a:r>
             <a:r>
-              <a:rPr lang="en-GB" u="sng" dirty="0" smtClean="0"/>
+              <a:rPr lang="en-GB" u="sng" dirty="0"/>
               <a:t>method</a:t>
             </a:r>
             <a:r>
-              <a:rPr lang="en-GB" dirty="0" smtClean="0"/>
+              <a:rPr lang="en-GB" dirty="0"/>
               <a:t> of the list.</a:t>
             </a:r>
           </a:p>
           <a:p>
             <a:pPr lvl="1"/>
             <a:r>
-              <a:rPr lang="en-GB" dirty="0" smtClean="0"/>
+              <a:rPr lang="en-GB" dirty="0"/>
               <a:t>The only thing we need to say is what we want to append.</a:t>
             </a:r>
           </a:p>
           <a:p>
             <a:r>
-              <a:rPr lang="en-GB" dirty="0" smtClean="0"/>
+              <a:rPr lang="en-GB" dirty="0"/>
               <a:t>You can insert something into the list in a position other than the end by using the </a:t>
             </a:r>
             <a:r>
-              <a:rPr lang="en-GB" b="1" dirty="0" smtClean="0"/>
+              <a:rPr lang="en-GB" b="1" dirty="0"/>
               <a:t>insert</a:t>
             </a:r>
             <a:r>
-              <a:rPr lang="en-GB" dirty="0" smtClean="0"/>
+              <a:rPr lang="en-GB" dirty="0"/>
               <a:t> </a:t>
             </a:r>
             <a:r>
-              <a:rPr lang="en-GB" u="sng" dirty="0" smtClean="0"/>
+              <a:rPr lang="en-GB" u="sng" dirty="0"/>
               <a:t>method</a:t>
             </a:r>
             <a:r>
-              <a:rPr lang="en-GB" dirty="0" smtClean="0"/>
+              <a:rPr lang="en-GB" dirty="0"/>
               <a:t> of the </a:t>
             </a:r>
             <a:r>
-              <a:rPr lang="en-GB" u="sng" dirty="0" smtClean="0"/>
+              <a:rPr lang="en-GB" u="sng" dirty="0"/>
               <a:t>list</a:t>
             </a:r>
             <a:r>
-              <a:rPr lang="en-GB" dirty="0" smtClean="0"/>
+              <a:rPr lang="en-GB" dirty="0"/>
               <a:t>.</a:t>
             </a:r>
           </a:p>
           <a:p>
             <a:pPr lvl="1"/>
             <a:r>
-              <a:rPr lang="en-GB" dirty="0" smtClean="0"/>
+              <a:rPr lang="en-GB" dirty="0"/>
               <a:t>Here, we need to say what position we will insert into, as well as what we will insert.</a:t>
             </a:r>
           </a:p>
           <a:p>
             <a:pPr lvl="1"/>
             <a:r>
-              <a:rPr lang="en-GB" i="1" dirty="0" smtClean="0"/>
+              <a:rPr lang="en-GB" i="1" dirty="0"/>
               <a:t>Remember to start counting from zero !</a:t>
             </a:r>
           </a:p>
           <a:p>
             <a:r>
-              <a:rPr lang="en-GB" i="1" dirty="0" smtClean="0"/>
+              <a:rPr lang="en-GB" i="1" dirty="0"/>
               <a:t>We will learn why these are called </a:t>
             </a:r>
             <a:r>
-              <a:rPr lang="en-GB" i="1" u="sng" dirty="0" smtClean="0"/>
+              <a:rPr lang="en-GB" i="1" u="sng" dirty="0"/>
               <a:t>methods</a:t>
             </a:r>
             <a:r>
-              <a:rPr lang="en-GB" i="1" dirty="0" smtClean="0"/>
+              <a:rPr lang="en-GB" i="1" dirty="0"/>
               <a:t> in a later week, when we also learn about </a:t>
             </a:r>
             <a:r>
-              <a:rPr lang="en-GB" i="1" u="sng" dirty="0" smtClean="0"/>
+              <a:rPr lang="en-GB" i="1" u="sng" dirty="0"/>
               <a:t>classes</a:t>
             </a:r>
             <a:r>
-              <a:rPr lang="en-GB" i="1" dirty="0" smtClean="0"/>
+              <a:rPr lang="en-GB" i="1" dirty="0"/>
               <a:t>.</a:t>
             </a:r>
           </a:p>
           <a:p>
-            <a:endParaRPr lang="en-GB" dirty="0" smtClean="0"/>
+            <a:endParaRPr lang="en-GB" dirty="0"/>
           </a:p>
         </p:txBody>
       </p:sp>
@@ -10459,15 +10289,7 @@
                   <a:srgbClr val="FFFF00"/>
                 </a:solidFill>
               </a:rPr>
-              <a:t> </a:t>
-            </a:r>
-            <a:r>
-              <a:rPr lang="en-GB" dirty="0" smtClean="0">
-                <a:solidFill>
-                  <a:srgbClr val="FFFF00"/>
-                </a:solidFill>
-              </a:rPr>
-              <a:t>What do you think this program will do ?</a:t>
+              <a:t> What do you think this program will do ?</a:t>
             </a:r>
           </a:p>
           <a:p>
@@ -10489,28 +10311,15 @@
                   <a:srgbClr val="FFFF00"/>
                 </a:solidFill>
               </a:rPr>
-              <a:t> </a:t>
-            </a:r>
-            <a:r>
-              <a:rPr lang="en-GB" dirty="0" smtClean="0">
-                <a:solidFill>
-                  <a:srgbClr val="FFFF00"/>
-                </a:solidFill>
-              </a:rPr>
-              <a:t>Type it in and run it and see if you are correct.</a:t>
-            </a:r>
-            <a:endParaRPr lang="en-GB" dirty="0">
-              <a:solidFill>
-                <a:srgbClr val="FFFF00"/>
-              </a:solidFill>
-            </a:endParaRPr>
+              <a:t> Type it in and run it and see if you are correct.</a:t>
+            </a:r>
           </a:p>
           <a:p>
             <a:pPr marL="285750" indent="-285750">
               <a:buFont typeface="Arial" panose="020B0604020202020204" pitchFamily="34" charset="0"/>
               <a:buChar char="•"/>
             </a:pPr>
-            <a:endParaRPr lang="en-GB" dirty="0" smtClean="0">
+            <a:endParaRPr lang="en-GB" dirty="0">
               <a:solidFill>
                 <a:srgbClr val="FFFF00"/>
               </a:solidFill>
@@ -10528,13 +10337,6 @@
   <p:clrMapOvr>
     <a:masterClrMapping/>
   </p:clrMapOvr>
-  <p:timing>
-    <p:tnLst>
-      <p:par>
-        <p:cTn id="1" dur="indefinite" restart="never" nodeType="tmRoot"/>
-      </p:par>
-    </p:tnLst>
-  </p:timing>
 </p:sld>
 </file>
 
@@ -10576,14 +10378,9 @@
           <a:lstStyle/>
           <a:p>
             <a:r>
-              <a:rPr lang="en-GB" dirty="0" smtClean="0"/>
-              <a:t>Adding </a:t>
-            </a:r>
-            <a:r>
-              <a:rPr lang="en-GB" dirty="0" smtClean="0"/>
-              <a:t>a single thing to a list.</a:t>
-            </a:r>
-            <a:endParaRPr lang="en-GB" dirty="0"/>
+              <a:rPr lang="en-GB" dirty="0"/>
+              <a:t>Adding a single thing to a list.</a:t>
+            </a:r>
           </a:p>
         </p:txBody>
       </p:sp>
@@ -10610,64 +10407,64 @@
           <a:lstStyle/>
           <a:p>
             <a:r>
-              <a:rPr lang="en-GB" dirty="0" smtClean="0"/>
+              <a:rPr lang="en-GB" dirty="0"/>
               <a:t>To put something new on the end of the list, you need to use the </a:t>
             </a:r>
             <a:r>
-              <a:rPr lang="en-GB" b="1" dirty="0" smtClean="0"/>
+              <a:rPr lang="en-GB" b="1" dirty="0"/>
               <a:t>append</a:t>
             </a:r>
             <a:r>
-              <a:rPr lang="en-GB" dirty="0" smtClean="0"/>
+              <a:rPr lang="en-GB" dirty="0"/>
               <a:t> </a:t>
             </a:r>
             <a:r>
-              <a:rPr lang="en-GB" u="sng" dirty="0" smtClean="0"/>
+              <a:rPr lang="en-GB" u="sng" dirty="0"/>
               <a:t>method</a:t>
             </a:r>
             <a:r>
-              <a:rPr lang="en-GB" dirty="0" smtClean="0"/>
+              <a:rPr lang="en-GB" dirty="0"/>
               <a:t> of the list.</a:t>
             </a:r>
           </a:p>
           <a:p>
             <a:r>
-              <a:rPr lang="en-GB" dirty="0" smtClean="0"/>
+              <a:rPr lang="en-GB" dirty="0"/>
               <a:t>You can insert something into the list in another position with by using </a:t>
             </a:r>
             <a:r>
-              <a:rPr lang="en-GB" b="1" dirty="0" smtClean="0"/>
+              <a:rPr lang="en-GB" b="1" dirty="0"/>
               <a:t>insert</a:t>
             </a:r>
             <a:r>
-              <a:rPr lang="en-GB" dirty="0" smtClean="0"/>
+              <a:rPr lang="en-GB" dirty="0"/>
               <a:t> method of the list.</a:t>
             </a:r>
           </a:p>
           <a:p>
             <a:r>
-              <a:rPr lang="en-GB" i="1" dirty="0" smtClean="0"/>
+              <a:rPr lang="en-GB" i="1" dirty="0"/>
               <a:t>We will learn why these are called </a:t>
             </a:r>
             <a:r>
-              <a:rPr lang="en-GB" i="1" u="sng" dirty="0" smtClean="0"/>
+              <a:rPr lang="en-GB" i="1" u="sng" dirty="0"/>
               <a:t>methods</a:t>
             </a:r>
             <a:r>
-              <a:rPr lang="en-GB" i="1" dirty="0" smtClean="0"/>
+              <a:rPr lang="en-GB" i="1" dirty="0"/>
               <a:t> in a later week, when we also learn about </a:t>
             </a:r>
             <a:r>
-              <a:rPr lang="en-GB" i="1" u="sng" dirty="0" smtClean="0"/>
+              <a:rPr lang="en-GB" i="1" u="sng" dirty="0"/>
               <a:t>classes</a:t>
             </a:r>
             <a:r>
-              <a:rPr lang="en-GB" i="1" dirty="0" smtClean="0"/>
+              <a:rPr lang="en-GB" i="1" dirty="0"/>
               <a:t>.</a:t>
             </a:r>
           </a:p>
           <a:p>
-            <a:endParaRPr lang="en-GB" dirty="0" smtClean="0"/>
+            <a:endParaRPr lang="en-GB" dirty="0"/>
           </a:p>
         </p:txBody>
       </p:sp>
@@ -10963,15 +10760,7 @@
                   <a:srgbClr val="FFFF00"/>
                 </a:solidFill>
               </a:rPr>
-              <a:t> </a:t>
-            </a:r>
-            <a:r>
-              <a:rPr lang="en-GB" dirty="0" smtClean="0">
-                <a:solidFill>
-                  <a:srgbClr val="FFFF00"/>
-                </a:solidFill>
-              </a:rPr>
-              <a:t>What do you think this program will do ?</a:t>
+              <a:t> What do you think this program will do ?</a:t>
             </a:r>
           </a:p>
           <a:p>
@@ -10980,7 +10769,7 @@
               <a:buChar char="•"/>
             </a:pPr>
             <a:r>
-              <a:rPr lang="en-GB" dirty="0" smtClean="0">
+              <a:rPr lang="en-GB" dirty="0">
                 <a:solidFill>
                   <a:srgbClr val="FFFF00"/>
                 </a:solidFill>
@@ -10994,49 +10783,28 @@
               <a:buChar char="•"/>
             </a:pPr>
             <a:r>
-              <a:rPr lang="en-GB" b="1" u="sng" dirty="0" smtClean="0">
+              <a:rPr lang="en-GB" b="1" u="sng" dirty="0">
                 <a:solidFill>
                   <a:srgbClr val="FFFF00"/>
                 </a:solidFill>
               </a:rPr>
-              <a:t>TASK</a:t>
-            </a:r>
-            <a:r>
-              <a:rPr lang="en-GB" b="1" u="sng" dirty="0">
+              <a:t>TASK:</a:t>
+            </a:r>
+            <a:r>
+              <a:rPr lang="en-GB" dirty="0">
                 <a:solidFill>
                   <a:srgbClr val="FFFF00"/>
                 </a:solidFill>
               </a:rPr>
-              <a:t>:</a:t>
-            </a:r>
-            <a:r>
-              <a:rPr lang="en-GB" dirty="0">
-                <a:solidFill>
-                  <a:srgbClr val="FFFF00"/>
-                </a:solidFill>
-              </a:rPr>
-              <a:t> </a:t>
-            </a:r>
-            <a:r>
-              <a:rPr lang="en-GB" dirty="0" smtClean="0">
-                <a:solidFill>
-                  <a:srgbClr val="FFFF00"/>
-                </a:solidFill>
-              </a:rPr>
-              <a:t>Type it in and run it and see if you are correct.</a:t>
-            </a:r>
-            <a:endParaRPr lang="en-GB" dirty="0">
-              <a:solidFill>
-                <a:srgbClr val="FFFF00"/>
-              </a:solidFill>
-            </a:endParaRPr>
+              <a:t> Type it in and run it and see if you are correct.</a:t>
+            </a:r>
           </a:p>
           <a:p>
             <a:pPr marL="285750" indent="-285750">
               <a:buFont typeface="Arial" panose="020B0604020202020204" pitchFamily="34" charset="0"/>
               <a:buChar char="•"/>
             </a:pPr>
-            <a:endParaRPr lang="en-GB" dirty="0" smtClean="0">
+            <a:endParaRPr lang="en-GB" dirty="0">
               <a:solidFill>
                 <a:srgbClr val="FFFF00"/>
               </a:solidFill>
@@ -11233,13 +11001,6 @@
   <p:clrMapOvr>
     <a:masterClrMapping/>
   </p:clrMapOvr>
-  <p:timing>
-    <p:tnLst>
-      <p:par>
-        <p:cTn id="1" dur="indefinite" restart="never" nodeType="tmRoot"/>
-      </p:par>
-    </p:tnLst>
-  </p:timing>
 </p:sld>
 </file>
 
@@ -11281,10 +11042,9 @@
           <a:lstStyle/>
           <a:p>
             <a:r>
-              <a:rPr lang="en-GB" dirty="0" smtClean="0"/>
+              <a:rPr lang="en-GB" dirty="0"/>
               <a:t>Adding multiple things to a list.</a:t>
             </a:r>
-            <a:endParaRPr lang="en-GB" dirty="0"/>
           </a:p>
         </p:txBody>
       </p:sp>
@@ -11311,15 +11071,15 @@
           <a:lstStyle/>
           <a:p>
             <a:r>
-              <a:rPr lang="en-GB" dirty="0" smtClean="0"/>
+              <a:rPr lang="en-GB" dirty="0"/>
               <a:t>You can also use the </a:t>
             </a:r>
             <a:r>
-              <a:rPr lang="en-GB" u="sng" dirty="0" smtClean="0"/>
+              <a:rPr lang="en-GB" u="sng" dirty="0"/>
               <a:t>extend method</a:t>
             </a:r>
             <a:r>
-              <a:rPr lang="en-GB" dirty="0" smtClean="0"/>
+              <a:rPr lang="en-GB" dirty="0"/>
               <a:t> to add multiple things to the end of a list.</a:t>
             </a:r>
           </a:p>
@@ -11328,13 +11088,12 @@
           </a:p>
           <a:p>
             <a:r>
-              <a:rPr lang="en-GB" dirty="0" smtClean="0"/>
+              <a:rPr lang="en-GB" dirty="0"/>
               <a:t>To see how, follow the example.</a:t>
             </a:r>
-            <a:endParaRPr lang="en-GB" dirty="0" smtClean="0"/>
-          </a:p>
-          <a:p>
-            <a:endParaRPr lang="en-GB" dirty="0" smtClean="0"/>
+          </a:p>
+          <a:p>
+            <a:endParaRPr lang="en-GB" dirty="0"/>
           </a:p>
         </p:txBody>
       </p:sp>
@@ -11630,15 +11389,7 @@
                   <a:srgbClr val="FFFF00"/>
                 </a:solidFill>
               </a:rPr>
-              <a:t> </a:t>
-            </a:r>
-            <a:r>
-              <a:rPr lang="en-GB" dirty="0" smtClean="0">
-                <a:solidFill>
-                  <a:srgbClr val="FFFF00"/>
-                </a:solidFill>
-              </a:rPr>
-              <a:t>What do you think this program will do ?</a:t>
+              <a:t> What do you think this program will do ?</a:t>
             </a:r>
           </a:p>
           <a:p>
@@ -11647,7 +11398,7 @@
               <a:buChar char="•"/>
             </a:pPr>
             <a:r>
-              <a:rPr lang="en-GB" dirty="0" smtClean="0">
+              <a:rPr lang="en-GB" dirty="0">
                 <a:solidFill>
                   <a:srgbClr val="FFFF00"/>
                 </a:solidFill>
@@ -11661,49 +11412,28 @@
               <a:buChar char="•"/>
             </a:pPr>
             <a:r>
-              <a:rPr lang="en-GB" b="1" u="sng" dirty="0" smtClean="0">
+              <a:rPr lang="en-GB" b="1" u="sng" dirty="0">
                 <a:solidFill>
                   <a:srgbClr val="FFFF00"/>
                 </a:solidFill>
               </a:rPr>
-              <a:t>TASK</a:t>
-            </a:r>
-            <a:r>
-              <a:rPr lang="en-GB" b="1" u="sng" dirty="0">
+              <a:t>TASK:</a:t>
+            </a:r>
+            <a:r>
+              <a:rPr lang="en-GB" dirty="0">
                 <a:solidFill>
                   <a:srgbClr val="FFFF00"/>
                 </a:solidFill>
               </a:rPr>
-              <a:t>:</a:t>
-            </a:r>
-            <a:r>
-              <a:rPr lang="en-GB" dirty="0">
-                <a:solidFill>
-                  <a:srgbClr val="FFFF00"/>
-                </a:solidFill>
-              </a:rPr>
-              <a:t> </a:t>
-            </a:r>
-            <a:r>
-              <a:rPr lang="en-GB" dirty="0" smtClean="0">
-                <a:solidFill>
-                  <a:srgbClr val="FFFF00"/>
-                </a:solidFill>
-              </a:rPr>
-              <a:t>Type it in and run it and see if you are correct.</a:t>
-            </a:r>
-            <a:endParaRPr lang="en-GB" dirty="0">
-              <a:solidFill>
-                <a:srgbClr val="FFFF00"/>
-              </a:solidFill>
-            </a:endParaRPr>
+              <a:t> Type it in and run it and see if you are correct.</a:t>
+            </a:r>
           </a:p>
           <a:p>
             <a:pPr marL="285750" indent="-285750">
               <a:buFont typeface="Arial" panose="020B0604020202020204" pitchFamily="34" charset="0"/>
               <a:buChar char="•"/>
             </a:pPr>
-            <a:endParaRPr lang="en-GB" dirty="0" smtClean="0">
+            <a:endParaRPr lang="en-GB" dirty="0">
               <a:solidFill>
                 <a:srgbClr val="FFFF00"/>
               </a:solidFill>
@@ -11893,13 +11623,6 @@
   <p:clrMapOvr>
     <a:masterClrMapping/>
   </p:clrMapOvr>
-  <p:timing>
-    <p:tnLst>
-      <p:par>
-        <p:cTn id="1" dur="indefinite" restart="never" nodeType="tmRoot"/>
-      </p:par>
-    </p:tnLst>
-  </p:timing>
 </p:sld>
 </file>
 
@@ -11936,10 +11659,9 @@
           <a:lstStyle/>
           <a:p>
             <a:r>
-              <a:rPr lang="en-GB" dirty="0" smtClean="0"/>
+              <a:rPr lang="en-GB" dirty="0"/>
               <a:t>Getting individual elements of a list.</a:t>
             </a:r>
-            <a:endParaRPr lang="en-GB" dirty="0"/>
           </a:p>
         </p:txBody>
       </p:sp>
@@ -11964,22 +11686,21 @@
           <a:lstStyle/>
           <a:p>
             <a:r>
-              <a:rPr lang="en-GB" dirty="0" smtClean="0"/>
+              <a:rPr lang="en-GB" dirty="0"/>
               <a:t>We can use a new type of notation to get individual elements of a list.</a:t>
             </a:r>
           </a:p>
           <a:p>
             <a:r>
-              <a:rPr lang="en-GB" dirty="0" smtClean="0"/>
+              <a:rPr lang="en-GB" dirty="0"/>
               <a:t>If we use square brackets to enclose a number after a list variable, it says to only work on that element of the list.</a:t>
             </a:r>
           </a:p>
           <a:p>
             <a:r>
-              <a:rPr lang="en-GB" dirty="0" smtClean="0"/>
+              <a:rPr lang="en-GB" dirty="0"/>
               <a:t>The easiest way to understand this is to look at an example.</a:t>
             </a:r>
-            <a:endParaRPr lang="en-GB" dirty="0"/>
           </a:p>
         </p:txBody>
       </p:sp>
@@ -12022,15 +11743,7 @@
                   <a:srgbClr val="FFFF00"/>
                 </a:solidFill>
               </a:rPr>
-              <a:t> </a:t>
-            </a:r>
-            <a:r>
-              <a:rPr lang="en-GB" dirty="0" smtClean="0">
-                <a:solidFill>
-                  <a:srgbClr val="FFFF00"/>
-                </a:solidFill>
-              </a:rPr>
-              <a:t>What do you think this program will do ?</a:t>
+              <a:t> What do you think this program will do ?</a:t>
             </a:r>
           </a:p>
           <a:p>
@@ -12052,28 +11765,15 @@
                   <a:srgbClr val="FFFF00"/>
                 </a:solidFill>
               </a:rPr>
-              <a:t> </a:t>
-            </a:r>
-            <a:r>
-              <a:rPr lang="en-GB" dirty="0" smtClean="0">
-                <a:solidFill>
-                  <a:srgbClr val="FFFF00"/>
-                </a:solidFill>
-              </a:rPr>
-              <a:t>Type it in and run it and see if you are correct.</a:t>
-            </a:r>
-            <a:endParaRPr lang="en-GB" dirty="0">
-              <a:solidFill>
-                <a:srgbClr val="FFFF00"/>
-              </a:solidFill>
-            </a:endParaRPr>
+              <a:t> Type it in and run it and see if you are correct.</a:t>
+            </a:r>
           </a:p>
           <a:p>
             <a:pPr marL="285750" indent="-285750">
               <a:buFont typeface="Arial" panose="020B0604020202020204" pitchFamily="34" charset="0"/>
               <a:buChar char="•"/>
             </a:pPr>
-            <a:endParaRPr lang="en-GB" dirty="0" smtClean="0">
+            <a:endParaRPr lang="en-GB" dirty="0">
               <a:solidFill>
                 <a:srgbClr val="FFFF00"/>
               </a:solidFill>
@@ -12463,10 +12163,9 @@
           <a:lstStyle/>
           <a:p>
             <a:r>
-              <a:rPr lang="en-GB" dirty="0" smtClean="0"/>
+              <a:rPr lang="en-GB" dirty="0"/>
               <a:t>Iterating Over Lists.</a:t>
             </a:r>
-            <a:endParaRPr lang="en-GB" dirty="0"/>
           </a:p>
         </p:txBody>
       </p:sp>
@@ -12493,31 +12192,31 @@
           <a:lstStyle/>
           <a:p>
             <a:r>
-              <a:rPr lang="en-GB" dirty="0" smtClean="0"/>
+              <a:rPr lang="en-GB" dirty="0"/>
               <a:t>You can do an action on every element of a list.</a:t>
             </a:r>
           </a:p>
           <a:p>
             <a:r>
-              <a:rPr lang="en-GB" dirty="0" smtClean="0"/>
+              <a:rPr lang="en-GB" dirty="0"/>
               <a:t>This is called </a:t>
             </a:r>
             <a:r>
-              <a:rPr lang="en-GB" u="sng" dirty="0" smtClean="0"/>
+              <a:rPr lang="en-GB" u="sng" dirty="0"/>
               <a:t>iterating over</a:t>
             </a:r>
             <a:r>
-              <a:rPr lang="en-GB" dirty="0" smtClean="0"/>
+              <a:rPr lang="en-GB" dirty="0"/>
               <a:t> the list.</a:t>
             </a:r>
           </a:p>
           <a:p>
             <a:r>
-              <a:rPr lang="en-GB" dirty="0" smtClean="0"/>
+              <a:rPr lang="en-GB" dirty="0"/>
               <a:t>We do this with a </a:t>
             </a:r>
             <a:r>
-              <a:rPr lang="en-GB" u="sng" dirty="0" smtClean="0"/>
+              <a:rPr lang="en-GB" u="sng" dirty="0"/>
               <a:t>for loop.</a:t>
             </a:r>
           </a:p>
@@ -12526,28 +12225,28 @@
           </a:p>
           <a:p>
             <a:r>
-              <a:rPr lang="en-GB" dirty="0" smtClean="0"/>
+              <a:rPr lang="en-GB" dirty="0"/>
               <a:t>In English, we want Python to repeat a </a:t>
             </a:r>
             <a:r>
-              <a:rPr lang="en-GB" u="sng" dirty="0" smtClean="0"/>
+              <a:rPr lang="en-GB" u="sng" dirty="0"/>
               <a:t>block</a:t>
             </a:r>
             <a:r>
-              <a:rPr lang="en-GB" b="1" dirty="0" smtClean="0"/>
+              <a:rPr lang="en-GB" b="1" dirty="0"/>
               <a:t> </a:t>
             </a:r>
             <a:r>
-              <a:rPr lang="en-GB" dirty="0" smtClean="0"/>
+              <a:rPr lang="en-GB" dirty="0"/>
               <a:t>of instructions with a variable that changes to the next element of the list each time we go around the loop.</a:t>
             </a:r>
           </a:p>
           <a:p>
-            <a:endParaRPr lang="en-GB" u="sng" dirty="0" smtClean="0"/>
-          </a:p>
-          <a:p>
-            <a:r>
-              <a:rPr lang="en-GB" dirty="0" smtClean="0"/>
+            <a:endParaRPr lang="en-GB" u="sng" dirty="0"/>
+          </a:p>
+          <a:p>
+            <a:r>
+              <a:rPr lang="en-GB" dirty="0"/>
               <a:t>Lets try an example of this.</a:t>
             </a:r>
             <a:endParaRPr lang="en-GB" u="sng" dirty="0"/>
@@ -12603,10 +12302,9 @@
           <a:lstStyle/>
           <a:p>
             <a:r>
-              <a:rPr lang="en-GB" dirty="0" smtClean="0"/>
+              <a:rPr lang="en-GB" dirty="0"/>
               <a:t>Iteration Example.</a:t>
             </a:r>
-            <a:endParaRPr lang="en-GB" dirty="0"/>
           </a:p>
         </p:txBody>
       </p:sp>
@@ -12649,15 +12347,7 @@
                   <a:srgbClr val="FFFF00"/>
                 </a:solidFill>
               </a:rPr>
-              <a:t> </a:t>
-            </a:r>
-            <a:r>
-              <a:rPr lang="en-GB" dirty="0" smtClean="0">
-                <a:solidFill>
-                  <a:srgbClr val="FFFF00"/>
-                </a:solidFill>
-              </a:rPr>
-              <a:t>What do you think this program will do ?</a:t>
+              <a:t> What do you think this program will do ?</a:t>
             </a:r>
           </a:p>
           <a:p>
@@ -12679,28 +12369,15 @@
                   <a:srgbClr val="FFFF00"/>
                 </a:solidFill>
               </a:rPr>
-              <a:t> </a:t>
-            </a:r>
-            <a:r>
-              <a:rPr lang="en-GB" dirty="0" smtClean="0">
-                <a:solidFill>
-                  <a:srgbClr val="FFFF00"/>
-                </a:solidFill>
-              </a:rPr>
-              <a:t>Type it in and run it and see if you are correct.</a:t>
-            </a:r>
-            <a:endParaRPr lang="en-GB" dirty="0">
-              <a:solidFill>
-                <a:srgbClr val="FFFF00"/>
-              </a:solidFill>
-            </a:endParaRPr>
+              <a:t> Type it in and run it and see if you are correct.</a:t>
+            </a:r>
           </a:p>
           <a:p>
             <a:pPr marL="285750" indent="-285750">
               <a:buFont typeface="Arial" panose="020B0604020202020204" pitchFamily="34" charset="0"/>
               <a:buChar char="•"/>
             </a:pPr>
-            <a:endParaRPr lang="en-GB" dirty="0" smtClean="0">
+            <a:endParaRPr lang="en-GB" dirty="0">
               <a:solidFill>
                 <a:srgbClr val="FFFF00"/>
               </a:solidFill>
@@ -12868,10 +12545,9 @@
           <a:lstStyle/>
           <a:p>
             <a:r>
-              <a:rPr lang="en-GB" dirty="0" smtClean="0"/>
+              <a:rPr lang="en-GB" dirty="0"/>
               <a:t>Homework</a:t>
             </a:r>
-            <a:endParaRPr lang="en-GB" dirty="0"/>
           </a:p>
         </p:txBody>
       </p:sp>
@@ -12940,14 +12616,9 @@
           <a:lstStyle/>
           <a:p>
             <a:r>
-              <a:rPr lang="en-GB" dirty="0" smtClean="0"/>
-              <a:t>Homework </a:t>
-            </a:r>
-            <a:r>
-              <a:rPr lang="en-GB" dirty="0" smtClean="0"/>
-              <a:t>1</a:t>
-            </a:r>
-            <a:endParaRPr lang="en-GB" dirty="0"/>
+              <a:rPr lang="en-GB" dirty="0"/>
+              <a:t>Homework 1</a:t>
+            </a:r>
           </a:p>
         </p:txBody>
       </p:sp>
@@ -12974,28 +12645,28 @@
           <a:lstStyle/>
           <a:p>
             <a:r>
-              <a:rPr lang="en-GB" dirty="0" smtClean="0"/>
+              <a:rPr lang="en-GB" dirty="0"/>
               <a:t>Write a program which asks for :-</a:t>
             </a:r>
           </a:p>
           <a:p>
             <a:pPr lvl="1"/>
             <a:r>
-              <a:rPr lang="en-GB" dirty="0" smtClean="0"/>
+              <a:rPr lang="en-GB" dirty="0"/>
               <a:t>A first number.</a:t>
             </a:r>
           </a:p>
           <a:p>
             <a:pPr lvl="1"/>
             <a:r>
-              <a:rPr lang="en-GB" dirty="0" smtClean="0"/>
+              <a:rPr lang="en-GB" dirty="0"/>
               <a:t>An operator from the set of +, -, *, /</a:t>
             </a:r>
           </a:p>
           <a:p>
             <a:pPr lvl="1"/>
             <a:r>
-              <a:rPr lang="en-GB" dirty="0" smtClean="0"/>
+              <a:rPr lang="en-GB" dirty="0"/>
               <a:t>A second number.</a:t>
             </a:r>
           </a:p>
@@ -13004,10 +12675,9 @@
           </a:p>
           <a:p>
             <a:r>
-              <a:rPr lang="en-GB" dirty="0" smtClean="0"/>
+              <a:rPr lang="en-GB" dirty="0"/>
               <a:t>It will then perform the calculation and print the answer.</a:t>
             </a:r>
-            <a:endParaRPr lang="en-GB" dirty="0"/>
           </a:p>
           <a:p>
             <a:endParaRPr lang="en-GB" dirty="0"/>
@@ -13267,7 +12937,7 @@
               <a:buNone/>
             </a:pPr>
             <a:r>
-              <a:rPr lang="en-GB" sz="1800" dirty="0" smtClean="0">
+              <a:rPr lang="en-GB" sz="1800" dirty="0">
                 <a:latin typeface="Courier New" panose="02070309020205020404" pitchFamily="49" charset="0"/>
                 <a:cs typeface="Courier New" panose="02070309020205020404" pitchFamily="49" charset="0"/>
               </a:rPr>
@@ -13356,7 +13026,7 @@
             <a:pPr marL="0" indent="0">
               <a:buNone/>
             </a:pPr>
-            <a:endParaRPr lang="en-GB" sz="1800" dirty="0" smtClean="0">
+            <a:endParaRPr lang="en-GB" sz="1800" dirty="0">
               <a:latin typeface="Courier New" panose="02070309020205020404" pitchFamily="49" charset="0"/>
               <a:cs typeface="Courier New" panose="02070309020205020404" pitchFamily="49" charset="0"/>
             </a:endParaRPr>
@@ -13366,7 +13036,7 @@
               <a:buNone/>
             </a:pPr>
             <a:r>
-              <a:rPr lang="en-GB" sz="1800" dirty="0" smtClean="0">
+              <a:rPr lang="en-GB" sz="1800" dirty="0">
                 <a:latin typeface="Courier New" panose="02070309020205020404" pitchFamily="49" charset="0"/>
                 <a:cs typeface="Courier New" panose="02070309020205020404" pitchFamily="49" charset="0"/>
               </a:rPr>
@@ -13455,7 +13125,7 @@
             <a:pPr marL="0" indent="0">
               <a:buNone/>
             </a:pPr>
-            <a:endParaRPr lang="en-GB" sz="1800" dirty="0" smtClean="0">
+            <a:endParaRPr lang="en-GB" sz="1800" dirty="0">
               <a:latin typeface="Courier New" panose="02070309020205020404" pitchFamily="49" charset="0"/>
               <a:cs typeface="Courier New" panose="02070309020205020404" pitchFamily="49" charset="0"/>
             </a:endParaRPr>
@@ -13473,7 +13143,7 @@
             <a:pPr marL="0" indent="0">
               <a:buNone/>
             </a:pPr>
-            <a:endParaRPr lang="en-GB" sz="1800" dirty="0" smtClean="0">
+            <a:endParaRPr lang="en-GB" sz="1800" dirty="0">
               <a:latin typeface="Courier New" panose="02070309020205020404" pitchFamily="49" charset="0"/>
               <a:cs typeface="Courier New" panose="02070309020205020404" pitchFamily="49" charset="0"/>
             </a:endParaRPr>
@@ -13496,13 +13166,6 @@
   <p:clrMapOvr>
     <a:masterClrMapping/>
   </p:clrMapOvr>
-  <p:timing>
-    <p:tnLst>
-      <p:par>
-        <p:cTn id="1" dur="indefinite" restart="never" nodeType="tmRoot"/>
-      </p:par>
-    </p:tnLst>
-  </p:timing>
 </p:sld>
 </file>
 
@@ -13539,14 +13202,9 @@
           <a:lstStyle/>
           <a:p>
             <a:r>
-              <a:rPr lang="en-GB" dirty="0" smtClean="0"/>
-              <a:t>Homework </a:t>
-            </a:r>
-            <a:r>
-              <a:rPr lang="en-GB" dirty="0" smtClean="0"/>
-              <a:t>2</a:t>
-            </a:r>
-            <a:endParaRPr lang="en-GB" dirty="0"/>
+              <a:rPr lang="en-GB" dirty="0"/>
+              <a:t>Homework 2</a:t>
+            </a:r>
           </a:p>
         </p:txBody>
       </p:sp>
@@ -13573,13 +13231,13 @@
           <a:lstStyle/>
           <a:p>
             <a:r>
-              <a:rPr lang="en-GB" dirty="0" smtClean="0"/>
+              <a:rPr lang="en-GB" dirty="0"/>
               <a:t>What do you think happens if you convert 4.4 to an integer ?</a:t>
             </a:r>
           </a:p>
           <a:p>
             <a:r>
-              <a:rPr lang="en-GB" dirty="0" smtClean="0"/>
+              <a:rPr lang="en-GB" dirty="0"/>
               <a:t>What do you think happens if you convert 4.6 to an integer ?</a:t>
             </a:r>
           </a:p>
@@ -13588,17 +13246,16 @@
           </a:p>
           <a:p>
             <a:r>
-              <a:rPr lang="en-GB" dirty="0" smtClean="0"/>
+              <a:rPr lang="en-GB" dirty="0"/>
               <a:t>Write a program to see what happens.</a:t>
             </a:r>
           </a:p>
           <a:p>
             <a:pPr lvl="1"/>
             <a:r>
-              <a:rPr lang="en-GB" dirty="0" smtClean="0"/>
+              <a:rPr lang="en-GB" dirty="0"/>
               <a:t>Is it what you expected to happen ?</a:t>
             </a:r>
-            <a:endParaRPr lang="en-GB" dirty="0"/>
           </a:p>
           <a:p>
             <a:endParaRPr lang="en-GB" dirty="0"/>
@@ -13615,13 +13272,6 @@
   <p:clrMapOvr>
     <a:masterClrMapping/>
   </p:clrMapOvr>
-  <p:timing>
-    <p:tnLst>
-      <p:par>
-        <p:cTn id="1" dur="indefinite" restart="never" nodeType="tmRoot"/>
-      </p:par>
-    </p:tnLst>
-  </p:timing>
 </p:sld>
 </file>
 
@@ -13658,14 +13308,9 @@
           <a:lstStyle/>
           <a:p>
             <a:r>
-              <a:rPr lang="en-GB" dirty="0" smtClean="0"/>
-              <a:t>Homework </a:t>
-            </a:r>
-            <a:r>
-              <a:rPr lang="en-GB" dirty="0"/>
-              <a:t>3</a:t>
-            </a:r>
-            <a:endParaRPr lang="en-GB" dirty="0"/>
+              <a:rPr lang="en-GB" dirty="0"/>
+              <a:t>Homework 3</a:t>
+            </a:r>
           </a:p>
         </p:txBody>
       </p:sp>
@@ -13692,49 +13337,42 @@
           <a:lstStyle/>
           <a:p>
             <a:r>
-              <a:rPr lang="el-GR" dirty="0" smtClean="0"/>
+              <a:rPr lang="el-GR" dirty="0"/>
               <a:t>π</a:t>
             </a:r>
             <a:r>
-              <a:rPr lang="en-GB" dirty="0" smtClean="0"/>
+              <a:rPr lang="en-GB" dirty="0"/>
               <a:t> is approximately 3.14159265359</a:t>
             </a:r>
           </a:p>
           <a:p>
             <a:r>
-              <a:rPr lang="en-GB" dirty="0" smtClean="0"/>
-              <a:t>e </a:t>
-            </a:r>
-            <a:r>
-              <a:rPr lang="en-GB" dirty="0"/>
-              <a:t>is approximately 2.7182818284</a:t>
-            </a:r>
-            <a:endParaRPr lang="en-GB" dirty="0" smtClean="0"/>
+              <a:rPr lang="en-GB" dirty="0"/>
+              <a:t>e is approximately 2.7182818284</a:t>
+            </a:r>
           </a:p>
           <a:p>
             <a:endParaRPr lang="en-GB" dirty="0"/>
           </a:p>
           <a:p>
             <a:r>
-              <a:rPr lang="en-GB" dirty="0" smtClean="0"/>
+              <a:rPr lang="en-GB" dirty="0"/>
               <a:t>Print </a:t>
             </a:r>
             <a:r>
-              <a:rPr lang="el-GR" dirty="0" smtClean="0"/>
+              <a:rPr lang="el-GR" dirty="0"/>
               <a:t>π</a:t>
             </a:r>
             <a:r>
-              <a:rPr lang="en-GB" dirty="0" smtClean="0"/>
+              <a:rPr lang="en-GB" dirty="0"/>
               <a:t> to 3 decimal places, 6 decimal places and 9 decimal places.</a:t>
             </a:r>
-            <a:endParaRPr lang="en-GB" dirty="0"/>
-          </a:p>
-          <a:p>
-            <a:r>
-              <a:rPr lang="en-GB" dirty="0" smtClean="0"/>
+          </a:p>
+          <a:p>
+            <a:r>
+              <a:rPr lang="en-GB" dirty="0"/>
               <a:t>Print e to 2 decimal places, 4 decimal places and 6 decimal places.</a:t>
             </a:r>
-            <a:endParaRPr lang="en-GB" dirty="0"/>
           </a:p>
         </p:txBody>
       </p:sp>
@@ -13748,13 +13386,6 @@
   <p:clrMapOvr>
     <a:masterClrMapping/>
   </p:clrMapOvr>
-  <p:timing>
-    <p:tnLst>
-      <p:par>
-        <p:cTn id="1" dur="indefinite" restart="never" nodeType="tmRoot"/>
-      </p:par>
-    </p:tnLst>
-  </p:timing>
 </p:sld>
 </file>
 
@@ -13796,10 +13427,9 @@
           <a:lstStyle/>
           <a:p>
             <a:r>
-              <a:rPr lang="en-GB" dirty="0" smtClean="0"/>
+              <a:rPr lang="en-GB" dirty="0"/>
               <a:t>Mixing Integers and Strings.</a:t>
             </a:r>
-            <a:endParaRPr lang="en-GB" dirty="0"/>
           </a:p>
         </p:txBody>
       </p:sp>
@@ -13868,14 +13498,9 @@
           <a:lstStyle/>
           <a:p>
             <a:r>
-              <a:rPr lang="en-GB" dirty="0" smtClean="0"/>
-              <a:t>Homework </a:t>
-            </a:r>
-            <a:r>
-              <a:rPr lang="en-GB" dirty="0" smtClean="0"/>
-              <a:t>4</a:t>
-            </a:r>
-            <a:endParaRPr lang="en-GB" dirty="0"/>
+              <a:rPr lang="en-GB" dirty="0"/>
+              <a:t>Homework 4</a:t>
+            </a:r>
           </a:p>
         </p:txBody>
       </p:sp>
@@ -13902,68 +13527,67 @@
           <a:lstStyle/>
           <a:p>
             <a:r>
-              <a:rPr lang="en-GB" dirty="0" smtClean="0"/>
+              <a:rPr lang="en-GB" dirty="0"/>
               <a:t>Store the first 6 months of the year in a list.</a:t>
             </a:r>
           </a:p>
           <a:p>
             <a:r>
-              <a:rPr lang="en-GB" dirty="0" smtClean="0"/>
+              <a:rPr lang="en-GB" dirty="0"/>
               <a:t>Print the list.</a:t>
             </a:r>
           </a:p>
           <a:p>
             <a:r>
-              <a:rPr lang="en-GB" dirty="0" smtClean="0"/>
+              <a:rPr lang="en-GB" dirty="0"/>
               <a:t>Add the next 3 months of the year to the list.</a:t>
             </a:r>
           </a:p>
           <a:p>
             <a:r>
-              <a:rPr lang="en-GB" dirty="0" smtClean="0"/>
+              <a:rPr lang="en-GB" dirty="0"/>
               <a:t>Print the list again.</a:t>
             </a:r>
           </a:p>
           <a:p>
             <a:r>
-              <a:rPr lang="en-GB" dirty="0" smtClean="0"/>
+              <a:rPr lang="en-GB" dirty="0"/>
               <a:t>Add the final 3 months of the year to the list.</a:t>
             </a:r>
           </a:p>
           <a:p>
             <a:r>
-              <a:rPr lang="en-GB" dirty="0" smtClean="0"/>
+              <a:rPr lang="en-GB" dirty="0"/>
               <a:t>Print the list again.</a:t>
             </a:r>
           </a:p>
           <a:p>
             <a:r>
-              <a:rPr lang="en-GB" dirty="0" smtClean="0"/>
+              <a:rPr lang="en-GB" dirty="0"/>
               <a:t>Print the 4</a:t>
             </a:r>
             <a:r>
-              <a:rPr lang="en-GB" baseline="30000" dirty="0" smtClean="0"/>
+              <a:rPr lang="en-GB" baseline="30000" dirty="0"/>
               <a:t>th</a:t>
             </a:r>
             <a:r>
-              <a:rPr lang="en-GB" dirty="0" smtClean="0"/>
+              <a:rPr lang="en-GB" dirty="0"/>
               <a:t> month.</a:t>
             </a:r>
           </a:p>
           <a:p>
             <a:r>
-              <a:rPr lang="en-GB" dirty="0" smtClean="0"/>
+              <a:rPr lang="en-GB" dirty="0"/>
               <a:t>Print the 8</a:t>
             </a:r>
             <a:r>
-              <a:rPr lang="en-GB" baseline="30000" dirty="0" smtClean="0"/>
+              <a:rPr lang="en-GB" baseline="30000" dirty="0"/>
               <a:t>th</a:t>
             </a:r>
             <a:r>
-              <a:rPr lang="en-GB" dirty="0" smtClean="0"/>
+              <a:rPr lang="en-GB" dirty="0"/>
               <a:t> month.</a:t>
             </a:r>
-            <a:endParaRPr lang="en-GB" dirty="0"/>
           </a:p>
         </p:txBody>
       </p:sp>
@@ -13977,13 +13601,6 @@
   <p:clrMapOvr>
     <a:masterClrMapping/>
   </p:clrMapOvr>
-  <p:timing>
-    <p:tnLst>
-      <p:par>
-        <p:cTn id="1" dur="indefinite" restart="never" nodeType="tmRoot"/>
-      </p:par>
-    </p:tnLst>
-  </p:timing>
 </p:sld>
 </file>
 
@@ -14020,14 +13637,9 @@
           <a:lstStyle/>
           <a:p>
             <a:r>
-              <a:rPr lang="en-GB" dirty="0" smtClean="0"/>
-              <a:t>Homework </a:t>
-            </a:r>
-            <a:r>
-              <a:rPr lang="en-GB" dirty="0"/>
-              <a:t>5</a:t>
-            </a:r>
-            <a:endParaRPr lang="en-GB" dirty="0"/>
+              <a:rPr lang="en-GB" dirty="0"/>
+              <a:t>Homework 5</a:t>
+            </a:r>
           </a:p>
         </p:txBody>
       </p:sp>
@@ -14054,14 +13666,14 @@
           <a:lstStyle/>
           <a:p>
             <a:r>
-              <a:rPr lang="en-GB" dirty="0" smtClean="0"/>
+              <a:rPr lang="en-GB" dirty="0"/>
               <a:t>Store the first 13 letters of the alphabet in a list.</a:t>
             </a:r>
           </a:p>
           <a:p>
             <a:pPr lvl="1"/>
             <a:r>
-              <a:rPr lang="en-GB" dirty="0" smtClean="0"/>
+              <a:rPr lang="en-GB" dirty="0"/>
               <a:t>Start with A, end with M.</a:t>
             </a:r>
           </a:p>
@@ -14070,15 +13682,15 @@
           </a:p>
           <a:p>
             <a:r>
-              <a:rPr lang="en-GB" dirty="0" smtClean="0"/>
+              <a:rPr lang="en-GB" dirty="0"/>
               <a:t>Using a loop, write every 4</a:t>
             </a:r>
             <a:r>
-              <a:rPr lang="en-GB" baseline="30000" dirty="0" smtClean="0"/>
+              <a:rPr lang="en-GB" baseline="30000" dirty="0"/>
               <a:t>th</a:t>
             </a:r>
             <a:r>
-              <a:rPr lang="en-GB" dirty="0" smtClean="0"/>
+              <a:rPr lang="en-GB" dirty="0"/>
               <a:t> letter of the first half of the alphabet.</a:t>
             </a:r>
           </a:p>
@@ -14087,7 +13699,7 @@
           </a:p>
           <a:p>
             <a:r>
-              <a:rPr lang="en-GB" dirty="0" smtClean="0"/>
+              <a:rPr lang="en-GB" dirty="0"/>
               <a:t>You should get the following result.</a:t>
             </a:r>
           </a:p>
@@ -14099,7 +13711,7 @@
               <a:buNone/>
             </a:pPr>
             <a:r>
-              <a:rPr lang="en-GB" dirty="0" smtClean="0">
+              <a:rPr lang="en-GB" dirty="0">
                 <a:latin typeface="Courier New" panose="02070309020205020404" pitchFamily="49" charset="0"/>
                 <a:cs typeface="Courier New" panose="02070309020205020404" pitchFamily="49" charset="0"/>
               </a:rPr>
@@ -14111,7 +13723,7 @@
               <a:buNone/>
             </a:pPr>
             <a:r>
-              <a:rPr lang="en-GB" dirty="0" smtClean="0">
+              <a:rPr lang="en-GB" dirty="0">
                 <a:latin typeface="Courier New" panose="02070309020205020404" pitchFamily="49" charset="0"/>
                 <a:cs typeface="Courier New" panose="02070309020205020404" pitchFamily="49" charset="0"/>
               </a:rPr>
@@ -14129,10 +13741,6 @@
               </a:rPr>
               <a:t>L</a:t>
             </a:r>
-            <a:endParaRPr lang="en-GB" dirty="0">
-              <a:latin typeface="Courier New" panose="02070309020205020404" pitchFamily="49" charset="0"/>
-              <a:cs typeface="Courier New" panose="02070309020205020404" pitchFamily="49" charset="0"/>
-            </a:endParaRPr>
           </a:p>
         </p:txBody>
       </p:sp>
@@ -14146,13 +13754,6 @@
   <p:clrMapOvr>
     <a:masterClrMapping/>
   </p:clrMapOvr>
-  <p:timing>
-    <p:tnLst>
-      <p:par>
-        <p:cTn id="1" dur="indefinite" restart="never" nodeType="tmRoot"/>
-      </p:par>
-    </p:tnLst>
-  </p:timing>
 </p:sld>
 </file>
 
@@ -14189,14 +13790,9 @@
           <a:lstStyle/>
           <a:p>
             <a:r>
-              <a:rPr lang="en-GB" dirty="0" smtClean="0"/>
-              <a:t>Homework </a:t>
-            </a:r>
-            <a:r>
-              <a:rPr lang="en-GB" dirty="0" smtClean="0"/>
-              <a:t>6</a:t>
-            </a:r>
-            <a:endParaRPr lang="en-GB" dirty="0"/>
+              <a:rPr lang="en-GB" dirty="0"/>
+              <a:t>Homework 6</a:t>
+            </a:r>
           </a:p>
         </p:txBody>
       </p:sp>
@@ -14223,100 +13819,100 @@
           <a:lstStyle/>
           <a:p>
             <a:r>
-              <a:rPr lang="en-GB" smtClean="0"/>
+              <a:rPr lang="en-GB"/>
               <a:t>Make a list with the values of the British coins in order from 1p to 200p.</a:t>
             </a:r>
           </a:p>
           <a:p>
             <a:r>
-              <a:rPr lang="en-GB" smtClean="0"/>
+              <a:rPr lang="en-GB"/>
               <a:t>If you have 15 of the 3</a:t>
             </a:r>
             <a:r>
-              <a:rPr lang="en-GB" baseline="30000" smtClean="0"/>
+              <a:rPr lang="en-GB" baseline="30000"/>
               <a:t>rd</a:t>
             </a:r>
             <a:r>
-              <a:rPr lang="en-GB" smtClean="0"/>
+              <a:rPr lang="en-GB"/>
               <a:t> least valuable coin, how many pennies do you have ?</a:t>
             </a:r>
           </a:p>
           <a:p>
             <a:r>
-              <a:rPr lang="en-GB" smtClean="0"/>
+              <a:rPr lang="en-GB"/>
               <a:t>If you have 34 of the 5</a:t>
             </a:r>
             <a:r>
-              <a:rPr lang="en-GB" baseline="30000" smtClean="0"/>
+              <a:rPr lang="en-GB" baseline="30000"/>
               <a:t>th</a:t>
             </a:r>
             <a:r>
-              <a:rPr lang="en-GB" smtClean="0"/>
+              <a:rPr lang="en-GB"/>
               <a:t> least valuable coin, how many pennies do you have ?</a:t>
             </a:r>
           </a:p>
           <a:p>
             <a:r>
-              <a:rPr lang="en-GB" smtClean="0"/>
+              <a:rPr lang="en-GB"/>
               <a:t>If you have 9 of the 4</a:t>
             </a:r>
             <a:r>
-              <a:rPr lang="en-GB" baseline="30000" smtClean="0"/>
+              <a:rPr lang="en-GB" baseline="30000"/>
               <a:t>th</a:t>
             </a:r>
             <a:r>
-              <a:rPr lang="en-GB" smtClean="0"/>
+              <a:rPr lang="en-GB"/>
               <a:t> least valuable coin, how many pennies do you have ?</a:t>
             </a:r>
           </a:p>
           <a:p>
-            <a:endParaRPr lang="en-GB" smtClean="0"/>
-          </a:p>
-          <a:p>
-            <a:r>
-              <a:rPr lang="en-GB" smtClean="0"/>
+            <a:endParaRPr lang="en-GB"/>
+          </a:p>
+          <a:p>
+            <a:r>
+              <a:rPr lang="en-GB"/>
               <a:t>Make a list with the values of the US coins, from 1cent to 100cents.</a:t>
             </a:r>
           </a:p>
           <a:p>
             <a:r>
-              <a:rPr lang="en-GB" smtClean="0"/>
+              <a:rPr lang="en-GB"/>
               <a:t>If you have 15 of the 3</a:t>
             </a:r>
             <a:r>
-              <a:rPr lang="en-GB" baseline="30000" smtClean="0"/>
+              <a:rPr lang="en-GB" baseline="30000"/>
               <a:t>rd</a:t>
             </a:r>
             <a:r>
-              <a:rPr lang="en-GB" smtClean="0"/>
+              <a:rPr lang="en-GB"/>
               <a:t> least valuable coin, how many cents do you have ?</a:t>
             </a:r>
           </a:p>
           <a:p>
             <a:r>
-              <a:rPr lang="en-GB" smtClean="0"/>
+              <a:rPr lang="en-GB"/>
               <a:t>If you have 34 of the 5</a:t>
             </a:r>
             <a:r>
-              <a:rPr lang="en-GB" baseline="30000" smtClean="0"/>
+              <a:rPr lang="en-GB" baseline="30000"/>
               <a:t>th</a:t>
             </a:r>
             <a:r>
-              <a:rPr lang="en-GB" smtClean="0"/>
+              <a:rPr lang="en-GB"/>
               <a:t> least valuable coin, how many cents do you have ?</a:t>
             </a:r>
           </a:p>
           <a:p>
             <a:r>
-              <a:rPr lang="en-GB" smtClean="0"/>
+              <a:rPr lang="en-GB"/>
               <a:t>If you have 9 of the 4</a:t>
             </a:r>
             <a:r>
-              <a:rPr lang="en-GB" baseline="30000" smtClean="0"/>
+              <a:rPr lang="en-GB" baseline="30000"/>
               <a:t>th</a:t>
             </a:r>
             <a:r>
-              <a:rPr lang="en-GB" smtClean="0"/>
+              <a:rPr lang="en-GB"/>
               <a:t> least valuable coin, how many cents do you have ?</a:t>
             </a:r>
           </a:p>
@@ -14324,7 +13920,7 @@
             <a:pPr marL="0" indent="0">
               <a:buNone/>
             </a:pPr>
-            <a:endParaRPr lang="en-GB" dirty="0" smtClean="0"/>
+            <a:endParaRPr lang="en-GB" dirty="0"/>
           </a:p>
         </p:txBody>
       </p:sp>
@@ -14338,13 +13934,6 @@
   <p:clrMapOvr>
     <a:masterClrMapping/>
   </p:clrMapOvr>
-  <p:timing>
-    <p:tnLst>
-      <p:par>
-        <p:cTn id="1" dur="indefinite" restart="never" nodeType="tmRoot"/>
-      </p:par>
-    </p:tnLst>
-  </p:timing>
 </p:sld>
 </file>
 
@@ -14381,14 +13970,9 @@
           <a:lstStyle/>
           <a:p>
             <a:r>
-              <a:rPr lang="en-GB" dirty="0" smtClean="0"/>
-              <a:t>Homework </a:t>
-            </a:r>
-            <a:r>
-              <a:rPr lang="en-GB" dirty="0" smtClean="0"/>
-              <a:t>7</a:t>
-            </a:r>
-            <a:endParaRPr lang="en-GB" dirty="0"/>
+              <a:rPr lang="en-GB" dirty="0"/>
+              <a:t>Homework 7</a:t>
+            </a:r>
           </a:p>
         </p:txBody>
       </p:sp>
@@ -14415,35 +13999,35 @@
           <a:lstStyle/>
           <a:p>
             <a:r>
-              <a:rPr lang="en-GB" dirty="0" smtClean="0"/>
+              <a:rPr lang="en-GB" dirty="0"/>
               <a:t>Store "</a:t>
             </a:r>
             <a:r>
-              <a:rPr lang="en-GB" dirty="0" smtClean="0">
+              <a:rPr lang="en-GB" dirty="0">
                 <a:latin typeface="Courier New" panose="02070309020205020404" pitchFamily="49" charset="0"/>
                 <a:cs typeface="Courier New" panose="02070309020205020404" pitchFamily="49" charset="0"/>
               </a:rPr>
               <a:t>King</a:t>
             </a:r>
             <a:r>
-              <a:rPr lang="en-GB" dirty="0" smtClean="0"/>
+              <a:rPr lang="en-GB" dirty="0"/>
               <a:t>" in a variable.</a:t>
             </a:r>
           </a:p>
           <a:p>
             <a:r>
-              <a:rPr lang="en-GB" dirty="0" smtClean="0"/>
+              <a:rPr lang="en-GB" dirty="0"/>
               <a:t>Store "</a:t>
             </a:r>
             <a:r>
-              <a:rPr lang="en-GB" dirty="0" smtClean="0">
+              <a:rPr lang="en-GB" dirty="0">
                 <a:latin typeface="Courier New" panose="02070309020205020404" pitchFamily="49" charset="0"/>
                 <a:cs typeface="Courier New" panose="02070309020205020404" pitchFamily="49" charset="0"/>
               </a:rPr>
               <a:t>king</a:t>
             </a:r>
             <a:r>
-              <a:rPr lang="en-GB" dirty="0" smtClean="0"/>
+              <a:rPr lang="en-GB" dirty="0"/>
               <a:t>" in another variable.</a:t>
             </a:r>
           </a:p>
@@ -14452,35 +14036,35 @@
           </a:p>
           <a:p>
             <a:r>
-              <a:rPr lang="en-GB" dirty="0" smtClean="0"/>
+              <a:rPr lang="en-GB" dirty="0"/>
               <a:t>Print "</a:t>
             </a:r>
             <a:r>
-              <a:rPr lang="en-GB" dirty="0" smtClean="0">
+              <a:rPr lang="en-GB" dirty="0">
                 <a:latin typeface="Courier New" panose="02070309020205020404" pitchFamily="49" charset="0"/>
                 <a:cs typeface="Courier New" panose="02070309020205020404" pitchFamily="49" charset="0"/>
               </a:rPr>
               <a:t>These are the same</a:t>
             </a:r>
             <a:r>
-              <a:rPr lang="en-GB" dirty="0" smtClean="0"/>
+              <a:rPr lang="en-GB" dirty="0"/>
               <a:t>" if Python things these things are equal.</a:t>
             </a:r>
           </a:p>
           <a:p>
             <a:r>
-              <a:rPr lang="en-GB" dirty="0" smtClean="0"/>
+              <a:rPr lang="en-GB" dirty="0"/>
               <a:t>Otherwise print "</a:t>
             </a:r>
             <a:r>
-              <a:rPr lang="en-GB" dirty="0" smtClean="0">
+              <a:rPr lang="en-GB" dirty="0">
                 <a:latin typeface="Courier New" panose="02070309020205020404" pitchFamily="49" charset="0"/>
                 <a:cs typeface="Courier New" panose="02070309020205020404" pitchFamily="49" charset="0"/>
               </a:rPr>
               <a:t>These are different</a:t>
             </a:r>
             <a:r>
-              <a:rPr lang="en-GB" dirty="0" smtClean="0"/>
+              <a:rPr lang="en-GB" dirty="0"/>
               <a:t>".</a:t>
             </a:r>
           </a:p>
@@ -14489,7 +14073,7 @@
           </a:p>
           <a:p>
             <a:r>
-              <a:rPr lang="en-GB" dirty="0" smtClean="0">
+              <a:rPr lang="en-GB" dirty="0">
                 <a:solidFill>
                   <a:srgbClr val="FFFF00"/>
                 </a:solidFill>
@@ -14499,7 +14083,7 @@
           </a:p>
           <a:p>
             <a:r>
-              <a:rPr lang="en-GB" dirty="0" smtClean="0">
+              <a:rPr lang="en-GB" dirty="0">
                 <a:solidFill>
                   <a:srgbClr val="FFFF00"/>
                 </a:solidFill>
@@ -14511,7 +14095,7 @@
             <a:pPr marL="0" indent="0">
               <a:buNone/>
             </a:pPr>
-            <a:endParaRPr lang="en-GB" dirty="0" smtClean="0"/>
+            <a:endParaRPr lang="en-GB" dirty="0"/>
           </a:p>
         </p:txBody>
       </p:sp>
@@ -14525,13 +14109,6 @@
   <p:clrMapOvr>
     <a:masterClrMapping/>
   </p:clrMapOvr>
-  <p:timing>
-    <p:tnLst>
-      <p:par>
-        <p:cTn id="1" dur="indefinite" restart="never" nodeType="tmRoot"/>
-      </p:par>
-    </p:tnLst>
-  </p:timing>
 </p:sld>
 </file>
 
@@ -14568,14 +14145,9 @@
           <a:lstStyle/>
           <a:p>
             <a:r>
-              <a:rPr lang="en-GB" dirty="0" smtClean="0"/>
-              <a:t>Homework </a:t>
-            </a:r>
-            <a:r>
-              <a:rPr lang="en-GB" dirty="0" smtClean="0"/>
-              <a:t>8</a:t>
-            </a:r>
-            <a:endParaRPr lang="en-GB" dirty="0"/>
+              <a:rPr lang="en-GB" dirty="0"/>
+              <a:t>Homework 8</a:t>
+            </a:r>
           </a:p>
         </p:txBody>
       </p:sp>
@@ -14602,61 +14174,46 @@
           <a:lstStyle/>
           <a:p>
             <a:r>
-              <a:rPr lang="en-GB" dirty="0" smtClean="0"/>
+              <a:rPr lang="en-GB" dirty="0"/>
               <a:t>These are the names of the 6 nearest star systems to Earth.</a:t>
             </a:r>
           </a:p>
           <a:p>
             <a:r>
-              <a:rPr lang="en-GB" sz="1600" dirty="0" smtClean="0">
+              <a:rPr lang="en-GB" sz="1600" dirty="0">
                 <a:latin typeface="Courier New" panose="02070309020205020404" pitchFamily="49" charset="0"/>
                 <a:cs typeface="Courier New" panose="02070309020205020404" pitchFamily="49" charset="0"/>
               </a:rPr>
               <a:t>["Centauri", "Barnard's Star", "</a:t>
             </a:r>
             <a:r>
-              <a:rPr lang="en-GB" sz="1600" dirty="0" err="1" smtClean="0">
+              <a:rPr lang="en-GB" sz="1600" dirty="0" err="1">
                 <a:latin typeface="Courier New" panose="02070309020205020404" pitchFamily="49" charset="0"/>
                 <a:cs typeface="Courier New" panose="02070309020205020404" pitchFamily="49" charset="0"/>
               </a:rPr>
               <a:t>Luhman</a:t>
             </a:r>
             <a:r>
-              <a:rPr lang="en-GB" sz="1600" dirty="0" smtClean="0">
+              <a:rPr lang="en-GB" sz="1600" dirty="0">
                 <a:latin typeface="Courier New" panose="02070309020205020404" pitchFamily="49" charset="0"/>
                 <a:cs typeface="Courier New" panose="02070309020205020404" pitchFamily="49" charset="0"/>
               </a:rPr>
               <a:t>", "Wise", "Wolf 359", "</a:t>
             </a:r>
             <a:r>
-              <a:rPr lang="en-GB" sz="1600" dirty="0" err="1" smtClean="0">
+              <a:rPr lang="en-GB" sz="1600" dirty="0" err="1">
                 <a:latin typeface="Courier New" panose="02070309020205020404" pitchFamily="49" charset="0"/>
                 <a:cs typeface="Courier New" panose="02070309020205020404" pitchFamily="49" charset="0"/>
               </a:rPr>
               <a:t>Lalande</a:t>
             </a:r>
             <a:r>
-              <a:rPr lang="en-GB" sz="1600" dirty="0" smtClean="0">
+              <a:rPr lang="en-GB" sz="1600" dirty="0">
                 <a:latin typeface="Courier New" panose="02070309020205020404" pitchFamily="49" charset="0"/>
                 <a:cs typeface="Courier New" panose="02070309020205020404" pitchFamily="49" charset="0"/>
               </a:rPr>
               <a:t> 21185"]</a:t>
             </a:r>
-          </a:p>
-          <a:p>
-            <a:endParaRPr lang="en-GB" sz="1600" dirty="0" smtClean="0">
-              <a:latin typeface="Courier New" panose="02070309020205020404" pitchFamily="49" charset="0"/>
-              <a:cs typeface="Courier New" panose="02070309020205020404" pitchFamily="49" charset="0"/>
-            </a:endParaRPr>
-          </a:p>
-          <a:p>
-            <a:r>
-              <a:rPr lang="en-GB" dirty="0" smtClean="0"/>
-              <a:t>Using a loop, write these out in reverse order.</a:t>
-            </a:r>
-          </a:p>
-          <a:p>
-            <a:endParaRPr lang="en-GB" dirty="0"/>
           </a:p>
           <a:p>
             <a:endParaRPr lang="en-GB" sz="1600" dirty="0">
@@ -14665,16 +14222,31 @@
             </a:endParaRPr>
           </a:p>
           <a:p>
+            <a:r>
+              <a:rPr lang="en-GB" dirty="0"/>
+              <a:t>Using a loop, write these out in reverse order.</a:t>
+            </a:r>
+          </a:p>
+          <a:p>
+            <a:endParaRPr lang="en-GB" dirty="0"/>
+          </a:p>
+          <a:p>
             <a:endParaRPr lang="en-GB" sz="1600" dirty="0">
               <a:latin typeface="Courier New" panose="02070309020205020404" pitchFamily="49" charset="0"/>
               <a:cs typeface="Courier New" panose="02070309020205020404" pitchFamily="49" charset="0"/>
             </a:endParaRPr>
           </a:p>
           <a:p>
+            <a:endParaRPr lang="en-GB" sz="1600" dirty="0">
+              <a:latin typeface="Courier New" panose="02070309020205020404" pitchFamily="49" charset="0"/>
+              <a:cs typeface="Courier New" panose="02070309020205020404" pitchFamily="49" charset="0"/>
+            </a:endParaRPr>
+          </a:p>
+          <a:p>
             <a:pPr marL="0" indent="0">
               <a:buNone/>
             </a:pPr>
-            <a:endParaRPr lang="en-GB" dirty="0" smtClean="0"/>
+            <a:endParaRPr lang="en-GB" dirty="0"/>
           </a:p>
         </p:txBody>
       </p:sp>
@@ -14688,13 +14260,6 @@
   <p:clrMapOvr>
     <a:masterClrMapping/>
   </p:clrMapOvr>
-  <p:timing>
-    <p:tnLst>
-      <p:par>
-        <p:cTn id="1" dur="indefinite" restart="never" nodeType="tmRoot"/>
-      </p:par>
-    </p:tnLst>
-  </p:timing>
 </p:sld>
 </file>
 
@@ -14731,19 +14296,14 @@
           <a:lstStyle/>
           <a:p>
             <a:r>
-              <a:rPr lang="en-GB" dirty="0" smtClean="0"/>
-              <a:t>Homework </a:t>
-            </a:r>
-            <a:r>
-              <a:rPr lang="en-GB" dirty="0" smtClean="0"/>
-              <a:t>9</a:t>
-            </a:r>
-            <a:endParaRPr lang="en-GB" dirty="0"/>
-          </a:p>
-        </p:txBody>
-      </p:sp>
-      <mc:AlternateContent xmlns:mc="http://schemas.openxmlformats.org/markup-compatibility/2006">
-        <mc:Choice xmlns:a14="http://schemas.microsoft.com/office/drawing/2010/main" Requires="a14">
+              <a:rPr lang="en-GB" dirty="0"/>
+              <a:t>Homework 9</a:t>
+            </a:r>
+          </a:p>
+        </p:txBody>
+      </p:sp>
+      <mc:AlternateContent xmlns:mc="http://schemas.openxmlformats.org/markup-compatibility/2006" xmlns:a14="http://schemas.microsoft.com/office/drawing/2010/main">
+        <mc:Choice Requires="a14">
           <p:sp>
             <p:nvSpPr>
               <p:cNvPr id="3" name="Content Placeholder 2"/>
@@ -14767,12 +14327,12 @@
               <a:lstStyle/>
               <a:p>
                 <a:r>
-                  <a:rPr lang="en-GB" dirty="0" smtClean="0"/>
+                  <a:rPr lang="en-GB" dirty="0"/>
                   <a:t>Write a program which adds multiplies the numbers from 1 to 50 together.</a:t>
                 </a:r>
               </a:p>
               <a:p>
-                <a:endParaRPr lang="en-GB" dirty="0" smtClean="0"/>
+                <a:endParaRPr lang="en-GB" dirty="0"/>
               </a:p>
               <a:p>
                 <a:pPr marL="0" indent="0">
@@ -14868,7 +14428,7 @@
                 <a:endParaRPr lang="en-GB" dirty="0"/>
               </a:p>
               <a:p>
-                <a:endParaRPr lang="en-GB" sz="1600" dirty="0" smtClean="0">
+                <a:endParaRPr lang="en-GB" sz="1600" dirty="0">
                   <a:latin typeface="Courier New" panose="02070309020205020404" pitchFamily="49" charset="0"/>
                   <a:cs typeface="Courier New" panose="02070309020205020404" pitchFamily="49" charset="0"/>
                 </a:endParaRPr>
@@ -14876,15 +14436,7 @@
               <a:p>
                 <a:r>
                   <a:rPr lang="en-GB" dirty="0"/>
-                  <a:t>Expect to get a </a:t>
-                </a:r>
-                <a:r>
-                  <a:rPr lang="en-GB" dirty="0" smtClean="0"/>
-                  <a:t>very, </a:t>
-                </a:r>
-                <a:r>
-                  <a:rPr lang="en-GB" dirty="0"/>
-                  <a:t>very large number !</a:t>
+                  <a:t>Expect to get a very, very large number !</a:t>
                 </a:r>
               </a:p>
               <a:p>
@@ -14903,12 +14455,12 @@
                 <a:pPr marL="0" indent="0">
                   <a:buNone/>
                 </a:pPr>
-                <a:endParaRPr lang="en-GB" dirty="0" smtClean="0"/>
+                <a:endParaRPr lang="en-GB" dirty="0"/>
               </a:p>
             </p:txBody>
           </p:sp>
         </mc:Choice>
-        <mc:Fallback>
+        <mc:Fallback xmlns="">
           <p:sp>
             <p:nvSpPr>
               <p:cNvPr id="3" name="Content Placeholder 2"/>
@@ -14956,13 +14508,6 @@
   <p:clrMapOvr>
     <a:masterClrMapping/>
   </p:clrMapOvr>
-  <p:timing>
-    <p:tnLst>
-      <p:par>
-        <p:cTn id="1" dur="indefinite" restart="never" nodeType="tmRoot"/>
-      </p:par>
-    </p:tnLst>
-  </p:timing>
 </p:sld>
 </file>
 
@@ -14999,19 +14544,14 @@
           <a:lstStyle/>
           <a:p>
             <a:r>
-              <a:rPr lang="en-GB" dirty="0" smtClean="0"/>
-              <a:t>Homework </a:t>
-            </a:r>
-            <a:r>
-              <a:rPr lang="en-GB" dirty="0" smtClean="0"/>
-              <a:t>10</a:t>
-            </a:r>
-            <a:endParaRPr lang="en-GB" dirty="0"/>
-          </a:p>
-        </p:txBody>
-      </p:sp>
-      <mc:AlternateContent xmlns:mc="http://schemas.openxmlformats.org/markup-compatibility/2006">
-        <mc:Choice xmlns:a14="http://schemas.microsoft.com/office/drawing/2010/main" Requires="a14">
+              <a:rPr lang="en-GB" dirty="0"/>
+              <a:t>Homework 10</a:t>
+            </a:r>
+          </a:p>
+        </p:txBody>
+      </p:sp>
+      <mc:AlternateContent xmlns:mc="http://schemas.openxmlformats.org/markup-compatibility/2006" xmlns:a14="http://schemas.microsoft.com/office/drawing/2010/main">
+        <mc:Choice Requires="a14">
           <p:sp>
             <p:nvSpPr>
               <p:cNvPr id="3" name="Content Placeholder 2"/>
@@ -15035,7 +14575,7 @@
               <a:lstStyle/>
               <a:p>
                 <a:r>
-                  <a:rPr lang="en-GB" dirty="0" smtClean="0"/>
+                  <a:rPr lang="en-GB" dirty="0"/>
                   <a:t>Write a program using a loop which adds these 10 numbers together.</a:t>
                 </a:r>
               </a:p>
@@ -15383,14 +14923,14 @@
               </a:p>
               <a:p>
                 <a:r>
-                  <a:rPr lang="en-GB" dirty="0" smtClean="0"/>
+                  <a:rPr lang="en-GB" dirty="0"/>
                   <a:t>Extend your program to add the first 10,000,000 numbers in this sequence together.</a:t>
                 </a:r>
               </a:p>
             </p:txBody>
           </p:sp>
         </mc:Choice>
-        <mc:Fallback>
+        <mc:Fallback xmlns="">
           <p:sp>
             <p:nvSpPr>
               <p:cNvPr id="3" name="Content Placeholder 2"/>
@@ -15438,13 +14978,6 @@
   <p:clrMapOvr>
     <a:masterClrMapping/>
   </p:clrMapOvr>
-  <p:timing>
-    <p:tnLst>
-      <p:par>
-        <p:cTn id="1" dur="indefinite" restart="never" nodeType="tmRoot"/>
-      </p:par>
-    </p:tnLst>
-  </p:timing>
 </p:sld>
 </file>
 
@@ -15481,10 +15014,9 @@
           <a:lstStyle/>
           <a:p>
             <a:r>
-              <a:rPr lang="en-GB" dirty="0" smtClean="0"/>
+              <a:rPr lang="en-GB" dirty="0"/>
               <a:t>Next Week.</a:t>
             </a:r>
-            <a:endParaRPr lang="en-GB" dirty="0"/>
           </a:p>
         </p:txBody>
       </p:sp>
@@ -15504,16 +15036,16 @@
           <a:lstStyle/>
           <a:p>
             <a:r>
-              <a:rPr lang="en-GB" dirty="0" smtClean="0"/>
+              <a:rPr lang="en-GB" dirty="0"/>
               <a:t>We will learn much more about lists.</a:t>
             </a:r>
           </a:p>
           <a:p>
-            <a:endParaRPr lang="en-GB" dirty="0" smtClean="0"/>
-          </a:p>
-          <a:p>
-            <a:r>
-              <a:rPr lang="en-GB" dirty="0" smtClean="0"/>
+            <a:endParaRPr lang="en-GB" dirty="0"/>
+          </a:p>
+          <a:p>
+            <a:r>
+              <a:rPr lang="en-GB" dirty="0"/>
               <a:t>We will learn better methods to write some of the programs we wrote this week.</a:t>
             </a:r>
           </a:p>
@@ -15522,18 +15054,18 @@
           </a:p>
           <a:p>
             <a:r>
-              <a:rPr lang="en-GB" dirty="0" smtClean="0"/>
+              <a:rPr lang="en-GB" dirty="0"/>
               <a:t>We will learn more about testing things with </a:t>
             </a:r>
             <a:r>
-              <a:rPr lang="en-GB" dirty="0" smtClean="0">
+              <a:rPr lang="en-GB" dirty="0">
                 <a:latin typeface="Courier New" panose="02070309020205020404" pitchFamily="49" charset="0"/>
                 <a:cs typeface="Courier New" panose="02070309020205020404" pitchFamily="49" charset="0"/>
               </a:rPr>
               <a:t>if</a:t>
             </a:r>
             <a:r>
-              <a:rPr lang="en-GB" dirty="0" smtClean="0"/>
+              <a:rPr lang="en-GB" dirty="0"/>
               <a:t>.</a:t>
             </a:r>
           </a:p>
@@ -15542,7 +15074,7 @@
           </a:p>
           <a:p>
             <a:r>
-              <a:rPr lang="en-GB" dirty="0" smtClean="0"/>
+              <a:rPr lang="en-GB" dirty="0"/>
               <a:t>We will learn how strings work a little bit like lists.</a:t>
             </a:r>
           </a:p>
@@ -15594,10 +15126,9 @@
           <a:lstStyle/>
           <a:p>
             <a:r>
-              <a:rPr lang="en-GB" dirty="0" smtClean="0"/>
+              <a:rPr lang="en-GB" dirty="0"/>
               <a:t>Mixing Strings and Numbers.</a:t>
             </a:r>
-            <a:endParaRPr lang="en-GB" dirty="0"/>
           </a:p>
         </p:txBody>
       </p:sp>
@@ -15624,24 +15155,24 @@
           <a:lstStyle/>
           <a:p>
             <a:r>
-              <a:rPr lang="en-GB" dirty="0" smtClean="0"/>
+              <a:rPr lang="en-GB" dirty="0"/>
               <a:t>The program on the right won't work.</a:t>
             </a:r>
           </a:p>
           <a:p>
             <a:r>
-              <a:rPr lang="en-GB" dirty="0" smtClean="0"/>
+              <a:rPr lang="en-GB" dirty="0"/>
               <a:t>The reason is, </a:t>
             </a:r>
             <a:r>
-              <a:rPr lang="en-GB" dirty="0" smtClean="0">
+              <a:rPr lang="en-GB" dirty="0">
                 <a:latin typeface="Courier New" panose="02070309020205020404" pitchFamily="49" charset="0"/>
                 <a:cs typeface="Courier New" panose="02070309020205020404" pitchFamily="49" charset="0"/>
               </a:rPr>
               <a:t>input()</a:t>
             </a:r>
             <a:r>
-              <a:rPr lang="en-GB" dirty="0" smtClean="0"/>
+              <a:rPr lang="en-GB" dirty="0"/>
               <a:t> produces strings, and you can't add strings and integers together.</a:t>
             </a:r>
           </a:p>
@@ -15663,15 +15194,17 @@
                   <a:srgbClr val="FFFF00"/>
                 </a:solidFill>
               </a:rPr>
-              <a:t> Type it </a:t>
-            </a:r>
-            <a:r>
-              <a:rPr lang="en-GB" dirty="0" smtClean="0">
+              <a:t> Type it in and run it.</a:t>
+            </a:r>
+          </a:p>
+          <a:p>
+            <a:r>
+              <a:rPr lang="en-GB" b="1" u="sng" dirty="0">
                 <a:solidFill>
                   <a:srgbClr val="FFFF00"/>
                 </a:solidFill>
               </a:rPr>
-              <a:t>in and </a:t>
+              <a:t>TASK:</a:t>
             </a:r>
             <a:r>
               <a:rPr lang="en-GB" dirty="0">
@@ -15679,49 +15212,15 @@
                   <a:srgbClr val="FFFF00"/>
                 </a:solidFill>
               </a:rPr>
-              <a:t>run </a:t>
-            </a:r>
-            <a:r>
-              <a:rPr lang="en-GB" dirty="0" smtClean="0">
-                <a:solidFill>
-                  <a:srgbClr val="FFFF00"/>
-                </a:solidFill>
-              </a:rPr>
-              <a:t>it.</a:t>
-            </a:r>
-          </a:p>
-          <a:p>
-            <a:r>
-              <a:rPr lang="en-GB" b="1" u="sng" dirty="0" smtClean="0">
-                <a:solidFill>
-                  <a:srgbClr val="FFFF00"/>
-                </a:solidFill>
-              </a:rPr>
-              <a:t>TASK:</a:t>
-            </a:r>
-            <a:r>
-              <a:rPr lang="en-GB" dirty="0">
-                <a:solidFill>
-                  <a:srgbClr val="FFFF00"/>
-                </a:solidFill>
-              </a:rPr>
-              <a:t> </a:t>
-            </a:r>
-            <a:r>
-              <a:rPr lang="en-GB" dirty="0" smtClean="0">
-                <a:solidFill>
-                  <a:srgbClr val="FFFF00"/>
-                </a:solidFill>
-              </a:rPr>
-              <a:t>Try and understand the error message you get.</a:t>
-            </a:r>
-            <a:endParaRPr lang="en-GB" dirty="0" smtClean="0"/>
-          </a:p>
-          <a:p>
+              <a:t> Try and understand the error message you get.</a:t>
+            </a:r>
             <a:endParaRPr lang="en-GB" dirty="0"/>
           </a:p>
           <a:p>
-            <a:endParaRPr lang="en-GB" dirty="0" smtClean="0"/>
+            <a:endParaRPr lang="en-GB" dirty="0"/>
+          </a:p>
+          <a:p>
+            <a:endParaRPr lang="en-GB" dirty="0"/>
           </a:p>
         </p:txBody>
       </p:sp>
@@ -15819,13 +15318,6 @@
   <p:clrMapOvr>
     <a:masterClrMapping/>
   </p:clrMapOvr>
-  <p:timing>
-    <p:tnLst>
-      <p:par>
-        <p:cTn id="1" dur="indefinite" restart="never" nodeType="tmRoot"/>
-      </p:par>
-    </p:tnLst>
-  </p:timing>
 </p:sld>
 </file>
 
@@ -15862,10 +15354,9 @@
           <a:lstStyle/>
           <a:p>
             <a:r>
-              <a:rPr lang="en-GB" dirty="0" smtClean="0"/>
+              <a:rPr lang="en-GB" dirty="0"/>
               <a:t>Understanding the Error.</a:t>
             </a:r>
-            <a:endParaRPr lang="en-GB" dirty="0"/>
           </a:p>
         </p:txBody>
       </p:sp>
@@ -15941,33 +15432,33 @@
             </a:r>
           </a:p>
           <a:p>
-            <a:endParaRPr lang="en-GB" dirty="0" smtClean="0"/>
-          </a:p>
-          <a:p>
-            <a:r>
-              <a:rPr lang="en-GB" dirty="0" smtClean="0"/>
+            <a:endParaRPr lang="en-GB" dirty="0"/>
+          </a:p>
+          <a:p>
+            <a:r>
+              <a:rPr lang="en-GB" dirty="0"/>
               <a:t>The + sign is the </a:t>
             </a:r>
             <a:r>
-              <a:rPr lang="en-GB" b="1" u="sng" dirty="0" smtClean="0"/>
+              <a:rPr lang="en-GB" b="1" u="sng" dirty="0"/>
               <a:t>operator</a:t>
             </a:r>
             <a:r>
-              <a:rPr lang="en-GB" dirty="0" smtClean="0"/>
+              <a:rPr lang="en-GB" dirty="0"/>
               <a:t>, in this case the addition operator.</a:t>
             </a:r>
           </a:p>
           <a:p>
             <a:r>
-              <a:rPr lang="en-GB" dirty="0" smtClean="0"/>
+              <a:rPr lang="en-GB" dirty="0"/>
               <a:t>The two </a:t>
             </a:r>
             <a:r>
-              <a:rPr lang="en-GB" b="1" u="sng" dirty="0" smtClean="0"/>
+              <a:rPr lang="en-GB" b="1" u="sng" dirty="0"/>
               <a:t>operands</a:t>
             </a:r>
             <a:r>
-              <a:rPr lang="en-GB" dirty="0" smtClean="0"/>
+              <a:rPr lang="en-GB" dirty="0"/>
               <a:t> are the two things being added together.</a:t>
             </a:r>
           </a:p>
@@ -15976,23 +15467,23 @@
           </a:p>
           <a:p>
             <a:r>
-              <a:rPr lang="en-GB" dirty="0" smtClean="0"/>
+              <a:rPr lang="en-GB" dirty="0"/>
               <a:t>This error message is telling you that you cannot add integers (</a:t>
             </a:r>
             <a:r>
-              <a:rPr lang="en-GB" b="1" u="sng" dirty="0" err="1" smtClean="0"/>
+              <a:rPr lang="en-GB" b="1" u="sng" dirty="0" err="1"/>
               <a:t>int</a:t>
             </a:r>
             <a:r>
-              <a:rPr lang="en-GB" dirty="0" smtClean="0"/>
+              <a:rPr lang="en-GB" dirty="0"/>
               <a:t>) and strings (</a:t>
             </a:r>
             <a:r>
-              <a:rPr lang="en-GB" b="1" u="sng" dirty="0" err="1" smtClean="0"/>
+              <a:rPr lang="en-GB" b="1" u="sng" dirty="0" err="1"/>
               <a:t>str</a:t>
             </a:r>
             <a:r>
-              <a:rPr lang="en-GB" dirty="0" smtClean="0"/>
+              <a:rPr lang="en-GB" dirty="0"/>
               <a:t>).</a:t>
             </a:r>
           </a:p>
@@ -16011,13 +15502,6 @@
   <p:clrMapOvr>
     <a:masterClrMapping/>
   </p:clrMapOvr>
-  <p:timing>
-    <p:tnLst>
-      <p:par>
-        <p:cTn id="1" dur="indefinite" restart="never" nodeType="tmRoot"/>
-      </p:par>
-    </p:tnLst>
-  </p:timing>
 </p:sld>
 </file>
 
@@ -16054,10 +15538,9 @@
           <a:lstStyle/>
           <a:p>
             <a:r>
-              <a:rPr lang="en-GB" dirty="0" smtClean="0"/>
+              <a:rPr lang="en-GB" dirty="0"/>
               <a:t>Seeing the problem in action.</a:t>
             </a:r>
-            <a:endParaRPr lang="en-GB" dirty="0"/>
           </a:p>
         </p:txBody>
       </p:sp>
@@ -16084,21 +15567,21 @@
           <a:lstStyle/>
           <a:p>
             <a:r>
-              <a:rPr lang="en-GB" dirty="0" smtClean="0"/>
+              <a:rPr lang="en-GB" dirty="0"/>
               <a:t>Python lets you fix this.</a:t>
             </a:r>
           </a:p>
           <a:p>
             <a:r>
-              <a:rPr lang="en-GB" dirty="0" smtClean="0"/>
+              <a:rPr lang="en-GB" dirty="0"/>
               <a:t>To do this, you can </a:t>
             </a:r>
             <a:r>
-              <a:rPr lang="en-GB" b="1" u="sng" dirty="0" smtClean="0"/>
+              <a:rPr lang="en-GB" b="1" u="sng" dirty="0"/>
               <a:t>cast</a:t>
             </a:r>
             <a:r>
-              <a:rPr lang="en-GB" dirty="0" smtClean="0"/>
+              <a:rPr lang="en-GB" dirty="0"/>
               <a:t> a variable of one type to another.</a:t>
             </a:r>
           </a:p>
@@ -16107,7 +15590,7 @@
           </a:p>
           <a:p>
             <a:r>
-              <a:rPr lang="en-GB" dirty="0" smtClean="0"/>
+              <a:rPr lang="en-GB" dirty="0"/>
               <a:t>Before we do this, lets see ways to confirm things are the type we expect them to be.</a:t>
             </a:r>
           </a:p>
@@ -16129,37 +15612,24 @@
                   <a:srgbClr val="FFFF00"/>
                 </a:solidFill>
               </a:rPr>
-              <a:t> Type </a:t>
-            </a:r>
-            <a:r>
-              <a:rPr lang="en-GB" dirty="0" smtClean="0">
+              <a:t> Type the program in and run it.</a:t>
+            </a:r>
+          </a:p>
+          <a:p>
+            <a:pPr lvl="1"/>
+            <a:r>
+              <a:rPr lang="en-GB" dirty="0">
                 <a:solidFill>
                   <a:srgbClr val="FFFF00"/>
                 </a:solidFill>
               </a:rPr>
-              <a:t>the program in and run it.</a:t>
-            </a:r>
-            <a:endParaRPr lang="en-GB" dirty="0">
-              <a:solidFill>
-                <a:srgbClr val="FFFF00"/>
-              </a:solidFill>
-            </a:endParaRPr>
+              <a:t>Type in a string the first time, and type in a number the second time.</a:t>
+            </a:r>
           </a:p>
           <a:p>
             <a:pPr lvl="1"/>
             <a:r>
-              <a:rPr lang="en-GB" dirty="0" smtClean="0">
-                <a:solidFill>
-                  <a:srgbClr val="FFFF00"/>
-                </a:solidFill>
-              </a:rPr>
-              <a:t>Type in a string the first time, and type in a number the second time.</a:t>
-            </a:r>
-          </a:p>
-          <a:p>
-            <a:pPr lvl="1"/>
-            <a:r>
-              <a:rPr lang="en-GB" dirty="0" smtClean="0">
+              <a:rPr lang="en-GB" dirty="0">
                 <a:solidFill>
                   <a:srgbClr val="FFFF00"/>
                 </a:solidFill>
@@ -16280,13 +15750,6 @@
   <p:clrMapOvr>
     <a:masterClrMapping/>
   </p:clrMapOvr>
-  <p:timing>
-    <p:tnLst>
-      <p:par>
-        <p:cTn id="1" dur="indefinite" restart="never" nodeType="tmRoot"/>
-      </p:par>
-    </p:tnLst>
-  </p:timing>
 </p:sld>
 </file>
 
@@ -16323,10 +15786,9 @@
           <a:lstStyle/>
           <a:p>
             <a:r>
-              <a:rPr lang="en-GB" dirty="0" smtClean="0"/>
+              <a:rPr lang="en-GB" dirty="0"/>
               <a:t>Casting Variables (to integers).</a:t>
             </a:r>
-            <a:endParaRPr lang="en-GB" dirty="0"/>
           </a:p>
         </p:txBody>
       </p:sp>
@@ -16353,21 +15815,21 @@
           <a:lstStyle/>
           <a:p>
             <a:r>
-              <a:rPr lang="en-GB" dirty="0" smtClean="0"/>
+              <a:rPr lang="en-GB" dirty="0"/>
               <a:t>The </a:t>
             </a:r>
             <a:r>
-              <a:rPr lang="en-GB" dirty="0" err="1" smtClean="0"/>
+              <a:rPr lang="en-GB" dirty="0" err="1"/>
               <a:t>int</a:t>
             </a:r>
             <a:r>
-              <a:rPr lang="en-GB" dirty="0" smtClean="0"/>
+              <a:rPr lang="en-GB" dirty="0"/>
               <a:t>() function can be given a variable of another type, like a string, and it will attempt to convert it into an integer.</a:t>
             </a:r>
           </a:p>
           <a:p>
             <a:r>
-              <a:rPr lang="en-GB" dirty="0" smtClean="0"/>
+              <a:rPr lang="en-GB" dirty="0"/>
               <a:t>Note: It can't always do that. You can't convert "A" to an integer !.</a:t>
             </a:r>
           </a:p>
@@ -16501,15 +15963,7 @@
                   <a:srgbClr val="FFFF00"/>
                 </a:solidFill>
               </a:rPr>
-              <a:t> Type the program in and run </a:t>
-            </a:r>
-            <a:r>
-              <a:rPr lang="en-GB" dirty="0" smtClean="0">
-                <a:solidFill>
-                  <a:srgbClr val="FFFF00"/>
-                </a:solidFill>
-              </a:rPr>
-              <a:t>it.</a:t>
+              <a:t> Type the program in and run it.</a:t>
             </a:r>
           </a:p>
           <a:p>
@@ -16518,7 +15972,7 @@
               <a:buChar char="•"/>
             </a:pPr>
             <a:r>
-              <a:rPr lang="en-GB" dirty="0" smtClean="0">
+              <a:rPr lang="en-GB" dirty="0">
                 <a:solidFill>
                   <a:srgbClr val="FFFF00"/>
                 </a:solidFill>
@@ -16532,7 +15986,7 @@
               <a:buChar char="•"/>
             </a:pPr>
             <a:r>
-              <a:rPr lang="en-GB" dirty="0" smtClean="0">
+              <a:rPr lang="en-GB" dirty="0">
                 <a:solidFill>
                   <a:srgbClr val="FFFF00"/>
                 </a:solidFill>
@@ -16552,13 +16006,6 @@
   <p:clrMapOvr>
     <a:masterClrMapping/>
   </p:clrMapOvr>
-  <p:timing>
-    <p:tnLst>
-      <p:par>
-        <p:cTn id="1" dur="indefinite" restart="never" nodeType="tmRoot"/>
-      </p:par>
-    </p:tnLst>
-  </p:timing>
 </p:sld>
 </file>
 
@@ -16595,10 +16042,9 @@
           <a:lstStyle/>
           <a:p>
             <a:r>
-              <a:rPr lang="en-GB" dirty="0" smtClean="0"/>
+              <a:rPr lang="en-GB" dirty="0"/>
               <a:t>Casting Variables (to strings).</a:t>
             </a:r>
-            <a:endParaRPr lang="en-GB" dirty="0"/>
           </a:p>
         </p:txBody>
       </p:sp>
@@ -16625,27 +16071,27 @@
           <a:lstStyle/>
           <a:p>
             <a:r>
-              <a:rPr lang="en-GB" dirty="0" smtClean="0"/>
+              <a:rPr lang="en-GB" dirty="0"/>
               <a:t>The </a:t>
             </a:r>
             <a:r>
-              <a:rPr lang="en-GB" dirty="0" err="1" smtClean="0"/>
+              <a:rPr lang="en-GB" dirty="0" err="1"/>
               <a:t>str</a:t>
             </a:r>
             <a:r>
-              <a:rPr lang="en-GB" dirty="0" smtClean="0"/>
+              <a:rPr lang="en-GB" dirty="0"/>
               <a:t>() function does the same thing, but the results are strings.</a:t>
             </a:r>
           </a:p>
           <a:p>
             <a:r>
-              <a:rPr lang="en-GB" dirty="0" smtClean="0"/>
+              <a:rPr lang="en-GB" dirty="0"/>
               <a:t>There are no integers that can't be made into strings, but later you will learn about other types that can't always be cast to strings.</a:t>
             </a:r>
           </a:p>
           <a:p>
             <a:r>
-              <a:rPr lang="en-GB" dirty="0" smtClean="0"/>
+              <a:rPr lang="en-GB" dirty="0"/>
               <a:t>This program setups up an integer and a string.</a:t>
             </a:r>
           </a:p>
@@ -16653,7 +16099,7 @@
             <a:endParaRPr lang="en-GB" dirty="0"/>
           </a:p>
           <a:p>
-            <a:endParaRPr lang="en-GB" dirty="0" smtClean="0"/>
+            <a:endParaRPr lang="en-GB" dirty="0"/>
           </a:p>
           <a:p>
             <a:endParaRPr lang="en-GB" dirty="0"/>
@@ -16699,15 +16145,7 @@
                   <a:srgbClr val="FFFF00"/>
                 </a:solidFill>
               </a:rPr>
-              <a:t> </a:t>
-            </a:r>
-            <a:r>
-              <a:rPr lang="en-GB" dirty="0" smtClean="0">
-                <a:solidFill>
-                  <a:srgbClr val="FFFF00"/>
-                </a:solidFill>
-              </a:rPr>
-              <a:t>What do you think this program will do ?</a:t>
+              <a:t> What do you think this program will do ?</a:t>
             </a:r>
           </a:p>
           <a:p>
@@ -16729,28 +16167,15 @@
                   <a:srgbClr val="FFFF00"/>
                 </a:solidFill>
               </a:rPr>
-              <a:t> </a:t>
-            </a:r>
-            <a:r>
-              <a:rPr lang="en-GB" dirty="0" smtClean="0">
-                <a:solidFill>
-                  <a:srgbClr val="FFFF00"/>
-                </a:solidFill>
-              </a:rPr>
-              <a:t>Type it in and run it. Where you correct ?. If you weren't, can you work out why ?.</a:t>
-            </a:r>
-            <a:endParaRPr lang="en-GB" dirty="0">
-              <a:solidFill>
-                <a:srgbClr val="FFFF00"/>
-              </a:solidFill>
-            </a:endParaRPr>
+              <a:t> Type it in and run it. Where you correct ?. If you weren't, can you work out why ?.</a:t>
+            </a:r>
           </a:p>
           <a:p>
             <a:pPr marL="285750" indent="-285750">
               <a:buFont typeface="Arial" panose="020B0604020202020204" pitchFamily="34" charset="0"/>
               <a:buChar char="•"/>
             </a:pPr>
-            <a:endParaRPr lang="en-GB" dirty="0" smtClean="0">
+            <a:endParaRPr lang="en-GB" dirty="0">
               <a:solidFill>
                 <a:srgbClr val="FFFF00"/>
               </a:solidFill>
@@ -16948,13 +16373,6 @@
   <p:clrMapOvr>
     <a:masterClrMapping/>
   </p:clrMapOvr>
-  <p:timing>
-    <p:tnLst>
-      <p:par>
-        <p:cTn id="1" dur="indefinite" restart="never" nodeType="tmRoot"/>
-      </p:par>
-    </p:tnLst>
-  </p:timing>
 </p:sld>
 </file>
 
@@ -16991,10 +16409,9 @@
           <a:lstStyle/>
           <a:p>
             <a:r>
-              <a:rPr lang="en-GB" dirty="0" smtClean="0"/>
+              <a:rPr lang="en-GB" dirty="0"/>
               <a:t>When you don't need to cast.</a:t>
             </a:r>
-            <a:endParaRPr lang="en-GB" dirty="0"/>
           </a:p>
         </p:txBody>
       </p:sp>
@@ -17021,64 +16438,64 @@
           <a:lstStyle/>
           <a:p>
             <a:r>
-              <a:rPr lang="en-GB" dirty="0" smtClean="0"/>
+              <a:rPr lang="en-GB" dirty="0"/>
               <a:t>You don't always need to cast variables.</a:t>
             </a:r>
           </a:p>
           <a:p>
             <a:r>
-              <a:rPr lang="en-GB" dirty="0" smtClean="0"/>
+              <a:rPr lang="en-GB" dirty="0"/>
               <a:t>Particularly when you just want to print them.</a:t>
             </a:r>
           </a:p>
           <a:p>
             <a:r>
-              <a:rPr lang="en-GB" dirty="0" smtClean="0"/>
+              <a:rPr lang="en-GB" dirty="0"/>
               <a:t>If you write a string, but put an "f" character before it, then things inside the string will be interpreted. These are called </a:t>
             </a:r>
             <a:r>
-              <a:rPr lang="en-GB" b="1" u="sng" dirty="0" smtClean="0"/>
+              <a:rPr lang="en-GB" b="1" u="sng" dirty="0"/>
               <a:t>format strings</a:t>
             </a:r>
             <a:r>
-              <a:rPr lang="en-GB" dirty="0" smtClean="0"/>
+              <a:rPr lang="en-GB" dirty="0"/>
               <a:t>.</a:t>
             </a:r>
           </a:p>
           <a:p>
-            <a:endParaRPr lang="en-GB" dirty="0" smtClean="0"/>
-          </a:p>
-          <a:p>
-            <a:r>
-              <a:rPr lang="en-GB" dirty="0" smtClean="0"/>
+            <a:endParaRPr lang="en-GB" dirty="0"/>
+          </a:p>
+          <a:p>
+            <a:r>
+              <a:rPr lang="en-GB" dirty="0"/>
               <a:t>An example of a format string is :-</a:t>
             </a:r>
           </a:p>
           <a:p>
             <a:pPr lvl="1"/>
             <a:r>
-              <a:rPr lang="en-GB" dirty="0" err="1" smtClean="0">
+              <a:rPr lang="en-GB" dirty="0" err="1">
                 <a:latin typeface="Courier New" panose="02070309020205020404" pitchFamily="49" charset="0"/>
                 <a:cs typeface="Courier New" panose="02070309020205020404" pitchFamily="49" charset="0"/>
               </a:rPr>
               <a:t>f"Hi</a:t>
             </a:r>
             <a:r>
-              <a:rPr lang="en-GB" dirty="0" smtClean="0">
+              <a:rPr lang="en-GB" dirty="0">
                 <a:latin typeface="Courier New" panose="02070309020205020404" pitchFamily="49" charset="0"/>
                 <a:cs typeface="Courier New" panose="02070309020205020404" pitchFamily="49" charset="0"/>
               </a:rPr>
               <a:t>, my name is {</a:t>
             </a:r>
             <a:r>
-              <a:rPr lang="en-GB" dirty="0" err="1" smtClean="0">
+              <a:rPr lang="en-GB" dirty="0" err="1">
                 <a:latin typeface="Courier New" panose="02070309020205020404" pitchFamily="49" charset="0"/>
                 <a:cs typeface="Courier New" panose="02070309020205020404" pitchFamily="49" charset="0"/>
               </a:rPr>
               <a:t>myname</a:t>
             </a:r>
             <a:r>
-              <a:rPr lang="en-GB" dirty="0" smtClean="0">
+              <a:rPr lang="en-GB" dirty="0">
                 <a:latin typeface="Courier New" panose="02070309020205020404" pitchFamily="49" charset="0"/>
                 <a:cs typeface="Courier New" panose="02070309020205020404" pitchFamily="49" charset="0"/>
               </a:rPr>
@@ -17088,22 +16505,22 @@
           <a:p>
             <a:pPr lvl="1"/>
             <a:r>
-              <a:rPr lang="en-GB" dirty="0" smtClean="0"/>
+              <a:rPr lang="en-GB" dirty="0"/>
               <a:t>If the </a:t>
             </a:r>
             <a:r>
-              <a:rPr lang="en-GB" dirty="0" err="1" smtClean="0"/>
+              <a:rPr lang="en-GB" dirty="0" err="1"/>
               <a:t>myname</a:t>
             </a:r>
             <a:r>
-              <a:rPr lang="en-GB" dirty="0" smtClean="0"/>
+              <a:rPr lang="en-GB" dirty="0"/>
               <a:t> variable is set to "Dave", this formatted string would be :-</a:t>
             </a:r>
           </a:p>
           <a:p>
             <a:pPr lvl="1"/>
             <a:r>
-              <a:rPr lang="en-GB" dirty="0" smtClean="0">
+              <a:rPr lang="en-GB" dirty="0">
                 <a:latin typeface="Courier New" panose="02070309020205020404" pitchFamily="49" charset="0"/>
                 <a:cs typeface="Courier New" panose="02070309020205020404" pitchFamily="49" charset="0"/>
               </a:rPr>

</xml_diff>

<commit_message>
Edited program numbers for consistency between examples and powerpoint
</commit_message>
<xml_diff>
--- a/week3/week3.pptx
+++ b/week3/week3.pptx
@@ -395,7 +395,7 @@
           <a:p>
             <a:fld id="{4AAD347D-5ACD-4C99-B74B-A9C85AD731AF}" type="datetimeFigureOut">
               <a:rPr lang="en-US" dirty="0"/>
-              <a:t>6/27/2018</a:t>
+              <a:t>6/28/2018</a:t>
             </a:fld>
             <a:endParaRPr lang="en-US" dirty="0"/>
           </a:p>
@@ -665,7 +665,7 @@
           <a:p>
             <a:fld id="{4509A250-FF31-4206-8172-F9D3106AACB1}" type="datetimeFigureOut">
               <a:rPr lang="en-US" dirty="0"/>
-              <a:t>6/27/2018</a:t>
+              <a:t>6/28/2018</a:t>
             </a:fld>
             <a:endParaRPr lang="en-US" dirty="0"/>
           </a:p>
@@ -854,7 +854,7 @@
           <a:p>
             <a:fld id="{4509A250-FF31-4206-8172-F9D3106AACB1}" type="datetimeFigureOut">
               <a:rPr lang="en-US" dirty="0"/>
-              <a:t>6/27/2018</a:t>
+              <a:t>6/28/2018</a:t>
             </a:fld>
             <a:endParaRPr lang="en-US" dirty="0"/>
           </a:p>
@@ -1122,7 +1122,7 @@
           <a:p>
             <a:fld id="{4509A250-FF31-4206-8172-F9D3106AACB1}" type="datetimeFigureOut">
               <a:rPr lang="en-US" dirty="0"/>
-              <a:t>6/27/2018</a:t>
+              <a:t>6/28/2018</a:t>
             </a:fld>
             <a:endParaRPr lang="en-US" dirty="0"/>
           </a:p>
@@ -1458,7 +1458,7 @@
           <a:p>
             <a:fld id="{4509A250-FF31-4206-8172-F9D3106AACB1}" type="datetimeFigureOut">
               <a:rPr lang="en-US" dirty="0"/>
-              <a:t>6/27/2018</a:t>
+              <a:t>6/28/2018</a:t>
             </a:fld>
             <a:endParaRPr lang="en-US" dirty="0"/>
           </a:p>
@@ -2076,7 +2076,7 @@
           <a:p>
             <a:fld id="{4509A250-FF31-4206-8172-F9D3106AACB1}" type="datetimeFigureOut">
               <a:rPr lang="en-US" dirty="0"/>
-              <a:t>6/27/2018</a:t>
+              <a:t>6/28/2018</a:t>
             </a:fld>
             <a:endParaRPr lang="en-US" dirty="0"/>
           </a:p>
@@ -2931,7 +2931,7 @@
           <a:p>
             <a:fld id="{4509A250-FF31-4206-8172-F9D3106AACB1}" type="datetimeFigureOut">
               <a:rPr lang="en-US" dirty="0"/>
-              <a:t>6/27/2018</a:t>
+              <a:t>6/28/2018</a:t>
             </a:fld>
             <a:endParaRPr lang="en-US" dirty="0"/>
           </a:p>
@@ -3096,7 +3096,7 @@
           <a:p>
             <a:fld id="{4509A250-FF31-4206-8172-F9D3106AACB1}" type="datetimeFigureOut">
               <a:rPr lang="en-US" dirty="0"/>
-              <a:t>6/27/2018</a:t>
+              <a:t>6/28/2018</a:t>
             </a:fld>
             <a:endParaRPr lang="en-US" dirty="0"/>
           </a:p>
@@ -3271,7 +3271,7 @@
           <a:p>
             <a:fld id="{4509A250-FF31-4206-8172-F9D3106AACB1}" type="datetimeFigureOut">
               <a:rPr lang="en-US" dirty="0"/>
-              <a:t>6/27/2018</a:t>
+              <a:t>6/28/2018</a:t>
             </a:fld>
             <a:endParaRPr lang="en-US" dirty="0"/>
           </a:p>
@@ -3436,7 +3436,7 @@
           <a:p>
             <a:fld id="{4509A250-FF31-4206-8172-F9D3106AACB1}" type="datetimeFigureOut">
               <a:rPr lang="en-US" dirty="0"/>
-              <a:t>6/27/2018</a:t>
+              <a:t>6/28/2018</a:t>
             </a:fld>
             <a:endParaRPr lang="en-US" dirty="0"/>
           </a:p>
@@ -3678,7 +3678,7 @@
           <a:p>
             <a:fld id="{9796027F-7875-4030-9381-8BD8C4F21935}" type="datetimeFigureOut">
               <a:rPr lang="en-US" dirty="0"/>
-              <a:t>6/27/2018</a:t>
+              <a:t>6/28/2018</a:t>
             </a:fld>
             <a:endParaRPr lang="en-US" dirty="0"/>
           </a:p>
@@ -3965,7 +3965,7 @@
           <a:p>
             <a:fld id="{9796027F-7875-4030-9381-8BD8C4F21935}" type="datetimeFigureOut">
               <a:rPr lang="en-US" dirty="0"/>
-              <a:t>6/27/2018</a:t>
+              <a:t>6/28/2018</a:t>
             </a:fld>
             <a:endParaRPr lang="en-US" dirty="0"/>
           </a:p>
@@ -4404,7 +4404,7 @@
           <a:p>
             <a:fld id="{9796027F-7875-4030-9381-8BD8C4F21935}" type="datetimeFigureOut">
               <a:rPr lang="en-US" dirty="0"/>
-              <a:t>6/27/2018</a:t>
+              <a:t>6/28/2018</a:t>
             </a:fld>
             <a:endParaRPr lang="en-US" dirty="0"/>
           </a:p>
@@ -4517,7 +4517,7 @@
           <a:p>
             <a:fld id="{4509A250-FF31-4206-8172-F9D3106AACB1}" type="datetimeFigureOut">
               <a:rPr lang="en-US" dirty="0"/>
-              <a:t>6/27/2018</a:t>
+              <a:t>6/28/2018</a:t>
             </a:fld>
             <a:endParaRPr lang="en-US" dirty="0"/>
           </a:p>
@@ -4607,7 +4607,7 @@
           <a:p>
             <a:fld id="{4509A250-FF31-4206-8172-F9D3106AACB1}" type="datetimeFigureOut">
               <a:rPr lang="en-US" dirty="0"/>
-              <a:t>6/27/2018</a:t>
+              <a:t>6/28/2018</a:t>
             </a:fld>
             <a:endParaRPr lang="en-US" dirty="0"/>
           </a:p>
@@ -4881,7 +4881,7 @@
           <a:p>
             <a:fld id="{4509A250-FF31-4206-8172-F9D3106AACB1}" type="datetimeFigureOut">
               <a:rPr lang="en-US" dirty="0"/>
-              <a:t>6/27/2018</a:t>
+              <a:t>6/28/2018</a:t>
             </a:fld>
             <a:endParaRPr lang="en-US" dirty="0"/>
           </a:p>
@@ -5151,7 +5151,7 @@
           <a:p>
             <a:fld id="{4509A250-FF31-4206-8172-F9D3106AACB1}" type="datetimeFigureOut">
               <a:rPr lang="en-US" dirty="0"/>
-              <a:t>6/27/2018</a:t>
+              <a:t>6/28/2018</a:t>
             </a:fld>
             <a:endParaRPr lang="en-US" dirty="0"/>
           </a:p>
@@ -5575,7 +5575,7 @@
           <a:p>
             <a:fld id="{4AAD347D-5ACD-4C99-B74B-A9C85AD731AF}" type="datetimeFigureOut">
               <a:rPr lang="en-US" dirty="0"/>
-              <a:t>6/27/2018</a:t>
+              <a:t>6/28/2018</a:t>
             </a:fld>
             <a:endParaRPr lang="en-US" dirty="0"/>
           </a:p>
@@ -8735,7 +8735,7 @@
           <a:p>
             <a:r>
               <a:rPr lang="en-GB" dirty="0"/>
-              <a:t># Week3, Program9</a:t>
+              <a:t># Week3, Program8</a:t>
             </a:r>
           </a:p>
           <a:p>
@@ -9615,7 +9615,7 @@
                 <a:latin typeface="Courier New" panose="02070309020205020404" pitchFamily="49" charset="0"/>
                 <a:cs typeface="Courier New" panose="02070309020205020404" pitchFamily="49" charset="0"/>
               </a:rPr>
-              <a:t># Week3, Program10</a:t>
+              <a:t># Week3, Program9</a:t>
             </a:r>
           </a:p>
           <a:p>
@@ -10838,7 +10838,7 @@
                 <a:latin typeface="Courier New" panose="02070309020205020404" pitchFamily="49" charset="0"/>
                 <a:cs typeface="Courier New" panose="02070309020205020404" pitchFamily="49" charset="0"/>
               </a:rPr>
-              <a:t># Week3, Program11</a:t>
+              <a:t># Week3, Program10</a:t>
             </a:r>
           </a:p>
           <a:p>
@@ -11501,7 +11501,7 @@
                 <a:latin typeface="Courier New" panose="02070309020205020404" pitchFamily="49" charset="0"/>
                 <a:cs typeface="Courier New" panose="02070309020205020404" pitchFamily="49" charset="0"/>
               </a:rPr>
-              <a:t># Week3, Program11a</a:t>
+              <a:t># Week3, Program11</a:t>
             </a:r>
           </a:p>
           <a:p>

</xml_diff>

<commit_message>
Edited punctuation and homework10 (from 100000000 to 10000) so the program will run.
</commit_message>
<xml_diff>
--- a/week3/week3.pptx
+++ b/week3/week3.pptx
@@ -14550,8 +14550,8 @@
           </a:p>
         </p:txBody>
       </p:sp>
-      <mc:AlternateContent xmlns:mc="http://schemas.openxmlformats.org/markup-compatibility/2006" xmlns:a14="http://schemas.microsoft.com/office/drawing/2010/main">
-        <mc:Choice Requires="a14">
+      <mc:AlternateContent xmlns:mc="http://schemas.openxmlformats.org/markup-compatibility/2006">
+        <mc:Choice xmlns:a14="http://schemas.microsoft.com/office/drawing/2010/main" Requires="a14">
           <p:sp>
             <p:nvSpPr>
               <p:cNvPr id="3" name="Content Placeholder 2"/>
@@ -14924,13 +14924,21 @@
               <a:p>
                 <a:r>
                   <a:rPr lang="en-GB" dirty="0"/>
-                  <a:t>Extend your program to add the first 10,000,000 numbers in this sequence together.</a:t>
+                  <a:t>Extend your program to add the </a:t>
+                </a:r>
+                <a:r>
+                  <a:rPr lang="en-GB"/>
+                  <a:t>first 10,000 </a:t>
+                </a:r>
+                <a:r>
+                  <a:rPr lang="en-GB" dirty="0"/>
+                  <a:t>numbers in this sequence together.</a:t>
                 </a:r>
               </a:p>
             </p:txBody>
           </p:sp>
         </mc:Choice>
-        <mc:Fallback xmlns="">
+        <mc:Fallback>
           <p:sp>
             <p:nvSpPr>
               <p:cNvPr id="3" name="Content Placeholder 2"/>
@@ -14946,7 +14954,7 @@
                 <a:off x="646110" y="2027583"/>
                 <a:ext cx="10453689" cy="4032250"/>
               </a:xfrm>
-              <a:blipFill rotWithShape="0">
+              <a:blipFill>
                 <a:blip r:embed="rId2"/>
                 <a:stretch>
                   <a:fillRect l="-292" t="-908"/>
@@ -16167,7 +16175,7 @@
                   <a:srgbClr val="FFFF00"/>
                 </a:solidFill>
               </a:rPr>
-              <a:t> Type it in and run it. Where you correct ?. If you weren't, can you work out why ?.</a:t>
+              <a:t> Type it in and run it. Were you correct ? If you weren't, can you work out why ?</a:t>
             </a:r>
           </a:p>
           <a:p>

</xml_diff>